<commit_message>
updates de las presentaciones
</commit_message>
<xml_diff>
--- a/docs/dns-tutorial-reversos-00.pptx
+++ b/docs/dns-tutorial-reversos-00.pptx
@@ -17,10 +17,6 @@
     <p:sldId id="271" r:id="rId11"/>
     <p:sldId id="272" r:id="rId12"/>
     <p:sldId id="273" r:id="rId13"/>
-    <p:sldId id="257" r:id="rId14"/>
-    <p:sldId id="259" r:id="rId15"/>
-    <p:sldId id="260" r:id="rId16"/>
-    <p:sldId id="261" r:id="rId17"/>
   </p:sldIdLst>
   <p:sldSz cx="9144000" cy="5143500" type="screen16x9"/>
   <p:notesSz cx="6858000" cy="9144000"/>
@@ -5319,18 +5315,17 @@
         <a:lstStyle/>
         <a:p>
           <a:r>
-            <a:rPr lang="en-US" dirty="0" smtClean="0"/>
+            <a:rPr lang="en-US" dirty="0"/>
             <a:t>(IN, A, ‘</a:t>
           </a:r>
           <a:r>
-            <a:rPr lang="en-US" dirty="0" err="1" smtClean="0"/>
+            <a:rPr lang="en-US" dirty="0" err="1"/>
             <a:t>www.google.com</a:t>
           </a:r>
           <a:r>
-            <a:rPr lang="en-US" dirty="0" smtClean="0"/>
+            <a:rPr lang="en-US" dirty="0"/>
             <a:t>’)</a:t>
           </a:r>
-          <a:endParaRPr lang="en-US" dirty="0"/>
         </a:p>
       </dgm:t>
     </dgm:pt>
@@ -5364,10 +5359,9 @@
         <a:lstStyle/>
         <a:p>
           <a:r>
-            <a:rPr lang="en-US" dirty="0" smtClean="0"/>
+            <a:rPr lang="en-US" dirty="0"/>
             <a:t>(IN, A, 120, 172.23.14.1)</a:t>
           </a:r>
-          <a:endParaRPr lang="en-US" dirty="0"/>
         </a:p>
       </dgm:t>
     </dgm:pt>
@@ -5401,10 +5395,9 @@
         <a:lstStyle/>
         <a:p>
           <a:r>
-            <a:rPr lang="en-US" dirty="0" smtClean="0"/>
+            <a:rPr lang="en-US" dirty="0"/>
             <a:t>(IN, A, 120, 172.23.14.2)</a:t>
           </a:r>
-          <a:endParaRPr lang="en-US" dirty="0"/>
         </a:p>
       </dgm:t>
     </dgm:pt>
@@ -5438,10 +5431,9 @@
         <a:lstStyle/>
         <a:p>
           <a:r>
-            <a:rPr lang="en-US" dirty="0" smtClean="0"/>
+            <a:rPr lang="en-US" dirty="0"/>
             <a:t>(IN, A, 120, 172.23.14.3)</a:t>
           </a:r>
-          <a:endParaRPr lang="en-US" dirty="0"/>
         </a:p>
       </dgm:t>
     </dgm:pt>
@@ -5478,13 +5470,6 @@
         </dgm:presLayoutVars>
       </dgm:prSet>
       <dgm:spPr/>
-      <dgm:t>
-        <a:bodyPr/>
-        <a:lstStyle/>
-        <a:p>
-          <a:endParaRPr lang="en-US"/>
-        </a:p>
-      </dgm:t>
     </dgm:pt>
     <dgm:pt modelId="{EC58883F-CC83-774A-815B-BE6E579D3593}" type="pres">
       <dgm:prSet presAssocID="{882028BF-CCB9-CA48-A9EE-DFFC7B9EC40F}" presName="root1" presStyleCnt="0"/>
@@ -5497,13 +5482,6 @@
         </dgm:presLayoutVars>
       </dgm:prSet>
       <dgm:spPr/>
-      <dgm:t>
-        <a:bodyPr/>
-        <a:lstStyle/>
-        <a:p>
-          <a:endParaRPr lang="en-US"/>
-        </a:p>
-      </dgm:t>
     </dgm:pt>
     <dgm:pt modelId="{FD8D2443-7368-DD43-8D1B-414334BE9FFE}" type="pres">
       <dgm:prSet presAssocID="{882028BF-CCB9-CA48-A9EE-DFFC7B9EC40F}" presName="level2hierChild" presStyleCnt="0"/>
@@ -5512,24 +5490,10 @@
     <dgm:pt modelId="{5C91F0CD-0AE9-D94D-A4BE-8A650FC3988A}" type="pres">
       <dgm:prSet presAssocID="{70620D66-E4C8-874C-BE65-775B12DF0850}" presName="conn2-1" presStyleLbl="parChTrans1D2" presStyleIdx="0" presStyleCnt="3"/>
       <dgm:spPr/>
-      <dgm:t>
-        <a:bodyPr/>
-        <a:lstStyle/>
-        <a:p>
-          <a:endParaRPr lang="en-US"/>
-        </a:p>
-      </dgm:t>
     </dgm:pt>
     <dgm:pt modelId="{053F6BDB-E4D3-1840-BDF7-E2B85FEA54A1}" type="pres">
       <dgm:prSet presAssocID="{70620D66-E4C8-874C-BE65-775B12DF0850}" presName="connTx" presStyleLbl="parChTrans1D2" presStyleIdx="0" presStyleCnt="3"/>
       <dgm:spPr/>
-      <dgm:t>
-        <a:bodyPr/>
-        <a:lstStyle/>
-        <a:p>
-          <a:endParaRPr lang="en-US"/>
-        </a:p>
-      </dgm:t>
     </dgm:pt>
     <dgm:pt modelId="{3749324B-239A-D546-B274-D9D0570808A9}" type="pres">
       <dgm:prSet presAssocID="{8F00C714-D400-804F-92DD-EC43AA50C663}" presName="root2" presStyleCnt="0"/>
@@ -5542,13 +5506,6 @@
         </dgm:presLayoutVars>
       </dgm:prSet>
       <dgm:spPr/>
-      <dgm:t>
-        <a:bodyPr/>
-        <a:lstStyle/>
-        <a:p>
-          <a:endParaRPr lang="en-US"/>
-        </a:p>
-      </dgm:t>
     </dgm:pt>
     <dgm:pt modelId="{03B61FDF-81E1-1748-B380-61D5BEBBBA75}" type="pres">
       <dgm:prSet presAssocID="{8F00C714-D400-804F-92DD-EC43AA50C663}" presName="level3hierChild" presStyleCnt="0"/>
@@ -5557,24 +5514,10 @@
     <dgm:pt modelId="{0B2A62A7-02D3-7F4E-B053-D23DCCE87D9F}" type="pres">
       <dgm:prSet presAssocID="{1A16781D-9B1C-FE42-8001-F95B38563354}" presName="conn2-1" presStyleLbl="parChTrans1D2" presStyleIdx="1" presStyleCnt="3"/>
       <dgm:spPr/>
-      <dgm:t>
-        <a:bodyPr/>
-        <a:lstStyle/>
-        <a:p>
-          <a:endParaRPr lang="en-US"/>
-        </a:p>
-      </dgm:t>
     </dgm:pt>
     <dgm:pt modelId="{2C3EAF1A-1596-3D46-8B7E-E5F985CC241D}" type="pres">
       <dgm:prSet presAssocID="{1A16781D-9B1C-FE42-8001-F95B38563354}" presName="connTx" presStyleLbl="parChTrans1D2" presStyleIdx="1" presStyleCnt="3"/>
       <dgm:spPr/>
-      <dgm:t>
-        <a:bodyPr/>
-        <a:lstStyle/>
-        <a:p>
-          <a:endParaRPr lang="en-US"/>
-        </a:p>
-      </dgm:t>
     </dgm:pt>
     <dgm:pt modelId="{DE827176-C156-5142-9CAE-203850B08334}" type="pres">
       <dgm:prSet presAssocID="{8087C17D-8B29-E848-AF4B-B765B0377B12}" presName="root2" presStyleCnt="0"/>
@@ -5587,13 +5530,6 @@
         </dgm:presLayoutVars>
       </dgm:prSet>
       <dgm:spPr/>
-      <dgm:t>
-        <a:bodyPr/>
-        <a:lstStyle/>
-        <a:p>
-          <a:endParaRPr lang="en-US"/>
-        </a:p>
-      </dgm:t>
     </dgm:pt>
     <dgm:pt modelId="{8627347D-61ED-834E-ACF0-DF36A9E39216}" type="pres">
       <dgm:prSet presAssocID="{8087C17D-8B29-E848-AF4B-B765B0377B12}" presName="level3hierChild" presStyleCnt="0"/>
@@ -5602,24 +5538,10 @@
     <dgm:pt modelId="{89065979-4320-154E-819D-ADEB3EB2CE68}" type="pres">
       <dgm:prSet presAssocID="{F36A8376-A4D2-B249-95EC-87005FE71F01}" presName="conn2-1" presStyleLbl="parChTrans1D2" presStyleIdx="2" presStyleCnt="3"/>
       <dgm:spPr/>
-      <dgm:t>
-        <a:bodyPr/>
-        <a:lstStyle/>
-        <a:p>
-          <a:endParaRPr lang="en-US"/>
-        </a:p>
-      </dgm:t>
     </dgm:pt>
     <dgm:pt modelId="{01BCD2FF-3AFA-774B-93DB-A88491D6C6F5}" type="pres">
       <dgm:prSet presAssocID="{F36A8376-A4D2-B249-95EC-87005FE71F01}" presName="connTx" presStyleLbl="parChTrans1D2" presStyleIdx="2" presStyleCnt="3"/>
       <dgm:spPr/>
-      <dgm:t>
-        <a:bodyPr/>
-        <a:lstStyle/>
-        <a:p>
-          <a:endParaRPr lang="en-US"/>
-        </a:p>
-      </dgm:t>
     </dgm:pt>
     <dgm:pt modelId="{351DA63F-6DD9-694E-8709-A6DC66397505}" type="pres">
       <dgm:prSet presAssocID="{D42C4EE4-E249-7E48-A38E-2673B061EB84}" presName="root2" presStyleCnt="0"/>
@@ -5632,13 +5554,6 @@
         </dgm:presLayoutVars>
       </dgm:prSet>
       <dgm:spPr/>
-      <dgm:t>
-        <a:bodyPr/>
-        <a:lstStyle/>
-        <a:p>
-          <a:endParaRPr lang="en-US"/>
-        </a:p>
-      </dgm:t>
     </dgm:pt>
     <dgm:pt modelId="{412724B7-A32F-034B-AAE7-59AE7D4C7948}" type="pres">
       <dgm:prSet presAssocID="{D42C4EE4-E249-7E48-A38E-2673B061EB84}" presName="level3hierChild" presStyleCnt="0"/>
@@ -5646,21 +5561,21 @@
     </dgm:pt>
   </dgm:ptLst>
   <dgm:cxnLst>
-    <dgm:cxn modelId="{49D8C1EC-7D3F-1F4B-B0ED-14C8C1B18C8E}" type="presOf" srcId="{D42C4EE4-E249-7E48-A38E-2673B061EB84}" destId="{62379BC7-9828-7847-A34F-DDA81D1939A4}" srcOrd="0" destOrd="0" presId="urn:microsoft.com/office/officeart/2005/8/layout/hierarchy2"/>
-    <dgm:cxn modelId="{3E832DED-72B7-B947-A2C4-3D2B80EEB219}" type="presOf" srcId="{A8896D54-C67A-4543-8201-13399C4373E2}" destId="{C1167922-3768-2D45-987B-896212720A5E}" srcOrd="0" destOrd="0" presId="urn:microsoft.com/office/officeart/2005/8/layout/hierarchy2"/>
-    <dgm:cxn modelId="{D2E340DA-650C-4E4B-AA00-D86695FE74BE}" type="presOf" srcId="{70620D66-E4C8-874C-BE65-775B12DF0850}" destId="{5C91F0CD-0AE9-D94D-A4BE-8A650FC3988A}" srcOrd="0" destOrd="0" presId="urn:microsoft.com/office/officeart/2005/8/layout/hierarchy2"/>
+    <dgm:cxn modelId="{768BF508-570C-824A-A20E-476BB763BC71}" srcId="{882028BF-CCB9-CA48-A9EE-DFFC7B9EC40F}" destId="{8F00C714-D400-804F-92DD-EC43AA50C663}" srcOrd="0" destOrd="0" parTransId="{70620D66-E4C8-874C-BE65-775B12DF0850}" sibTransId="{516A7364-FA9A-6A40-B90F-DDAC1AA9B3E4}"/>
     <dgm:cxn modelId="{9834DB21-7254-FA47-BDF0-4C8B388024F5}" type="presOf" srcId="{8F00C714-D400-804F-92DD-EC43AA50C663}" destId="{E5985ED2-DD64-604D-BB69-DC178E3CBC49}" srcOrd="0" destOrd="0" presId="urn:microsoft.com/office/officeart/2005/8/layout/hierarchy2"/>
-    <dgm:cxn modelId="{C2E31991-C6D1-4444-B70C-1DE8D8F9C482}" type="presOf" srcId="{1A16781D-9B1C-FE42-8001-F95B38563354}" destId="{2C3EAF1A-1596-3D46-8B7E-E5F985CC241D}" srcOrd="1" destOrd="0" presId="urn:microsoft.com/office/officeart/2005/8/layout/hierarchy2"/>
-    <dgm:cxn modelId="{FA102BE5-7AF7-B943-8D7D-6F4B8C6F6DD7}" srcId="{882028BF-CCB9-CA48-A9EE-DFFC7B9EC40F}" destId="{8087C17D-8B29-E848-AF4B-B765B0377B12}" srcOrd="1" destOrd="0" parTransId="{1A16781D-9B1C-FE42-8001-F95B38563354}" sibTransId="{9911E665-6A1E-3A4A-8717-E6D9805E8E3F}"/>
     <dgm:cxn modelId="{B15F9669-D8EE-C049-8B20-FECE8C3D8B46}" type="presOf" srcId="{F36A8376-A4D2-B249-95EC-87005FE71F01}" destId="{89065979-4320-154E-819D-ADEB3EB2CE68}" srcOrd="0" destOrd="0" presId="urn:microsoft.com/office/officeart/2005/8/layout/hierarchy2"/>
-    <dgm:cxn modelId="{1AD5B4FA-C7FB-9F4B-A530-976BE3AC6C1B}" type="presOf" srcId="{F36A8376-A4D2-B249-95EC-87005FE71F01}" destId="{01BCD2FF-3AFA-774B-93DB-A88491D6C6F5}" srcOrd="1" destOrd="0" presId="urn:microsoft.com/office/officeart/2005/8/layout/hierarchy2"/>
     <dgm:cxn modelId="{6A7BBB69-6322-774E-B83E-A7BAEB9F09D0}" type="presOf" srcId="{70620D66-E4C8-874C-BE65-775B12DF0850}" destId="{053F6BDB-E4D3-1840-BDF7-E2B85FEA54A1}" srcOrd="1" destOrd="0" presId="urn:microsoft.com/office/officeart/2005/8/layout/hierarchy2"/>
-    <dgm:cxn modelId="{302F11FB-E645-3C4B-99CA-89A7E229F3E4}" srcId="{882028BF-CCB9-CA48-A9EE-DFFC7B9EC40F}" destId="{D42C4EE4-E249-7E48-A38E-2673B061EB84}" srcOrd="2" destOrd="0" parTransId="{F36A8376-A4D2-B249-95EC-87005FE71F01}" sibTransId="{51FF7843-F570-CC4A-9662-67F9F2950F88}"/>
-    <dgm:cxn modelId="{8ED96CD3-D924-7642-8D19-5C828FE5D2F2}" srcId="{A8896D54-C67A-4543-8201-13399C4373E2}" destId="{882028BF-CCB9-CA48-A9EE-DFFC7B9EC40F}" srcOrd="0" destOrd="0" parTransId="{DC6AD598-FC4A-FD46-9F34-13602245F426}" sibTransId="{0CFA4C6C-6C57-834F-9046-BAD49A3E5D08}"/>
-    <dgm:cxn modelId="{768BF508-570C-824A-A20E-476BB763BC71}" srcId="{882028BF-CCB9-CA48-A9EE-DFFC7B9EC40F}" destId="{8F00C714-D400-804F-92DD-EC43AA50C663}" srcOrd="0" destOrd="0" parTransId="{70620D66-E4C8-874C-BE65-775B12DF0850}" sibTransId="{516A7364-FA9A-6A40-B90F-DDAC1AA9B3E4}"/>
     <dgm:cxn modelId="{5334A07B-EFAE-194A-9E62-BC8C836C5123}" type="presOf" srcId="{8087C17D-8B29-E848-AF4B-B765B0377B12}" destId="{EC0463FB-CDE3-EB41-8F42-843097ECD9B4}" srcOrd="0" destOrd="0" presId="urn:microsoft.com/office/officeart/2005/8/layout/hierarchy2"/>
     <dgm:cxn modelId="{8B1E7F7E-E924-5343-A533-4F5FD0F4E0BC}" type="presOf" srcId="{1A16781D-9B1C-FE42-8001-F95B38563354}" destId="{0B2A62A7-02D3-7F4E-B053-D23DCCE87D9F}" srcOrd="0" destOrd="0" presId="urn:microsoft.com/office/officeart/2005/8/layout/hierarchy2"/>
     <dgm:cxn modelId="{B4B73985-6013-CB4C-B173-968CD18C6DBC}" type="presOf" srcId="{882028BF-CCB9-CA48-A9EE-DFFC7B9EC40F}" destId="{DB605A66-2A81-DD43-9688-844B4CC04D59}" srcOrd="0" destOrd="0" presId="urn:microsoft.com/office/officeart/2005/8/layout/hierarchy2"/>
+    <dgm:cxn modelId="{C2E31991-C6D1-4444-B70C-1DE8D8F9C482}" type="presOf" srcId="{1A16781D-9B1C-FE42-8001-F95B38563354}" destId="{2C3EAF1A-1596-3D46-8B7E-E5F985CC241D}" srcOrd="1" destOrd="0" presId="urn:microsoft.com/office/officeart/2005/8/layout/hierarchy2"/>
+    <dgm:cxn modelId="{8ED96CD3-D924-7642-8D19-5C828FE5D2F2}" srcId="{A8896D54-C67A-4543-8201-13399C4373E2}" destId="{882028BF-CCB9-CA48-A9EE-DFFC7B9EC40F}" srcOrd="0" destOrd="0" parTransId="{DC6AD598-FC4A-FD46-9F34-13602245F426}" sibTransId="{0CFA4C6C-6C57-834F-9046-BAD49A3E5D08}"/>
+    <dgm:cxn modelId="{D2E340DA-650C-4E4B-AA00-D86695FE74BE}" type="presOf" srcId="{70620D66-E4C8-874C-BE65-775B12DF0850}" destId="{5C91F0CD-0AE9-D94D-A4BE-8A650FC3988A}" srcOrd="0" destOrd="0" presId="urn:microsoft.com/office/officeart/2005/8/layout/hierarchy2"/>
+    <dgm:cxn modelId="{FA102BE5-7AF7-B943-8D7D-6F4B8C6F6DD7}" srcId="{882028BF-CCB9-CA48-A9EE-DFFC7B9EC40F}" destId="{8087C17D-8B29-E848-AF4B-B765B0377B12}" srcOrd="1" destOrd="0" parTransId="{1A16781D-9B1C-FE42-8001-F95B38563354}" sibTransId="{9911E665-6A1E-3A4A-8717-E6D9805E8E3F}"/>
+    <dgm:cxn modelId="{49D8C1EC-7D3F-1F4B-B0ED-14C8C1B18C8E}" type="presOf" srcId="{D42C4EE4-E249-7E48-A38E-2673B061EB84}" destId="{62379BC7-9828-7847-A34F-DDA81D1939A4}" srcOrd="0" destOrd="0" presId="urn:microsoft.com/office/officeart/2005/8/layout/hierarchy2"/>
+    <dgm:cxn modelId="{3E832DED-72B7-B947-A2C4-3D2B80EEB219}" type="presOf" srcId="{A8896D54-C67A-4543-8201-13399C4373E2}" destId="{C1167922-3768-2D45-987B-896212720A5E}" srcOrd="0" destOrd="0" presId="urn:microsoft.com/office/officeart/2005/8/layout/hierarchy2"/>
+    <dgm:cxn modelId="{1AD5B4FA-C7FB-9F4B-A530-976BE3AC6C1B}" type="presOf" srcId="{F36A8376-A4D2-B249-95EC-87005FE71F01}" destId="{01BCD2FF-3AFA-774B-93DB-A88491D6C6F5}" srcOrd="1" destOrd="0" presId="urn:microsoft.com/office/officeart/2005/8/layout/hierarchy2"/>
+    <dgm:cxn modelId="{302F11FB-E645-3C4B-99CA-89A7E229F3E4}" srcId="{882028BF-CCB9-CA48-A9EE-DFFC7B9EC40F}" destId="{D42C4EE4-E249-7E48-A38E-2673B061EB84}" srcOrd="2" destOrd="0" parTransId="{F36A8376-A4D2-B249-95EC-87005FE71F01}" sibTransId="{51FF7843-F570-CC4A-9662-67F9F2950F88}"/>
     <dgm:cxn modelId="{E25B4317-8597-DE4C-B193-B410F1BBE711}" type="presParOf" srcId="{C1167922-3768-2D45-987B-896212720A5E}" destId="{EC58883F-CC83-774A-815B-BE6E579D3593}" srcOrd="0" destOrd="0" presId="urn:microsoft.com/office/officeart/2005/8/layout/hierarchy2"/>
     <dgm:cxn modelId="{D2E29717-EF13-534E-A7E8-B967A5400651}" type="presParOf" srcId="{EC58883F-CC83-774A-815B-BE6E579D3593}" destId="{DB605A66-2A81-DD43-9688-844B4CC04D59}" srcOrd="0" destOrd="0" presId="urn:microsoft.com/office/officeart/2005/8/layout/hierarchy2"/>
     <dgm:cxn modelId="{9442224E-9CF0-0840-B7BC-6E670077BC09}" type="presParOf" srcId="{EC58883F-CC83-774A-815B-BE6E579D3593}" destId="{FD8D2443-7368-DD43-8D1B-414334BE9FFE}" srcOrd="1" destOrd="0" presId="urn:microsoft.com/office/officeart/2005/8/layout/hierarchy2"/>
@@ -5712,14 +5627,13 @@
         <a:lstStyle/>
         <a:p>
           <a:r>
-            <a:rPr lang="en-US" dirty="0" err="1" smtClean="0"/>
+            <a:rPr lang="en-US" dirty="0" err="1"/>
             <a:t>Raíz</a:t>
           </a:r>
           <a:r>
-            <a:rPr lang="en-US" dirty="0" smtClean="0"/>
+            <a:rPr lang="en-US" dirty="0"/>
             <a:t> (.)</a:t>
           </a:r>
-          <a:endParaRPr lang="en-US" dirty="0"/>
         </a:p>
       </dgm:t>
     </dgm:pt>
@@ -5753,10 +5667,9 @@
         <a:lstStyle/>
         <a:p>
           <a:r>
-            <a:rPr lang="en-US" dirty="0" smtClean="0"/>
+            <a:rPr lang="en-US" dirty="0"/>
             <a:t>com, net, org</a:t>
           </a:r>
-          <a:endParaRPr lang="en-US" dirty="0"/>
         </a:p>
       </dgm:t>
     </dgm:pt>
@@ -5790,10 +5703,9 @@
         <a:lstStyle/>
         <a:p>
           <a:r>
-            <a:rPr lang="en-US" dirty="0" smtClean="0"/>
+            <a:rPr lang="en-US" dirty="0"/>
             <a:t>dom1</a:t>
           </a:r>
-          <a:endParaRPr lang="en-US" dirty="0"/>
         </a:p>
       </dgm:t>
     </dgm:pt>
@@ -5827,10 +5739,9 @@
         <a:lstStyle/>
         <a:p>
           <a:r>
-            <a:rPr lang="en-US" dirty="0" smtClean="0"/>
+            <a:rPr lang="en-US" dirty="0"/>
             <a:t>dom2</a:t>
           </a:r>
-          <a:endParaRPr lang="en-US" dirty="0"/>
         </a:p>
       </dgm:t>
     </dgm:pt>
@@ -5864,7 +5775,7 @@
         <a:lstStyle/>
         <a:p>
           <a:r>
-            <a:rPr lang="en-US" dirty="0" err="1" smtClean="0"/>
+            <a:rPr lang="en-US" dirty="0" err="1"/>
             <a:t>arpa</a:t>
           </a:r>
           <a:endParaRPr lang="en-US" dirty="0"/>
@@ -5901,11 +5812,11 @@
         <a:lstStyle/>
         <a:p>
           <a:r>
-            <a:rPr lang="en-US" dirty="0" smtClean="0"/>
+            <a:rPr lang="en-US" dirty="0"/>
             <a:t>in-</a:t>
           </a:r>
           <a:r>
-            <a:rPr lang="en-US" dirty="0" err="1" smtClean="0"/>
+            <a:rPr lang="en-US" dirty="0" err="1"/>
             <a:t>addr</a:t>
           </a:r>
           <a:endParaRPr lang="en-US" dirty="0"/>
@@ -5942,10 +5853,9 @@
         <a:lstStyle/>
         <a:p>
           <a:r>
-            <a:rPr lang="en-US" dirty="0" smtClean="0"/>
+            <a:rPr lang="en-US" dirty="0"/>
             <a:t>Ip6</a:t>
           </a:r>
-          <a:endParaRPr lang="en-US" dirty="0"/>
         </a:p>
       </dgm:t>
     </dgm:pt>
@@ -5979,10 +5889,9 @@
         <a:lstStyle/>
         <a:p>
           <a:r>
-            <a:rPr lang="en-US" dirty="0" smtClean="0"/>
+            <a:rPr lang="en-US" dirty="0"/>
             <a:t>177</a:t>
           </a:r>
-          <a:endParaRPr lang="en-US" dirty="0"/>
         </a:p>
       </dgm:t>
     </dgm:pt>
@@ -6016,10 +5925,9 @@
         <a:lstStyle/>
         <a:p>
           <a:r>
-            <a:rPr lang="en-US" dirty="0" smtClean="0"/>
+            <a:rPr lang="en-US" dirty="0"/>
             <a:t>0.8.2</a:t>
           </a:r>
-          <a:endParaRPr lang="en-US" dirty="0"/>
         </a:p>
       </dgm:t>
     </dgm:pt>
@@ -6056,13 +5964,6 @@
         </dgm:presLayoutVars>
       </dgm:prSet>
       <dgm:spPr/>
-      <dgm:t>
-        <a:bodyPr/>
-        <a:lstStyle/>
-        <a:p>
-          <a:endParaRPr lang="en-US"/>
-        </a:p>
-      </dgm:t>
     </dgm:pt>
     <dgm:pt modelId="{23FFA827-5EFD-AB4E-98DA-DE8C1C344CCE}" type="pres">
       <dgm:prSet presAssocID="{C2D3F37D-D9DD-D947-B7D4-E6C4BA2EADA0}" presName="hierRoot1" presStyleCnt="0"/>
@@ -6083,13 +5984,6 @@
         </dgm:presLayoutVars>
       </dgm:prSet>
       <dgm:spPr/>
-      <dgm:t>
-        <a:bodyPr/>
-        <a:lstStyle/>
-        <a:p>
-          <a:endParaRPr lang="en-US"/>
-        </a:p>
-      </dgm:t>
     </dgm:pt>
     <dgm:pt modelId="{10EB3560-F29C-4D40-A8BE-5D054854DDE5}" type="pres">
       <dgm:prSet presAssocID="{C2D3F37D-D9DD-D947-B7D4-E6C4BA2EADA0}" presName="hierChild2" presStyleCnt="0"/>
@@ -6098,13 +5992,6 @@
     <dgm:pt modelId="{09905DF9-C207-7C45-8E9C-534F5C65DFF6}" type="pres">
       <dgm:prSet presAssocID="{B1F26535-9B55-C547-A8BE-E3105B835D8D}" presName="Name10" presStyleLbl="parChTrans1D2" presStyleIdx="0" presStyleCnt="2"/>
       <dgm:spPr/>
-      <dgm:t>
-        <a:bodyPr/>
-        <a:lstStyle/>
-        <a:p>
-          <a:endParaRPr lang="en-US"/>
-        </a:p>
-      </dgm:t>
     </dgm:pt>
     <dgm:pt modelId="{34015561-B361-AD41-A661-E9752D035C81}" type="pres">
       <dgm:prSet presAssocID="{647D90F6-5AF1-204A-AB92-354A58078878}" presName="hierRoot2" presStyleCnt="0"/>
@@ -6125,13 +6012,6 @@
         </dgm:presLayoutVars>
       </dgm:prSet>
       <dgm:spPr/>
-      <dgm:t>
-        <a:bodyPr/>
-        <a:lstStyle/>
-        <a:p>
-          <a:endParaRPr lang="en-US"/>
-        </a:p>
-      </dgm:t>
     </dgm:pt>
     <dgm:pt modelId="{1C5699C2-74DB-794F-BD40-03B2CE43036C}" type="pres">
       <dgm:prSet presAssocID="{647D90F6-5AF1-204A-AB92-354A58078878}" presName="hierChild3" presStyleCnt="0"/>
@@ -6140,13 +6020,6 @@
     <dgm:pt modelId="{23A4A0CC-05ED-5645-9DC2-D5F20E3BE572}" type="pres">
       <dgm:prSet presAssocID="{35AB792A-0E89-284E-BFEF-FAC639ED1476}" presName="Name17" presStyleLbl="parChTrans1D3" presStyleIdx="0" presStyleCnt="4"/>
       <dgm:spPr/>
-      <dgm:t>
-        <a:bodyPr/>
-        <a:lstStyle/>
-        <a:p>
-          <a:endParaRPr lang="en-US"/>
-        </a:p>
-      </dgm:t>
     </dgm:pt>
     <dgm:pt modelId="{9D5E0416-4107-D046-8283-16A91D413D26}" type="pres">
       <dgm:prSet presAssocID="{321336F9-89D2-8A4D-987F-51457EA2FAD5}" presName="hierRoot3" presStyleCnt="0"/>
@@ -6167,13 +6040,6 @@
         </dgm:presLayoutVars>
       </dgm:prSet>
       <dgm:spPr/>
-      <dgm:t>
-        <a:bodyPr/>
-        <a:lstStyle/>
-        <a:p>
-          <a:endParaRPr lang="en-US"/>
-        </a:p>
-      </dgm:t>
     </dgm:pt>
     <dgm:pt modelId="{613DA49E-2A67-0248-BA79-D23990C62D35}" type="pres">
       <dgm:prSet presAssocID="{321336F9-89D2-8A4D-987F-51457EA2FAD5}" presName="hierChild4" presStyleCnt="0"/>
@@ -6182,13 +6048,6 @@
     <dgm:pt modelId="{29343AAC-28C0-2F4C-957B-CF3D5990994D}" type="pres">
       <dgm:prSet presAssocID="{702AF669-2811-C249-9396-5AD5C1B6425A}" presName="Name17" presStyleLbl="parChTrans1D3" presStyleIdx="1" presStyleCnt="4"/>
       <dgm:spPr/>
-      <dgm:t>
-        <a:bodyPr/>
-        <a:lstStyle/>
-        <a:p>
-          <a:endParaRPr lang="en-US"/>
-        </a:p>
-      </dgm:t>
     </dgm:pt>
     <dgm:pt modelId="{9B39CD45-1F9D-6246-B8F2-40F0D8913757}" type="pres">
       <dgm:prSet presAssocID="{912A98DA-949A-E246-A8B4-126347F3EEA5}" presName="hierRoot3" presStyleCnt="0"/>
@@ -6209,13 +6068,6 @@
         </dgm:presLayoutVars>
       </dgm:prSet>
       <dgm:spPr/>
-      <dgm:t>
-        <a:bodyPr/>
-        <a:lstStyle/>
-        <a:p>
-          <a:endParaRPr lang="en-US"/>
-        </a:p>
-      </dgm:t>
     </dgm:pt>
     <dgm:pt modelId="{AB56A8AD-DACE-0541-823E-714E1B1B8A7C}" type="pres">
       <dgm:prSet presAssocID="{912A98DA-949A-E246-A8B4-126347F3EEA5}" presName="hierChild4" presStyleCnt="0"/>
@@ -6224,13 +6076,6 @@
     <dgm:pt modelId="{A48127BC-1D32-A542-9B28-88A975663D96}" type="pres">
       <dgm:prSet presAssocID="{86E2D74A-ADCE-3946-89EF-093B6FCA5976}" presName="Name10" presStyleLbl="parChTrans1D2" presStyleIdx="1" presStyleCnt="2"/>
       <dgm:spPr/>
-      <dgm:t>
-        <a:bodyPr/>
-        <a:lstStyle/>
-        <a:p>
-          <a:endParaRPr lang="en-US"/>
-        </a:p>
-      </dgm:t>
     </dgm:pt>
     <dgm:pt modelId="{8F264EA6-E5BF-E546-8C63-CCD45FB17697}" type="pres">
       <dgm:prSet presAssocID="{6988337F-91DD-394F-9A74-FD33DDA5A567}" presName="hierRoot2" presStyleCnt="0"/>
@@ -6251,13 +6096,6 @@
         </dgm:presLayoutVars>
       </dgm:prSet>
       <dgm:spPr/>
-      <dgm:t>
-        <a:bodyPr/>
-        <a:lstStyle/>
-        <a:p>
-          <a:endParaRPr lang="en-US"/>
-        </a:p>
-      </dgm:t>
     </dgm:pt>
     <dgm:pt modelId="{37B3F5A5-46D5-7847-8B11-B1861F242A05}" type="pres">
       <dgm:prSet presAssocID="{6988337F-91DD-394F-9A74-FD33DDA5A567}" presName="hierChild3" presStyleCnt="0"/>
@@ -6266,13 +6104,6 @@
     <dgm:pt modelId="{D21AED92-83AC-DC41-BE5A-8677FEF76A1C}" type="pres">
       <dgm:prSet presAssocID="{73E6D2F5-89DD-C04A-BE00-62E043B4A88B}" presName="Name17" presStyleLbl="parChTrans1D3" presStyleIdx="2" presStyleCnt="4"/>
       <dgm:spPr/>
-      <dgm:t>
-        <a:bodyPr/>
-        <a:lstStyle/>
-        <a:p>
-          <a:endParaRPr lang="en-US"/>
-        </a:p>
-      </dgm:t>
     </dgm:pt>
     <dgm:pt modelId="{5432F137-CC9F-F644-953E-206A6E984B40}" type="pres">
       <dgm:prSet presAssocID="{B00810F7-60CA-7B40-B5CB-4816FBC561BC}" presName="hierRoot3" presStyleCnt="0"/>
@@ -6293,13 +6124,6 @@
         </dgm:presLayoutVars>
       </dgm:prSet>
       <dgm:spPr/>
-      <dgm:t>
-        <a:bodyPr/>
-        <a:lstStyle/>
-        <a:p>
-          <a:endParaRPr lang="en-US"/>
-        </a:p>
-      </dgm:t>
     </dgm:pt>
     <dgm:pt modelId="{A7DEEF7F-C9FF-FC44-81F5-269B8AEA408F}" type="pres">
       <dgm:prSet presAssocID="{B00810F7-60CA-7B40-B5CB-4816FBC561BC}" presName="hierChild4" presStyleCnt="0"/>
@@ -6308,13 +6132,6 @@
     <dgm:pt modelId="{20B6F93A-4286-B348-BD3D-752123CDAF4A}" type="pres">
       <dgm:prSet presAssocID="{EA73CF5D-2383-F945-B6A9-FAEEE4326717}" presName="Name23" presStyleLbl="parChTrans1D4" presStyleIdx="0" presStyleCnt="2"/>
       <dgm:spPr/>
-      <dgm:t>
-        <a:bodyPr/>
-        <a:lstStyle/>
-        <a:p>
-          <a:endParaRPr lang="en-US"/>
-        </a:p>
-      </dgm:t>
     </dgm:pt>
     <dgm:pt modelId="{BC5DF14B-3408-7544-A154-18E49E854A0E}" type="pres">
       <dgm:prSet presAssocID="{420253DA-B5C3-F44A-BA26-12E3349C9ACA}" presName="hierRoot4" presStyleCnt="0"/>
@@ -6335,13 +6152,6 @@
         </dgm:presLayoutVars>
       </dgm:prSet>
       <dgm:spPr/>
-      <dgm:t>
-        <a:bodyPr/>
-        <a:lstStyle/>
-        <a:p>
-          <a:endParaRPr lang="en-US"/>
-        </a:p>
-      </dgm:t>
     </dgm:pt>
     <dgm:pt modelId="{54656CF7-CC4D-FB4D-8BAF-5270C76A293C}" type="pres">
       <dgm:prSet presAssocID="{420253DA-B5C3-F44A-BA26-12E3349C9ACA}" presName="hierChild5" presStyleCnt="0"/>
@@ -6350,13 +6160,6 @@
     <dgm:pt modelId="{140F0A54-B3FA-7E4B-86EB-A843C6B25D4C}" type="pres">
       <dgm:prSet presAssocID="{655AFFF4-AC8E-1F4C-84FC-49A4ECC26159}" presName="Name17" presStyleLbl="parChTrans1D3" presStyleIdx="3" presStyleCnt="4"/>
       <dgm:spPr/>
-      <dgm:t>
-        <a:bodyPr/>
-        <a:lstStyle/>
-        <a:p>
-          <a:endParaRPr lang="en-US"/>
-        </a:p>
-      </dgm:t>
     </dgm:pt>
     <dgm:pt modelId="{E6637965-D2F3-3A43-9496-E5280F2CF512}" type="pres">
       <dgm:prSet presAssocID="{9A02B939-554B-464A-B5C0-ACAE7DAD1072}" presName="hierRoot3" presStyleCnt="0"/>
@@ -6377,13 +6180,6 @@
         </dgm:presLayoutVars>
       </dgm:prSet>
       <dgm:spPr/>
-      <dgm:t>
-        <a:bodyPr/>
-        <a:lstStyle/>
-        <a:p>
-          <a:endParaRPr lang="en-US"/>
-        </a:p>
-      </dgm:t>
     </dgm:pt>
     <dgm:pt modelId="{42B0AD2B-1F4E-C44D-8410-9C01463C53FF}" type="pres">
       <dgm:prSet presAssocID="{9A02B939-554B-464A-B5C0-ACAE7DAD1072}" presName="hierChild4" presStyleCnt="0"/>
@@ -6392,13 +6188,6 @@
     <dgm:pt modelId="{A5CB72EE-F72D-3746-ADEF-E2798CBFD5F7}" type="pres">
       <dgm:prSet presAssocID="{0826D219-B316-424A-B172-72637882D9E8}" presName="Name23" presStyleLbl="parChTrans1D4" presStyleIdx="1" presStyleCnt="2"/>
       <dgm:spPr/>
-      <dgm:t>
-        <a:bodyPr/>
-        <a:lstStyle/>
-        <a:p>
-          <a:endParaRPr lang="en-US"/>
-        </a:p>
-      </dgm:t>
     </dgm:pt>
     <dgm:pt modelId="{C466DE68-3392-F340-8CD0-65406AD8D033}" type="pres">
       <dgm:prSet presAssocID="{D6CC40DF-D085-884A-925C-AF82F02B555E}" presName="hierRoot4" presStyleCnt="0"/>
@@ -6419,13 +6208,6 @@
         </dgm:presLayoutVars>
       </dgm:prSet>
       <dgm:spPr/>
-      <dgm:t>
-        <a:bodyPr/>
-        <a:lstStyle/>
-        <a:p>
-          <a:endParaRPr lang="en-US"/>
-        </a:p>
-      </dgm:t>
     </dgm:pt>
     <dgm:pt modelId="{AF038B92-CD86-6F4A-A08F-46961E419A6B}" type="pres">
       <dgm:prSet presAssocID="{D6CC40DF-D085-884A-925C-AF82F02B555E}" presName="hierChild5" presStyleCnt="0"/>
@@ -6433,33 +6215,33 @@
     </dgm:pt>
   </dgm:ptLst>
   <dgm:cxnLst>
+    <dgm:cxn modelId="{BDC76905-F433-B346-9BD9-D67C22703912}" type="presOf" srcId="{9A02B939-554B-464A-B5C0-ACAE7DAD1072}" destId="{48D833B3-84F5-3E4A-AE1D-DC483D5C7E72}" srcOrd="0" destOrd="0" presId="urn:microsoft.com/office/officeart/2005/8/layout/hierarchy1"/>
+    <dgm:cxn modelId="{17F9D51B-3F59-0949-A70A-9CCDAFB2DEEA}" type="presOf" srcId="{655AFFF4-AC8E-1F4C-84FC-49A4ECC26159}" destId="{140F0A54-B3FA-7E4B-86EB-A843C6B25D4C}" srcOrd="0" destOrd="0" presId="urn:microsoft.com/office/officeart/2005/8/layout/hierarchy1"/>
+    <dgm:cxn modelId="{D5D70424-AE46-DD4A-B7E1-9AFDA70D3DC1}" type="presOf" srcId="{4F1EBDA6-0FF3-4E46-B44F-1191394D48CE}" destId="{4EB85A4E-B0F5-734B-9144-4D7A08EF7CDB}" srcOrd="0" destOrd="0" presId="urn:microsoft.com/office/officeart/2005/8/layout/hierarchy1"/>
+    <dgm:cxn modelId="{4AD8D138-9B3A-6344-A818-83493CD95BA0}" type="presOf" srcId="{D6CC40DF-D085-884A-925C-AF82F02B555E}" destId="{33B9C726-5306-5449-8227-4362FEB4E636}" srcOrd="0" destOrd="0" presId="urn:microsoft.com/office/officeart/2005/8/layout/hierarchy1"/>
+    <dgm:cxn modelId="{A2D55B3A-D340-944E-A6A9-3560390CF698}" srcId="{9A02B939-554B-464A-B5C0-ACAE7DAD1072}" destId="{D6CC40DF-D085-884A-925C-AF82F02B555E}" srcOrd="0" destOrd="0" parTransId="{0826D219-B316-424A-B172-72637882D9E8}" sibTransId="{10B8DA9B-1991-6A41-A68F-9965738B356F}"/>
     <dgm:cxn modelId="{E602354A-1DF2-7046-8FA5-E5049FE7C6D0}" srcId="{4F1EBDA6-0FF3-4E46-B44F-1191394D48CE}" destId="{C2D3F37D-D9DD-D947-B7D4-E6C4BA2EADA0}" srcOrd="0" destOrd="0" parTransId="{5490F66C-1198-AB46-8AB0-7C5953EA9E74}" sibTransId="{00699A99-2E56-7148-B40D-38015C6DEE62}"/>
+    <dgm:cxn modelId="{A6B3B556-9440-124E-9741-B65360F010B4}" srcId="{647D90F6-5AF1-204A-AB92-354A58078878}" destId="{912A98DA-949A-E246-A8B4-126347F3EEA5}" srcOrd="1" destOrd="0" parTransId="{702AF669-2811-C249-9396-5AD5C1B6425A}" sibTransId="{D236D6E0-8DC6-6C49-9327-9E39D1F3925A}"/>
+    <dgm:cxn modelId="{627E845D-BC96-5F41-8E3A-6A4A5B9164ED}" type="presOf" srcId="{C2D3F37D-D9DD-D947-B7D4-E6C4BA2EADA0}" destId="{54CB0C0E-DBAB-4A41-A445-CCD7B3FC2049}" srcOrd="0" destOrd="0" presId="urn:microsoft.com/office/officeart/2005/8/layout/hierarchy1"/>
+    <dgm:cxn modelId="{C8497B63-99DD-4946-A235-D306815E7A8F}" type="presOf" srcId="{EA73CF5D-2383-F945-B6A9-FAEEE4326717}" destId="{20B6F93A-4286-B348-BD3D-752123CDAF4A}" srcOrd="0" destOrd="0" presId="urn:microsoft.com/office/officeart/2005/8/layout/hierarchy1"/>
     <dgm:cxn modelId="{71A3B87A-576B-F245-B61F-D5B75F87DB3F}" type="presOf" srcId="{912A98DA-949A-E246-A8B4-126347F3EEA5}" destId="{5F0BF165-ABB9-A549-A485-9700D564558A}" srcOrd="0" destOrd="0" presId="urn:microsoft.com/office/officeart/2005/8/layout/hierarchy1"/>
-    <dgm:cxn modelId="{A6B3B556-9440-124E-9741-B65360F010B4}" srcId="{647D90F6-5AF1-204A-AB92-354A58078878}" destId="{912A98DA-949A-E246-A8B4-126347F3EEA5}" srcOrd="1" destOrd="0" parTransId="{702AF669-2811-C249-9396-5AD5C1B6425A}" sibTransId="{D236D6E0-8DC6-6C49-9327-9E39D1F3925A}"/>
-    <dgm:cxn modelId="{7FA314C6-812C-4648-9A44-2D000EBE4DFF}" type="presOf" srcId="{321336F9-89D2-8A4D-987F-51457EA2FAD5}" destId="{767D958C-2DF8-1D49-A14E-633E23476F82}" srcOrd="0" destOrd="0" presId="urn:microsoft.com/office/officeart/2005/8/layout/hierarchy1"/>
-    <dgm:cxn modelId="{771200A0-5E85-AA41-AD10-F6041F0B68FA}" type="presOf" srcId="{6988337F-91DD-394F-9A74-FD33DDA5A567}" destId="{25340BE3-F0D6-6A4A-AABB-247A8291EAF2}" srcOrd="0" destOrd="0" presId="urn:microsoft.com/office/officeart/2005/8/layout/hierarchy1"/>
-    <dgm:cxn modelId="{627E845D-BC96-5F41-8E3A-6A4A5B9164ED}" type="presOf" srcId="{C2D3F37D-D9DD-D947-B7D4-E6C4BA2EADA0}" destId="{54CB0C0E-DBAB-4A41-A445-CCD7B3FC2049}" srcOrd="0" destOrd="0" presId="urn:microsoft.com/office/officeart/2005/8/layout/hierarchy1"/>
-    <dgm:cxn modelId="{500294F5-B96B-E44E-973E-C1097CC47564}" type="presOf" srcId="{35AB792A-0E89-284E-BFEF-FAC639ED1476}" destId="{23A4A0CC-05ED-5645-9DC2-D5F20E3BE572}" srcOrd="0" destOrd="0" presId="urn:microsoft.com/office/officeart/2005/8/layout/hierarchy1"/>
-    <dgm:cxn modelId="{17F9D51B-3F59-0949-A70A-9CCDAFB2DEEA}" type="presOf" srcId="{655AFFF4-AC8E-1F4C-84FC-49A4ECC26159}" destId="{140F0A54-B3FA-7E4B-86EB-A843C6B25D4C}" srcOrd="0" destOrd="0" presId="urn:microsoft.com/office/officeart/2005/8/layout/hierarchy1"/>
-    <dgm:cxn modelId="{7E7642F8-9708-104B-B82F-D7A22B6818EA}" srcId="{647D90F6-5AF1-204A-AB92-354A58078878}" destId="{321336F9-89D2-8A4D-987F-51457EA2FAD5}" srcOrd="0" destOrd="0" parTransId="{35AB792A-0E89-284E-BFEF-FAC639ED1476}" sibTransId="{BA2CC2AC-B721-C844-89D4-0DADFF00BBF3}"/>
-    <dgm:cxn modelId="{A2D55B3A-D340-944E-A6A9-3560390CF698}" srcId="{9A02B939-554B-464A-B5C0-ACAE7DAD1072}" destId="{D6CC40DF-D085-884A-925C-AF82F02B555E}" srcOrd="0" destOrd="0" parTransId="{0826D219-B316-424A-B172-72637882D9E8}" sibTransId="{10B8DA9B-1991-6A41-A68F-9965738B356F}"/>
-    <dgm:cxn modelId="{D9E503B6-6710-6144-9792-B8C56B065C4F}" srcId="{B00810F7-60CA-7B40-B5CB-4816FBC561BC}" destId="{420253DA-B5C3-F44A-BA26-12E3349C9ACA}" srcOrd="0" destOrd="0" parTransId="{EA73CF5D-2383-F945-B6A9-FAEEE4326717}" sibTransId="{DEED8285-670D-1442-97B3-EAE299959C4D}"/>
     <dgm:cxn modelId="{3BAF7082-10C6-B646-9FEE-039BB0CFC95C}" srcId="{6988337F-91DD-394F-9A74-FD33DDA5A567}" destId="{9A02B939-554B-464A-B5C0-ACAE7DAD1072}" srcOrd="1" destOrd="0" parTransId="{655AFFF4-AC8E-1F4C-84FC-49A4ECC26159}" sibTransId="{255F02E8-C0F1-6D4F-B552-BDE1A4687825}"/>
     <dgm:cxn modelId="{C5FF3E86-BE30-FA45-91A6-D09B47A12CBF}" type="presOf" srcId="{73E6D2F5-89DD-C04A-BE00-62E043B4A88B}" destId="{D21AED92-83AC-DC41-BE5A-8677FEF76A1C}" srcOrd="0" destOrd="0" presId="urn:microsoft.com/office/officeart/2005/8/layout/hierarchy1"/>
+    <dgm:cxn modelId="{34D4A396-5D37-3740-A1E7-85AD06ACF6DA}" srcId="{C2D3F37D-D9DD-D947-B7D4-E6C4BA2EADA0}" destId="{6988337F-91DD-394F-9A74-FD33DDA5A567}" srcOrd="1" destOrd="0" parTransId="{86E2D74A-ADCE-3946-89EF-093B6FCA5976}" sibTransId="{FC6E756D-20F5-0246-BE12-FC62A67212A8}"/>
+    <dgm:cxn modelId="{FF257E97-1889-DA4A-B728-44498A4242EC}" srcId="{C2D3F37D-D9DD-D947-B7D4-E6C4BA2EADA0}" destId="{647D90F6-5AF1-204A-AB92-354A58078878}" srcOrd="0" destOrd="0" parTransId="{B1F26535-9B55-C547-A8BE-E3105B835D8D}" sibTransId="{FE348C27-B4CD-8648-8F67-7EAE644EE035}"/>
+    <dgm:cxn modelId="{2D29669C-2AEA-9246-AB4B-8B9B162E48EE}" type="presOf" srcId="{0826D219-B316-424A-B172-72637882D9E8}" destId="{A5CB72EE-F72D-3746-ADEF-E2798CBFD5F7}" srcOrd="0" destOrd="0" presId="urn:microsoft.com/office/officeart/2005/8/layout/hierarchy1"/>
+    <dgm:cxn modelId="{771200A0-5E85-AA41-AD10-F6041F0B68FA}" type="presOf" srcId="{6988337F-91DD-394F-9A74-FD33DDA5A567}" destId="{25340BE3-F0D6-6A4A-AABB-247A8291EAF2}" srcOrd="0" destOrd="0" presId="urn:microsoft.com/office/officeart/2005/8/layout/hierarchy1"/>
+    <dgm:cxn modelId="{ACB0D9A6-B118-4340-87CC-1247116AC203}" type="presOf" srcId="{647D90F6-5AF1-204A-AB92-354A58078878}" destId="{B3D39107-6BA5-DA40-9943-4B2C7EDF1596}" srcOrd="0" destOrd="0" presId="urn:microsoft.com/office/officeart/2005/8/layout/hierarchy1"/>
+    <dgm:cxn modelId="{99FBD9A8-2A65-074A-BC32-185F85626D48}" type="presOf" srcId="{B1F26535-9B55-C547-A8BE-E3105B835D8D}" destId="{09905DF9-C207-7C45-8E9C-534F5C65DFF6}" srcOrd="0" destOrd="0" presId="urn:microsoft.com/office/officeart/2005/8/layout/hierarchy1"/>
     <dgm:cxn modelId="{47C961AB-BDA7-F748-AA69-32F568079594}" srcId="{6988337F-91DD-394F-9A74-FD33DDA5A567}" destId="{B00810F7-60CA-7B40-B5CB-4816FBC561BC}" srcOrd="0" destOrd="0" parTransId="{73E6D2F5-89DD-C04A-BE00-62E043B4A88B}" sibTransId="{F9034B44-D05F-9748-8C6F-06F2112F7722}"/>
+    <dgm:cxn modelId="{D9E503B6-6710-6144-9792-B8C56B065C4F}" srcId="{B00810F7-60CA-7B40-B5CB-4816FBC561BC}" destId="{420253DA-B5C3-F44A-BA26-12E3349C9ACA}" srcOrd="0" destOrd="0" parTransId="{EA73CF5D-2383-F945-B6A9-FAEEE4326717}" sibTransId="{DEED8285-670D-1442-97B3-EAE299959C4D}"/>
+    <dgm:cxn modelId="{9207DABC-E421-ED4B-8566-1048CAD7BDFF}" type="presOf" srcId="{86E2D74A-ADCE-3946-89EF-093B6FCA5976}" destId="{A48127BC-1D32-A542-9B28-88A975663D96}" srcOrd="0" destOrd="0" presId="urn:microsoft.com/office/officeart/2005/8/layout/hierarchy1"/>
+    <dgm:cxn modelId="{7FA314C6-812C-4648-9A44-2D000EBE4DFF}" type="presOf" srcId="{321336F9-89D2-8A4D-987F-51457EA2FAD5}" destId="{767D958C-2DF8-1D49-A14E-633E23476F82}" srcOrd="0" destOrd="0" presId="urn:microsoft.com/office/officeart/2005/8/layout/hierarchy1"/>
     <dgm:cxn modelId="{B252C8DB-37C5-0548-AB3E-5AEEBAC3B9B8}" type="presOf" srcId="{702AF669-2811-C249-9396-5AD5C1B6425A}" destId="{29343AAC-28C0-2F4C-957B-CF3D5990994D}" srcOrd="0" destOrd="0" presId="urn:microsoft.com/office/officeart/2005/8/layout/hierarchy1"/>
+    <dgm:cxn modelId="{103D9DDD-E1D6-5642-9D42-2C246E8FF57A}" type="presOf" srcId="{420253DA-B5C3-F44A-BA26-12E3349C9ACA}" destId="{4823D33A-F3AC-1141-A957-E782912AFD3D}" srcOrd="0" destOrd="0" presId="urn:microsoft.com/office/officeart/2005/8/layout/hierarchy1"/>
     <dgm:cxn modelId="{23403DE8-82DB-BB48-B307-A7567EA27FAA}" type="presOf" srcId="{B00810F7-60CA-7B40-B5CB-4816FBC561BC}" destId="{18A07BBE-3EB0-EA4D-9436-1FEE15853FED}" srcOrd="0" destOrd="0" presId="urn:microsoft.com/office/officeart/2005/8/layout/hierarchy1"/>
-    <dgm:cxn modelId="{99FBD9A8-2A65-074A-BC32-185F85626D48}" type="presOf" srcId="{B1F26535-9B55-C547-A8BE-E3105B835D8D}" destId="{09905DF9-C207-7C45-8E9C-534F5C65DFF6}" srcOrd="0" destOrd="0" presId="urn:microsoft.com/office/officeart/2005/8/layout/hierarchy1"/>
-    <dgm:cxn modelId="{BDC76905-F433-B346-9BD9-D67C22703912}" type="presOf" srcId="{9A02B939-554B-464A-B5C0-ACAE7DAD1072}" destId="{48D833B3-84F5-3E4A-AE1D-DC483D5C7E72}" srcOrd="0" destOrd="0" presId="urn:microsoft.com/office/officeart/2005/8/layout/hierarchy1"/>
-    <dgm:cxn modelId="{FF257E97-1889-DA4A-B728-44498A4242EC}" srcId="{C2D3F37D-D9DD-D947-B7D4-E6C4BA2EADA0}" destId="{647D90F6-5AF1-204A-AB92-354A58078878}" srcOrd="0" destOrd="0" parTransId="{B1F26535-9B55-C547-A8BE-E3105B835D8D}" sibTransId="{FE348C27-B4CD-8648-8F67-7EAE644EE035}"/>
-    <dgm:cxn modelId="{9207DABC-E421-ED4B-8566-1048CAD7BDFF}" type="presOf" srcId="{86E2D74A-ADCE-3946-89EF-093B6FCA5976}" destId="{A48127BC-1D32-A542-9B28-88A975663D96}" srcOrd="0" destOrd="0" presId="urn:microsoft.com/office/officeart/2005/8/layout/hierarchy1"/>
-    <dgm:cxn modelId="{34D4A396-5D37-3740-A1E7-85AD06ACF6DA}" srcId="{C2D3F37D-D9DD-D947-B7D4-E6C4BA2EADA0}" destId="{6988337F-91DD-394F-9A74-FD33DDA5A567}" srcOrd="1" destOrd="0" parTransId="{86E2D74A-ADCE-3946-89EF-093B6FCA5976}" sibTransId="{FC6E756D-20F5-0246-BE12-FC62A67212A8}"/>
-    <dgm:cxn modelId="{103D9DDD-E1D6-5642-9D42-2C246E8FF57A}" type="presOf" srcId="{420253DA-B5C3-F44A-BA26-12E3349C9ACA}" destId="{4823D33A-F3AC-1141-A957-E782912AFD3D}" srcOrd="0" destOrd="0" presId="urn:microsoft.com/office/officeart/2005/8/layout/hierarchy1"/>
-    <dgm:cxn modelId="{C8497B63-99DD-4946-A235-D306815E7A8F}" type="presOf" srcId="{EA73CF5D-2383-F945-B6A9-FAEEE4326717}" destId="{20B6F93A-4286-B348-BD3D-752123CDAF4A}" srcOrd="0" destOrd="0" presId="urn:microsoft.com/office/officeart/2005/8/layout/hierarchy1"/>
-    <dgm:cxn modelId="{2D29669C-2AEA-9246-AB4B-8B9B162E48EE}" type="presOf" srcId="{0826D219-B316-424A-B172-72637882D9E8}" destId="{A5CB72EE-F72D-3746-ADEF-E2798CBFD5F7}" srcOrd="0" destOrd="0" presId="urn:microsoft.com/office/officeart/2005/8/layout/hierarchy1"/>
-    <dgm:cxn modelId="{4AD8D138-9B3A-6344-A818-83493CD95BA0}" type="presOf" srcId="{D6CC40DF-D085-884A-925C-AF82F02B555E}" destId="{33B9C726-5306-5449-8227-4362FEB4E636}" srcOrd="0" destOrd="0" presId="urn:microsoft.com/office/officeart/2005/8/layout/hierarchy1"/>
-    <dgm:cxn modelId="{D5D70424-AE46-DD4A-B7E1-9AFDA70D3DC1}" type="presOf" srcId="{4F1EBDA6-0FF3-4E46-B44F-1191394D48CE}" destId="{4EB85A4E-B0F5-734B-9144-4D7A08EF7CDB}" srcOrd="0" destOrd="0" presId="urn:microsoft.com/office/officeart/2005/8/layout/hierarchy1"/>
-    <dgm:cxn modelId="{ACB0D9A6-B118-4340-87CC-1247116AC203}" type="presOf" srcId="{647D90F6-5AF1-204A-AB92-354A58078878}" destId="{B3D39107-6BA5-DA40-9943-4B2C7EDF1596}" srcOrd="0" destOrd="0" presId="urn:microsoft.com/office/officeart/2005/8/layout/hierarchy1"/>
+    <dgm:cxn modelId="{500294F5-B96B-E44E-973E-C1097CC47564}" type="presOf" srcId="{35AB792A-0E89-284E-BFEF-FAC639ED1476}" destId="{23A4A0CC-05ED-5645-9DC2-D5F20E3BE572}" srcOrd="0" destOrd="0" presId="urn:microsoft.com/office/officeart/2005/8/layout/hierarchy1"/>
+    <dgm:cxn modelId="{7E7642F8-9708-104B-B82F-D7A22B6818EA}" srcId="{647D90F6-5AF1-204A-AB92-354A58078878}" destId="{321336F9-89D2-8A4D-987F-51457EA2FAD5}" srcOrd="0" destOrd="0" parTransId="{35AB792A-0E89-284E-BFEF-FAC639ED1476}" sibTransId="{BA2CC2AC-B721-C844-89D4-0DADFF00BBF3}"/>
     <dgm:cxn modelId="{0B188B16-2A55-3E47-ABF8-26F875FD0577}" type="presParOf" srcId="{4EB85A4E-B0F5-734B-9144-4D7A08EF7CDB}" destId="{23FFA827-5EFD-AB4E-98DA-DE8C1C344CCE}" srcOrd="0" destOrd="0" presId="urn:microsoft.com/office/officeart/2005/8/layout/hierarchy1"/>
     <dgm:cxn modelId="{C4CBC814-C7A2-2241-90EA-61C1E456B3D4}" type="presParOf" srcId="{23FFA827-5EFD-AB4E-98DA-DE8C1C344CCE}" destId="{D2DD95EE-32D9-CD44-AA5F-80FAC745567C}" srcOrd="0" destOrd="0" presId="urn:microsoft.com/office/officeart/2005/8/layout/hierarchy1"/>
     <dgm:cxn modelId="{A34EEECC-A462-184A-ABF4-46F8099284C5}" type="presParOf" srcId="{D2DD95EE-32D9-CD44-AA5F-80FAC745567C}" destId="{34DC9CC0-61AD-3848-9E46-B9EAE400EC5D}" srcOrd="0" destOrd="0" presId="urn:microsoft.com/office/officeart/2005/8/layout/hierarchy1"/>
@@ -6546,11 +6328,11 @@
         <a:lstStyle/>
         <a:p>
           <a:r>
-            <a:rPr lang="en-US" dirty="0" smtClean="0"/>
+            <a:rPr lang="en-US" dirty="0"/>
             <a:t>in-</a:t>
           </a:r>
           <a:r>
-            <a:rPr lang="en-US" dirty="0" err="1" smtClean="0"/>
+            <a:rPr lang="en-US" dirty="0" err="1"/>
             <a:t>addr.arpa</a:t>
           </a:r>
           <a:endParaRPr lang="en-US" dirty="0"/>
@@ -6587,10 +6369,9 @@
         <a:lstStyle/>
         <a:p>
           <a:r>
-            <a:rPr lang="en-US" dirty="0" smtClean="0"/>
+            <a:rPr lang="en-US" dirty="0"/>
             <a:t>177</a:t>
           </a:r>
-          <a:endParaRPr lang="en-US" dirty="0"/>
         </a:p>
       </dgm:t>
     </dgm:pt>
@@ -6624,10 +6405,9 @@
         <a:lstStyle/>
         <a:p>
           <a:r>
-            <a:rPr lang="en-US" dirty="0" smtClean="0"/>
+            <a:rPr lang="en-US" dirty="0"/>
             <a:t>1</a:t>
           </a:r>
-          <a:endParaRPr lang="en-US" dirty="0"/>
         </a:p>
       </dgm:t>
     </dgm:pt>
@@ -6661,10 +6441,9 @@
         <a:lstStyle/>
         <a:p>
           <a:r>
-            <a:rPr lang="en-US" dirty="0" smtClean="0"/>
+            <a:rPr lang="en-US" dirty="0"/>
             <a:t>2</a:t>
           </a:r>
-          <a:endParaRPr lang="en-US" dirty="0"/>
         </a:p>
       </dgm:t>
     </dgm:pt>
@@ -6698,10 +6477,9 @@
         <a:lstStyle/>
         <a:p>
           <a:r>
-            <a:rPr lang="en-US" dirty="0" smtClean="0"/>
+            <a:rPr lang="en-US" dirty="0"/>
             <a:t>181</a:t>
           </a:r>
-          <a:endParaRPr lang="en-US" dirty="0"/>
         </a:p>
       </dgm:t>
     </dgm:pt>
@@ -6735,10 +6513,9 @@
         <a:lstStyle/>
         <a:p>
           <a:r>
-            <a:rPr lang="en-US" dirty="0" smtClean="0"/>
+            <a:rPr lang="en-US" dirty="0"/>
             <a:t>1</a:t>
           </a:r>
-          <a:endParaRPr lang="en-US" dirty="0"/>
         </a:p>
       </dgm:t>
     </dgm:pt>
@@ -6772,10 +6549,9 @@
         <a:lstStyle/>
         <a:p>
           <a:r>
-            <a:rPr lang="en-US" dirty="0" smtClean="0"/>
+            <a:rPr lang="en-US" dirty="0"/>
             <a:t>2</a:t>
           </a:r>
-          <a:endParaRPr lang="en-US" dirty="0"/>
         </a:p>
       </dgm:t>
     </dgm:pt>
@@ -6809,10 +6585,9 @@
         <a:lstStyle/>
         <a:p>
           <a:r>
-            <a:rPr lang="en-US" dirty="0" smtClean="0"/>
+            <a:rPr lang="en-US" dirty="0"/>
             <a:t>24</a:t>
           </a:r>
-          <a:endParaRPr lang="en-US" dirty="0"/>
         </a:p>
       </dgm:t>
     </dgm:pt>
@@ -6846,10 +6621,9 @@
         <a:lstStyle/>
         <a:p>
           <a:r>
-            <a:rPr lang="en-US" dirty="0" smtClean="0"/>
+            <a:rPr lang="en-US" dirty="0"/>
             <a:t>36</a:t>
           </a:r>
-          <a:endParaRPr lang="en-US" dirty="0"/>
         </a:p>
       </dgm:t>
     </dgm:pt>
@@ -6886,13 +6660,6 @@
         </dgm:presLayoutVars>
       </dgm:prSet>
       <dgm:spPr/>
-      <dgm:t>
-        <a:bodyPr/>
-        <a:lstStyle/>
-        <a:p>
-          <a:endParaRPr lang="en-US"/>
-        </a:p>
-      </dgm:t>
     </dgm:pt>
     <dgm:pt modelId="{23FFA827-5EFD-AB4E-98DA-DE8C1C344CCE}" type="pres">
       <dgm:prSet presAssocID="{C2D3F37D-D9DD-D947-B7D4-E6C4BA2EADA0}" presName="hierRoot1" presStyleCnt="0"/>
@@ -6913,13 +6680,6 @@
         </dgm:presLayoutVars>
       </dgm:prSet>
       <dgm:spPr/>
-      <dgm:t>
-        <a:bodyPr/>
-        <a:lstStyle/>
-        <a:p>
-          <a:endParaRPr lang="en-US"/>
-        </a:p>
-      </dgm:t>
     </dgm:pt>
     <dgm:pt modelId="{10EB3560-F29C-4D40-A8BE-5D054854DDE5}" type="pres">
       <dgm:prSet presAssocID="{C2D3F37D-D9DD-D947-B7D4-E6C4BA2EADA0}" presName="hierChild2" presStyleCnt="0"/>
@@ -6928,13 +6688,6 @@
     <dgm:pt modelId="{09905DF9-C207-7C45-8E9C-534F5C65DFF6}" type="pres">
       <dgm:prSet presAssocID="{B1F26535-9B55-C547-A8BE-E3105B835D8D}" presName="Name10" presStyleLbl="parChTrans1D2" presStyleIdx="0" presStyleCnt="2"/>
       <dgm:spPr/>
-      <dgm:t>
-        <a:bodyPr/>
-        <a:lstStyle/>
-        <a:p>
-          <a:endParaRPr lang="en-US"/>
-        </a:p>
-      </dgm:t>
     </dgm:pt>
     <dgm:pt modelId="{34015561-B361-AD41-A661-E9752D035C81}" type="pres">
       <dgm:prSet presAssocID="{647D90F6-5AF1-204A-AB92-354A58078878}" presName="hierRoot2" presStyleCnt="0"/>
@@ -6955,13 +6708,6 @@
         </dgm:presLayoutVars>
       </dgm:prSet>
       <dgm:spPr/>
-      <dgm:t>
-        <a:bodyPr/>
-        <a:lstStyle/>
-        <a:p>
-          <a:endParaRPr lang="en-US"/>
-        </a:p>
-      </dgm:t>
     </dgm:pt>
     <dgm:pt modelId="{1C5699C2-74DB-794F-BD40-03B2CE43036C}" type="pres">
       <dgm:prSet presAssocID="{647D90F6-5AF1-204A-AB92-354A58078878}" presName="hierChild3" presStyleCnt="0"/>
@@ -6970,13 +6716,6 @@
     <dgm:pt modelId="{23A4A0CC-05ED-5645-9DC2-D5F20E3BE572}" type="pres">
       <dgm:prSet presAssocID="{35AB792A-0E89-284E-BFEF-FAC639ED1476}" presName="Name17" presStyleLbl="parChTrans1D3" presStyleIdx="0" presStyleCnt="4"/>
       <dgm:spPr/>
-      <dgm:t>
-        <a:bodyPr/>
-        <a:lstStyle/>
-        <a:p>
-          <a:endParaRPr lang="en-US"/>
-        </a:p>
-      </dgm:t>
     </dgm:pt>
     <dgm:pt modelId="{9D5E0416-4107-D046-8283-16A91D413D26}" type="pres">
       <dgm:prSet presAssocID="{321336F9-89D2-8A4D-987F-51457EA2FAD5}" presName="hierRoot3" presStyleCnt="0"/>
@@ -6997,13 +6736,6 @@
         </dgm:presLayoutVars>
       </dgm:prSet>
       <dgm:spPr/>
-      <dgm:t>
-        <a:bodyPr/>
-        <a:lstStyle/>
-        <a:p>
-          <a:endParaRPr lang="en-US"/>
-        </a:p>
-      </dgm:t>
     </dgm:pt>
     <dgm:pt modelId="{613DA49E-2A67-0248-BA79-D23990C62D35}" type="pres">
       <dgm:prSet presAssocID="{321336F9-89D2-8A4D-987F-51457EA2FAD5}" presName="hierChild4" presStyleCnt="0"/>
@@ -7012,13 +6744,6 @@
     <dgm:pt modelId="{29343AAC-28C0-2F4C-957B-CF3D5990994D}" type="pres">
       <dgm:prSet presAssocID="{702AF669-2811-C249-9396-5AD5C1B6425A}" presName="Name17" presStyleLbl="parChTrans1D3" presStyleIdx="1" presStyleCnt="4"/>
       <dgm:spPr/>
-      <dgm:t>
-        <a:bodyPr/>
-        <a:lstStyle/>
-        <a:p>
-          <a:endParaRPr lang="en-US"/>
-        </a:p>
-      </dgm:t>
     </dgm:pt>
     <dgm:pt modelId="{9B39CD45-1F9D-6246-B8F2-40F0D8913757}" type="pres">
       <dgm:prSet presAssocID="{912A98DA-949A-E246-A8B4-126347F3EEA5}" presName="hierRoot3" presStyleCnt="0"/>
@@ -7039,13 +6764,6 @@
         </dgm:presLayoutVars>
       </dgm:prSet>
       <dgm:spPr/>
-      <dgm:t>
-        <a:bodyPr/>
-        <a:lstStyle/>
-        <a:p>
-          <a:endParaRPr lang="en-US"/>
-        </a:p>
-      </dgm:t>
     </dgm:pt>
     <dgm:pt modelId="{AB56A8AD-DACE-0541-823E-714E1B1B8A7C}" type="pres">
       <dgm:prSet presAssocID="{912A98DA-949A-E246-A8B4-126347F3EEA5}" presName="hierChild4" presStyleCnt="0"/>
@@ -7054,13 +6772,6 @@
     <dgm:pt modelId="{A48127BC-1D32-A542-9B28-88A975663D96}" type="pres">
       <dgm:prSet presAssocID="{86E2D74A-ADCE-3946-89EF-093B6FCA5976}" presName="Name10" presStyleLbl="parChTrans1D2" presStyleIdx="1" presStyleCnt="2"/>
       <dgm:spPr/>
-      <dgm:t>
-        <a:bodyPr/>
-        <a:lstStyle/>
-        <a:p>
-          <a:endParaRPr lang="en-US"/>
-        </a:p>
-      </dgm:t>
     </dgm:pt>
     <dgm:pt modelId="{8F264EA6-E5BF-E546-8C63-CCD45FB17697}" type="pres">
       <dgm:prSet presAssocID="{6988337F-91DD-394F-9A74-FD33DDA5A567}" presName="hierRoot2" presStyleCnt="0"/>
@@ -7081,13 +6792,6 @@
         </dgm:presLayoutVars>
       </dgm:prSet>
       <dgm:spPr/>
-      <dgm:t>
-        <a:bodyPr/>
-        <a:lstStyle/>
-        <a:p>
-          <a:endParaRPr lang="en-US"/>
-        </a:p>
-      </dgm:t>
     </dgm:pt>
     <dgm:pt modelId="{37B3F5A5-46D5-7847-8B11-B1861F242A05}" type="pres">
       <dgm:prSet presAssocID="{6988337F-91DD-394F-9A74-FD33DDA5A567}" presName="hierChild3" presStyleCnt="0"/>
@@ -7096,13 +6800,6 @@
     <dgm:pt modelId="{D21AED92-83AC-DC41-BE5A-8677FEF76A1C}" type="pres">
       <dgm:prSet presAssocID="{73E6D2F5-89DD-C04A-BE00-62E043B4A88B}" presName="Name17" presStyleLbl="parChTrans1D3" presStyleIdx="2" presStyleCnt="4"/>
       <dgm:spPr/>
-      <dgm:t>
-        <a:bodyPr/>
-        <a:lstStyle/>
-        <a:p>
-          <a:endParaRPr lang="en-US"/>
-        </a:p>
-      </dgm:t>
     </dgm:pt>
     <dgm:pt modelId="{5432F137-CC9F-F644-953E-206A6E984B40}" type="pres">
       <dgm:prSet presAssocID="{B00810F7-60CA-7B40-B5CB-4816FBC561BC}" presName="hierRoot3" presStyleCnt="0"/>
@@ -7123,13 +6820,6 @@
         </dgm:presLayoutVars>
       </dgm:prSet>
       <dgm:spPr/>
-      <dgm:t>
-        <a:bodyPr/>
-        <a:lstStyle/>
-        <a:p>
-          <a:endParaRPr lang="en-US"/>
-        </a:p>
-      </dgm:t>
     </dgm:pt>
     <dgm:pt modelId="{A7DEEF7F-C9FF-FC44-81F5-269B8AEA408F}" type="pres">
       <dgm:prSet presAssocID="{B00810F7-60CA-7B40-B5CB-4816FBC561BC}" presName="hierChild4" presStyleCnt="0"/>
@@ -7138,13 +6828,6 @@
     <dgm:pt modelId="{20B6F93A-4286-B348-BD3D-752123CDAF4A}" type="pres">
       <dgm:prSet presAssocID="{EA73CF5D-2383-F945-B6A9-FAEEE4326717}" presName="Name23" presStyleLbl="parChTrans1D4" presStyleIdx="0" presStyleCnt="2"/>
       <dgm:spPr/>
-      <dgm:t>
-        <a:bodyPr/>
-        <a:lstStyle/>
-        <a:p>
-          <a:endParaRPr lang="en-US"/>
-        </a:p>
-      </dgm:t>
     </dgm:pt>
     <dgm:pt modelId="{BC5DF14B-3408-7544-A154-18E49E854A0E}" type="pres">
       <dgm:prSet presAssocID="{420253DA-B5C3-F44A-BA26-12E3349C9ACA}" presName="hierRoot4" presStyleCnt="0"/>
@@ -7165,13 +6848,6 @@
         </dgm:presLayoutVars>
       </dgm:prSet>
       <dgm:spPr/>
-      <dgm:t>
-        <a:bodyPr/>
-        <a:lstStyle/>
-        <a:p>
-          <a:endParaRPr lang="en-US"/>
-        </a:p>
-      </dgm:t>
     </dgm:pt>
     <dgm:pt modelId="{54656CF7-CC4D-FB4D-8BAF-5270C76A293C}" type="pres">
       <dgm:prSet presAssocID="{420253DA-B5C3-F44A-BA26-12E3349C9ACA}" presName="hierChild5" presStyleCnt="0"/>
@@ -7180,13 +6856,6 @@
     <dgm:pt modelId="{140F0A54-B3FA-7E4B-86EB-A843C6B25D4C}" type="pres">
       <dgm:prSet presAssocID="{655AFFF4-AC8E-1F4C-84FC-49A4ECC26159}" presName="Name17" presStyleLbl="parChTrans1D3" presStyleIdx="3" presStyleCnt="4"/>
       <dgm:spPr/>
-      <dgm:t>
-        <a:bodyPr/>
-        <a:lstStyle/>
-        <a:p>
-          <a:endParaRPr lang="en-US"/>
-        </a:p>
-      </dgm:t>
     </dgm:pt>
     <dgm:pt modelId="{E6637965-D2F3-3A43-9496-E5280F2CF512}" type="pres">
       <dgm:prSet presAssocID="{9A02B939-554B-464A-B5C0-ACAE7DAD1072}" presName="hierRoot3" presStyleCnt="0"/>
@@ -7207,13 +6876,6 @@
         </dgm:presLayoutVars>
       </dgm:prSet>
       <dgm:spPr/>
-      <dgm:t>
-        <a:bodyPr/>
-        <a:lstStyle/>
-        <a:p>
-          <a:endParaRPr lang="en-US"/>
-        </a:p>
-      </dgm:t>
     </dgm:pt>
     <dgm:pt modelId="{42B0AD2B-1F4E-C44D-8410-9C01463C53FF}" type="pres">
       <dgm:prSet presAssocID="{9A02B939-554B-464A-B5C0-ACAE7DAD1072}" presName="hierChild4" presStyleCnt="0"/>
@@ -7222,13 +6884,6 @@
     <dgm:pt modelId="{A5CB72EE-F72D-3746-ADEF-E2798CBFD5F7}" type="pres">
       <dgm:prSet presAssocID="{0826D219-B316-424A-B172-72637882D9E8}" presName="Name23" presStyleLbl="parChTrans1D4" presStyleIdx="1" presStyleCnt="2"/>
       <dgm:spPr/>
-      <dgm:t>
-        <a:bodyPr/>
-        <a:lstStyle/>
-        <a:p>
-          <a:endParaRPr lang="en-US"/>
-        </a:p>
-      </dgm:t>
     </dgm:pt>
     <dgm:pt modelId="{C466DE68-3392-F340-8CD0-65406AD8D033}" type="pres">
       <dgm:prSet presAssocID="{D6CC40DF-D085-884A-925C-AF82F02B555E}" presName="hierRoot4" presStyleCnt="0"/>
@@ -7249,13 +6904,6 @@
         </dgm:presLayoutVars>
       </dgm:prSet>
       <dgm:spPr/>
-      <dgm:t>
-        <a:bodyPr/>
-        <a:lstStyle/>
-        <a:p>
-          <a:endParaRPr lang="en-US"/>
-        </a:p>
-      </dgm:t>
     </dgm:pt>
     <dgm:pt modelId="{AF038B92-CD86-6F4A-A08F-46961E419A6B}" type="pres">
       <dgm:prSet presAssocID="{D6CC40DF-D085-884A-925C-AF82F02B555E}" presName="hierChild5" presStyleCnt="0"/>
@@ -7263,33 +6911,33 @@
     </dgm:pt>
   </dgm:ptLst>
   <dgm:cxnLst>
+    <dgm:cxn modelId="{078AFB03-4D59-BB4D-95B9-E16E6075C5AE}" type="presOf" srcId="{C2D3F37D-D9DD-D947-B7D4-E6C4BA2EADA0}" destId="{54CB0C0E-DBAB-4A41-A445-CCD7B3FC2049}" srcOrd="0" destOrd="0" presId="urn:microsoft.com/office/officeart/2005/8/layout/hierarchy1"/>
+    <dgm:cxn modelId="{55358F04-E2D7-644D-958C-9D7937EC8EB2}" type="presOf" srcId="{6988337F-91DD-394F-9A74-FD33DDA5A567}" destId="{25340BE3-F0D6-6A4A-AABB-247A8291EAF2}" srcOrd="0" destOrd="0" presId="urn:microsoft.com/office/officeart/2005/8/layout/hierarchy1"/>
+    <dgm:cxn modelId="{2A56E121-4F20-1142-A9DD-493B5823DA98}" type="presOf" srcId="{0826D219-B316-424A-B172-72637882D9E8}" destId="{A5CB72EE-F72D-3746-ADEF-E2798CBFD5F7}" srcOrd="0" destOrd="0" presId="urn:microsoft.com/office/officeart/2005/8/layout/hierarchy1"/>
+    <dgm:cxn modelId="{FB59E033-6F6F-844B-8DA7-E948D433817F}" type="presOf" srcId="{655AFFF4-AC8E-1F4C-84FC-49A4ECC26159}" destId="{140F0A54-B3FA-7E4B-86EB-A843C6B25D4C}" srcOrd="0" destOrd="0" presId="urn:microsoft.com/office/officeart/2005/8/layout/hierarchy1"/>
+    <dgm:cxn modelId="{C987AE37-5AC3-1A44-83B7-9B1BA449B3FC}" type="presOf" srcId="{B1F26535-9B55-C547-A8BE-E3105B835D8D}" destId="{09905DF9-C207-7C45-8E9C-534F5C65DFF6}" srcOrd="0" destOrd="0" presId="urn:microsoft.com/office/officeart/2005/8/layout/hierarchy1"/>
+    <dgm:cxn modelId="{A2D55B3A-D340-944E-A6A9-3560390CF698}" srcId="{9A02B939-554B-464A-B5C0-ACAE7DAD1072}" destId="{D6CC40DF-D085-884A-925C-AF82F02B555E}" srcOrd="0" destOrd="0" parTransId="{0826D219-B316-424A-B172-72637882D9E8}" sibTransId="{10B8DA9B-1991-6A41-A68F-9965738B356F}"/>
     <dgm:cxn modelId="{E602354A-1DF2-7046-8FA5-E5049FE7C6D0}" srcId="{4F1EBDA6-0FF3-4E46-B44F-1191394D48CE}" destId="{C2D3F37D-D9DD-D947-B7D4-E6C4BA2EADA0}" srcOrd="0" destOrd="0" parTransId="{5490F66C-1198-AB46-8AB0-7C5953EA9E74}" sibTransId="{00699A99-2E56-7148-B40D-38015C6DEE62}"/>
+    <dgm:cxn modelId="{81C5714A-BA58-4E48-8C6D-E526F964D82B}" type="presOf" srcId="{321336F9-89D2-8A4D-987F-51457EA2FAD5}" destId="{767D958C-2DF8-1D49-A14E-633E23476F82}" srcOrd="0" destOrd="0" presId="urn:microsoft.com/office/officeart/2005/8/layout/hierarchy1"/>
+    <dgm:cxn modelId="{11EB5B50-AAEB-BE4E-82A9-B7C3E007AD8B}" type="presOf" srcId="{EA73CF5D-2383-F945-B6A9-FAEEE4326717}" destId="{20B6F93A-4286-B348-BD3D-752123CDAF4A}" srcOrd="0" destOrd="0" presId="urn:microsoft.com/office/officeart/2005/8/layout/hierarchy1"/>
+    <dgm:cxn modelId="{788D2D51-EA43-124A-B183-6833C04A7D5A}" type="presOf" srcId="{35AB792A-0E89-284E-BFEF-FAC639ED1476}" destId="{23A4A0CC-05ED-5645-9DC2-D5F20E3BE572}" srcOrd="0" destOrd="0" presId="urn:microsoft.com/office/officeart/2005/8/layout/hierarchy1"/>
+    <dgm:cxn modelId="{A6B3B556-9440-124E-9741-B65360F010B4}" srcId="{647D90F6-5AF1-204A-AB92-354A58078878}" destId="{912A98DA-949A-E246-A8B4-126347F3EEA5}" srcOrd="1" destOrd="0" parTransId="{702AF669-2811-C249-9396-5AD5C1B6425A}" sibTransId="{D236D6E0-8DC6-6C49-9327-9E39D1F3925A}"/>
+    <dgm:cxn modelId="{637DA070-810B-874A-B101-CFDFDA72880D}" type="presOf" srcId="{D6CC40DF-D085-884A-925C-AF82F02B555E}" destId="{33B9C726-5306-5449-8227-4362FEB4E636}" srcOrd="0" destOrd="0" presId="urn:microsoft.com/office/officeart/2005/8/layout/hierarchy1"/>
+    <dgm:cxn modelId="{17950E71-EC97-FE45-91E1-B3B333D06500}" type="presOf" srcId="{420253DA-B5C3-F44A-BA26-12E3349C9ACA}" destId="{4823D33A-F3AC-1141-A957-E782912AFD3D}" srcOrd="0" destOrd="0" presId="urn:microsoft.com/office/officeart/2005/8/layout/hierarchy1"/>
+    <dgm:cxn modelId="{6D094171-43BA-8E48-825F-5FAD38D55636}" type="presOf" srcId="{73E6D2F5-89DD-C04A-BE00-62E043B4A88B}" destId="{D21AED92-83AC-DC41-BE5A-8677FEF76A1C}" srcOrd="0" destOrd="0" presId="urn:microsoft.com/office/officeart/2005/8/layout/hierarchy1"/>
+    <dgm:cxn modelId="{7AFF0280-9F1B-1C45-9820-55FEA4E58F0E}" type="presOf" srcId="{9A02B939-554B-464A-B5C0-ACAE7DAD1072}" destId="{48D833B3-84F5-3E4A-AE1D-DC483D5C7E72}" srcOrd="0" destOrd="0" presId="urn:microsoft.com/office/officeart/2005/8/layout/hierarchy1"/>
+    <dgm:cxn modelId="{3BAF7082-10C6-B646-9FEE-039BB0CFC95C}" srcId="{6988337F-91DD-394F-9A74-FD33DDA5A567}" destId="{9A02B939-554B-464A-B5C0-ACAE7DAD1072}" srcOrd="1" destOrd="0" parTransId="{655AFFF4-AC8E-1F4C-84FC-49A4ECC26159}" sibTransId="{255F02E8-C0F1-6D4F-B552-BDE1A4687825}"/>
+    <dgm:cxn modelId="{4C4EBD83-1901-7340-9456-8E9339F3550F}" type="presOf" srcId="{702AF669-2811-C249-9396-5AD5C1B6425A}" destId="{29343AAC-28C0-2F4C-957B-CF3D5990994D}" srcOrd="0" destOrd="0" presId="urn:microsoft.com/office/officeart/2005/8/layout/hierarchy1"/>
+    <dgm:cxn modelId="{09B31D95-7A1A-064E-9747-2302BBB34758}" type="presOf" srcId="{B00810F7-60CA-7B40-B5CB-4816FBC561BC}" destId="{18A07BBE-3EB0-EA4D-9436-1FEE15853FED}" srcOrd="0" destOrd="0" presId="urn:microsoft.com/office/officeart/2005/8/layout/hierarchy1"/>
+    <dgm:cxn modelId="{34D4A396-5D37-3740-A1E7-85AD06ACF6DA}" srcId="{C2D3F37D-D9DD-D947-B7D4-E6C4BA2EADA0}" destId="{6988337F-91DD-394F-9A74-FD33DDA5A567}" srcOrd="1" destOrd="0" parTransId="{86E2D74A-ADCE-3946-89EF-093B6FCA5976}" sibTransId="{FC6E756D-20F5-0246-BE12-FC62A67212A8}"/>
+    <dgm:cxn modelId="{FF257E97-1889-DA4A-B728-44498A4242EC}" srcId="{C2D3F37D-D9DD-D947-B7D4-E6C4BA2EADA0}" destId="{647D90F6-5AF1-204A-AB92-354A58078878}" srcOrd="0" destOrd="0" parTransId="{B1F26535-9B55-C547-A8BE-E3105B835D8D}" sibTransId="{FE348C27-B4CD-8648-8F67-7EAE644EE035}"/>
+    <dgm:cxn modelId="{47C961AB-BDA7-F748-AA69-32F568079594}" srcId="{6988337F-91DD-394F-9A74-FD33DDA5A567}" destId="{B00810F7-60CA-7B40-B5CB-4816FBC561BC}" srcOrd="0" destOrd="0" parTransId="{73E6D2F5-89DD-C04A-BE00-62E043B4A88B}" sibTransId="{F9034B44-D05F-9748-8C6F-06F2112F7722}"/>
+    <dgm:cxn modelId="{D9E503B6-6710-6144-9792-B8C56B065C4F}" srcId="{B00810F7-60CA-7B40-B5CB-4816FBC561BC}" destId="{420253DA-B5C3-F44A-BA26-12E3349C9ACA}" srcOrd="0" destOrd="0" parTransId="{EA73CF5D-2383-F945-B6A9-FAEEE4326717}" sibTransId="{DEED8285-670D-1442-97B3-EAE299959C4D}"/>
+    <dgm:cxn modelId="{476882CA-32F7-884C-B256-37BE8145FE9D}" type="presOf" srcId="{86E2D74A-ADCE-3946-89EF-093B6FCA5976}" destId="{A48127BC-1D32-A542-9B28-88A975663D96}" srcOrd="0" destOrd="0" presId="urn:microsoft.com/office/officeart/2005/8/layout/hierarchy1"/>
+    <dgm:cxn modelId="{5CED03D7-C702-2443-801F-393A8B2B76CA}" type="presOf" srcId="{4F1EBDA6-0FF3-4E46-B44F-1191394D48CE}" destId="{4EB85A4E-B0F5-734B-9144-4D7A08EF7CDB}" srcOrd="0" destOrd="0" presId="urn:microsoft.com/office/officeart/2005/8/layout/hierarchy1"/>
+    <dgm:cxn modelId="{012966E0-A0B6-5F43-80A8-EAC056EB7D7F}" type="presOf" srcId="{912A98DA-949A-E246-A8B4-126347F3EEA5}" destId="{5F0BF165-ABB9-A549-A485-9700D564558A}" srcOrd="0" destOrd="0" presId="urn:microsoft.com/office/officeart/2005/8/layout/hierarchy1"/>
     <dgm:cxn modelId="{6D3A72F6-78AB-4749-92D7-61881FC08809}" type="presOf" srcId="{647D90F6-5AF1-204A-AB92-354A58078878}" destId="{B3D39107-6BA5-DA40-9943-4B2C7EDF1596}" srcOrd="0" destOrd="0" presId="urn:microsoft.com/office/officeart/2005/8/layout/hierarchy1"/>
-    <dgm:cxn modelId="{C987AE37-5AC3-1A44-83B7-9B1BA449B3FC}" type="presOf" srcId="{B1F26535-9B55-C547-A8BE-E3105B835D8D}" destId="{09905DF9-C207-7C45-8E9C-534F5C65DFF6}" srcOrd="0" destOrd="0" presId="urn:microsoft.com/office/officeart/2005/8/layout/hierarchy1"/>
-    <dgm:cxn modelId="{7AFF0280-9F1B-1C45-9820-55FEA4E58F0E}" type="presOf" srcId="{9A02B939-554B-464A-B5C0-ACAE7DAD1072}" destId="{48D833B3-84F5-3E4A-AE1D-DC483D5C7E72}" srcOrd="0" destOrd="0" presId="urn:microsoft.com/office/officeart/2005/8/layout/hierarchy1"/>
-    <dgm:cxn modelId="{A6B3B556-9440-124E-9741-B65360F010B4}" srcId="{647D90F6-5AF1-204A-AB92-354A58078878}" destId="{912A98DA-949A-E246-A8B4-126347F3EEA5}" srcOrd="1" destOrd="0" parTransId="{702AF669-2811-C249-9396-5AD5C1B6425A}" sibTransId="{D236D6E0-8DC6-6C49-9327-9E39D1F3925A}"/>
-    <dgm:cxn modelId="{5CED03D7-C702-2443-801F-393A8B2B76CA}" type="presOf" srcId="{4F1EBDA6-0FF3-4E46-B44F-1191394D48CE}" destId="{4EB85A4E-B0F5-734B-9144-4D7A08EF7CDB}" srcOrd="0" destOrd="0" presId="urn:microsoft.com/office/officeart/2005/8/layout/hierarchy1"/>
-    <dgm:cxn modelId="{788D2D51-EA43-124A-B183-6833C04A7D5A}" type="presOf" srcId="{35AB792A-0E89-284E-BFEF-FAC639ED1476}" destId="{23A4A0CC-05ED-5645-9DC2-D5F20E3BE572}" srcOrd="0" destOrd="0" presId="urn:microsoft.com/office/officeart/2005/8/layout/hierarchy1"/>
-    <dgm:cxn modelId="{637DA070-810B-874A-B101-CFDFDA72880D}" type="presOf" srcId="{D6CC40DF-D085-884A-925C-AF82F02B555E}" destId="{33B9C726-5306-5449-8227-4362FEB4E636}" srcOrd="0" destOrd="0" presId="urn:microsoft.com/office/officeart/2005/8/layout/hierarchy1"/>
     <dgm:cxn modelId="{7E7642F8-9708-104B-B82F-D7A22B6818EA}" srcId="{647D90F6-5AF1-204A-AB92-354A58078878}" destId="{321336F9-89D2-8A4D-987F-51457EA2FAD5}" srcOrd="0" destOrd="0" parTransId="{35AB792A-0E89-284E-BFEF-FAC639ED1476}" sibTransId="{BA2CC2AC-B721-C844-89D4-0DADFF00BBF3}"/>
-    <dgm:cxn modelId="{A2D55B3A-D340-944E-A6A9-3560390CF698}" srcId="{9A02B939-554B-464A-B5C0-ACAE7DAD1072}" destId="{D6CC40DF-D085-884A-925C-AF82F02B555E}" srcOrd="0" destOrd="0" parTransId="{0826D219-B316-424A-B172-72637882D9E8}" sibTransId="{10B8DA9B-1991-6A41-A68F-9965738B356F}"/>
-    <dgm:cxn modelId="{D9E503B6-6710-6144-9792-B8C56B065C4F}" srcId="{B00810F7-60CA-7B40-B5CB-4816FBC561BC}" destId="{420253DA-B5C3-F44A-BA26-12E3349C9ACA}" srcOrd="0" destOrd="0" parTransId="{EA73CF5D-2383-F945-B6A9-FAEEE4326717}" sibTransId="{DEED8285-670D-1442-97B3-EAE299959C4D}"/>
-    <dgm:cxn modelId="{17950E71-EC97-FE45-91E1-B3B333D06500}" type="presOf" srcId="{420253DA-B5C3-F44A-BA26-12E3349C9ACA}" destId="{4823D33A-F3AC-1141-A957-E782912AFD3D}" srcOrd="0" destOrd="0" presId="urn:microsoft.com/office/officeart/2005/8/layout/hierarchy1"/>
-    <dgm:cxn modelId="{09B31D95-7A1A-064E-9747-2302BBB34758}" type="presOf" srcId="{B00810F7-60CA-7B40-B5CB-4816FBC561BC}" destId="{18A07BBE-3EB0-EA4D-9436-1FEE15853FED}" srcOrd="0" destOrd="0" presId="urn:microsoft.com/office/officeart/2005/8/layout/hierarchy1"/>
-    <dgm:cxn modelId="{012966E0-A0B6-5F43-80A8-EAC056EB7D7F}" type="presOf" srcId="{912A98DA-949A-E246-A8B4-126347F3EEA5}" destId="{5F0BF165-ABB9-A549-A485-9700D564558A}" srcOrd="0" destOrd="0" presId="urn:microsoft.com/office/officeart/2005/8/layout/hierarchy1"/>
-    <dgm:cxn modelId="{3BAF7082-10C6-B646-9FEE-039BB0CFC95C}" srcId="{6988337F-91DD-394F-9A74-FD33DDA5A567}" destId="{9A02B939-554B-464A-B5C0-ACAE7DAD1072}" srcOrd="1" destOrd="0" parTransId="{655AFFF4-AC8E-1F4C-84FC-49A4ECC26159}" sibTransId="{255F02E8-C0F1-6D4F-B552-BDE1A4687825}"/>
-    <dgm:cxn modelId="{078AFB03-4D59-BB4D-95B9-E16E6075C5AE}" type="presOf" srcId="{C2D3F37D-D9DD-D947-B7D4-E6C4BA2EADA0}" destId="{54CB0C0E-DBAB-4A41-A445-CCD7B3FC2049}" srcOrd="0" destOrd="0" presId="urn:microsoft.com/office/officeart/2005/8/layout/hierarchy1"/>
-    <dgm:cxn modelId="{47C961AB-BDA7-F748-AA69-32F568079594}" srcId="{6988337F-91DD-394F-9A74-FD33DDA5A567}" destId="{B00810F7-60CA-7B40-B5CB-4816FBC561BC}" srcOrd="0" destOrd="0" parTransId="{73E6D2F5-89DD-C04A-BE00-62E043B4A88B}" sibTransId="{F9034B44-D05F-9748-8C6F-06F2112F7722}"/>
-    <dgm:cxn modelId="{4C4EBD83-1901-7340-9456-8E9339F3550F}" type="presOf" srcId="{702AF669-2811-C249-9396-5AD5C1B6425A}" destId="{29343AAC-28C0-2F4C-957B-CF3D5990994D}" srcOrd="0" destOrd="0" presId="urn:microsoft.com/office/officeart/2005/8/layout/hierarchy1"/>
-    <dgm:cxn modelId="{476882CA-32F7-884C-B256-37BE8145FE9D}" type="presOf" srcId="{86E2D74A-ADCE-3946-89EF-093B6FCA5976}" destId="{A48127BC-1D32-A542-9B28-88A975663D96}" srcOrd="0" destOrd="0" presId="urn:microsoft.com/office/officeart/2005/8/layout/hierarchy1"/>
-    <dgm:cxn modelId="{11EB5B50-AAEB-BE4E-82A9-B7C3E007AD8B}" type="presOf" srcId="{EA73CF5D-2383-F945-B6A9-FAEEE4326717}" destId="{20B6F93A-4286-B348-BD3D-752123CDAF4A}" srcOrd="0" destOrd="0" presId="urn:microsoft.com/office/officeart/2005/8/layout/hierarchy1"/>
-    <dgm:cxn modelId="{2A56E121-4F20-1142-A9DD-493B5823DA98}" type="presOf" srcId="{0826D219-B316-424A-B172-72637882D9E8}" destId="{A5CB72EE-F72D-3746-ADEF-E2798CBFD5F7}" srcOrd="0" destOrd="0" presId="urn:microsoft.com/office/officeart/2005/8/layout/hierarchy1"/>
-    <dgm:cxn modelId="{FF257E97-1889-DA4A-B728-44498A4242EC}" srcId="{C2D3F37D-D9DD-D947-B7D4-E6C4BA2EADA0}" destId="{647D90F6-5AF1-204A-AB92-354A58078878}" srcOrd="0" destOrd="0" parTransId="{B1F26535-9B55-C547-A8BE-E3105B835D8D}" sibTransId="{FE348C27-B4CD-8648-8F67-7EAE644EE035}"/>
-    <dgm:cxn modelId="{6D094171-43BA-8E48-825F-5FAD38D55636}" type="presOf" srcId="{73E6D2F5-89DD-C04A-BE00-62E043B4A88B}" destId="{D21AED92-83AC-DC41-BE5A-8677FEF76A1C}" srcOrd="0" destOrd="0" presId="urn:microsoft.com/office/officeart/2005/8/layout/hierarchy1"/>
-    <dgm:cxn modelId="{34D4A396-5D37-3740-A1E7-85AD06ACF6DA}" srcId="{C2D3F37D-D9DD-D947-B7D4-E6C4BA2EADA0}" destId="{6988337F-91DD-394F-9A74-FD33DDA5A567}" srcOrd="1" destOrd="0" parTransId="{86E2D74A-ADCE-3946-89EF-093B6FCA5976}" sibTransId="{FC6E756D-20F5-0246-BE12-FC62A67212A8}"/>
-    <dgm:cxn modelId="{81C5714A-BA58-4E48-8C6D-E526F964D82B}" type="presOf" srcId="{321336F9-89D2-8A4D-987F-51457EA2FAD5}" destId="{767D958C-2DF8-1D49-A14E-633E23476F82}" srcOrd="0" destOrd="0" presId="urn:microsoft.com/office/officeart/2005/8/layout/hierarchy1"/>
-    <dgm:cxn modelId="{FB59E033-6F6F-844B-8DA7-E948D433817F}" type="presOf" srcId="{655AFFF4-AC8E-1F4C-84FC-49A4ECC26159}" destId="{140F0A54-B3FA-7E4B-86EB-A843C6B25D4C}" srcOrd="0" destOrd="0" presId="urn:microsoft.com/office/officeart/2005/8/layout/hierarchy1"/>
-    <dgm:cxn modelId="{55358F04-E2D7-644D-958C-9D7937EC8EB2}" type="presOf" srcId="{6988337F-91DD-394F-9A74-FD33DDA5A567}" destId="{25340BE3-F0D6-6A4A-AABB-247A8291EAF2}" srcOrd="0" destOrd="0" presId="urn:microsoft.com/office/officeart/2005/8/layout/hierarchy1"/>
     <dgm:cxn modelId="{69EDEFAA-4801-9D45-90A1-707AF5E9ACC3}" type="presParOf" srcId="{4EB85A4E-B0F5-734B-9144-4D7A08EF7CDB}" destId="{23FFA827-5EFD-AB4E-98DA-DE8C1C344CCE}" srcOrd="0" destOrd="0" presId="urn:microsoft.com/office/officeart/2005/8/layout/hierarchy1"/>
     <dgm:cxn modelId="{035C2EB6-5899-1F44-BB94-5A55B6AE6D8C}" type="presParOf" srcId="{23FFA827-5EFD-AB4E-98DA-DE8C1C344CCE}" destId="{D2DD95EE-32D9-CD44-AA5F-80FAC745567C}" srcOrd="0" destOrd="0" presId="urn:microsoft.com/office/officeart/2005/8/layout/hierarchy1"/>
     <dgm:cxn modelId="{680F1913-6833-6646-B7CC-8FE5C8C38293}" type="presParOf" srcId="{D2DD95EE-32D9-CD44-AA5F-80FAC745567C}" destId="{34DC9CC0-61AD-3848-9E46-B9EAE400EC5D}" srcOrd="0" destOrd="0" presId="urn:microsoft.com/office/officeart/2005/8/layout/hierarchy1"/>
@@ -7369,10 +7017,9 @@
         <a:lstStyle/>
         <a:p>
           <a:r>
-            <a:rPr lang="en-US" dirty="0" smtClean="0"/>
+            <a:rPr lang="en-US" dirty="0"/>
             <a:t>2</a:t>
           </a:r>
-          <a:endParaRPr lang="en-US" dirty="0"/>
         </a:p>
       </dgm:t>
     </dgm:pt>
@@ -7406,10 +7053,9 @@
         <a:lstStyle/>
         <a:p>
           <a:r>
-            <a:rPr lang="en-US" dirty="0" smtClean="0"/>
+            <a:rPr lang="en-US" dirty="0"/>
             <a:t>32</a:t>
           </a:r>
-          <a:endParaRPr lang="en-US" dirty="0"/>
         </a:p>
       </dgm:t>
     </dgm:pt>
@@ -7443,10 +7089,9 @@
         <a:lstStyle/>
         <a:p>
           <a:r>
-            <a:rPr lang="en-US" dirty="0" smtClean="0"/>
+            <a:rPr lang="en-US" dirty="0"/>
             <a:t>24</a:t>
           </a:r>
-          <a:endParaRPr lang="en-US" dirty="0"/>
         </a:p>
       </dgm:t>
     </dgm:pt>
@@ -7480,10 +7125,9 @@
         <a:lstStyle/>
         <a:p>
           <a:r>
-            <a:rPr lang="en-US" dirty="0" smtClean="0"/>
+            <a:rPr lang="en-US" dirty="0"/>
             <a:t>177</a:t>
           </a:r>
-          <a:endParaRPr lang="en-US" dirty="0"/>
         </a:p>
       </dgm:t>
     </dgm:pt>
@@ -7517,18 +7161,17 @@
         <a:lstStyle/>
         <a:p>
           <a:r>
-            <a:rPr lang="en-US" dirty="0" smtClean="0"/>
+            <a:rPr lang="en-US" dirty="0"/>
             <a:t>in-</a:t>
           </a:r>
           <a:r>
-            <a:rPr lang="en-US" dirty="0" err="1" smtClean="0"/>
+            <a:rPr lang="en-US" dirty="0" err="1"/>
             <a:t>addr.arpa</a:t>
           </a:r>
           <a:r>
-            <a:rPr lang="en-US" dirty="0" smtClean="0"/>
+            <a:rPr lang="en-US" dirty="0"/>
             <a:t>.</a:t>
           </a:r>
-          <a:endParaRPr lang="en-US" dirty="0"/>
         </a:p>
       </dgm:t>
     </dgm:pt>
@@ -7566,13 +7209,6 @@
     <dgm:pt modelId="{A42F8076-1709-C94E-9C3F-1DD1990C4FED}" type="pres">
       <dgm:prSet presAssocID="{1F62763A-41BE-2A48-96EE-31CD126C0D49}" presName="arrow" presStyleLbl="bgShp" presStyleIdx="0" presStyleCnt="1"/>
       <dgm:spPr/>
-      <dgm:t>
-        <a:bodyPr/>
-        <a:lstStyle/>
-        <a:p>
-          <a:endParaRPr lang="en-US"/>
-        </a:p>
-      </dgm:t>
     </dgm:pt>
     <dgm:pt modelId="{16C97C1A-92DC-0D4F-969F-C511BC5C0BA2}" type="pres">
       <dgm:prSet presAssocID="{1F62763A-41BE-2A48-96EE-31CD126C0D49}" presName="linearProcess" presStyleCnt="0"/>
@@ -7585,13 +7221,6 @@
         </dgm:presLayoutVars>
       </dgm:prSet>
       <dgm:spPr/>
-      <dgm:t>
-        <a:bodyPr/>
-        <a:lstStyle/>
-        <a:p>
-          <a:endParaRPr lang="en-US"/>
-        </a:p>
-      </dgm:t>
     </dgm:pt>
     <dgm:pt modelId="{F2401544-FDDA-0642-A036-96453772F788}" type="pres">
       <dgm:prSet presAssocID="{46455A6A-0075-9042-BD7E-E0B455CA4B37}" presName="sibTrans" presStyleCnt="0"/>
@@ -7604,13 +7233,6 @@
         </dgm:presLayoutVars>
       </dgm:prSet>
       <dgm:spPr/>
-      <dgm:t>
-        <a:bodyPr/>
-        <a:lstStyle/>
-        <a:p>
-          <a:endParaRPr lang="en-US"/>
-        </a:p>
-      </dgm:t>
     </dgm:pt>
     <dgm:pt modelId="{C332FC79-2C8B-F246-BE47-99DD984434B4}" type="pres">
       <dgm:prSet presAssocID="{A9EDFA31-D358-454A-A646-A9B2E039DD4B}" presName="sibTrans" presStyleCnt="0"/>
@@ -7623,13 +7245,6 @@
         </dgm:presLayoutVars>
       </dgm:prSet>
       <dgm:spPr/>
-      <dgm:t>
-        <a:bodyPr/>
-        <a:lstStyle/>
-        <a:p>
-          <a:endParaRPr lang="en-US"/>
-        </a:p>
-      </dgm:t>
     </dgm:pt>
     <dgm:pt modelId="{598A548C-2BE3-7F4D-9311-6625CE0A9B65}" type="pres">
       <dgm:prSet presAssocID="{61C5EFEB-3389-5C46-97B2-3064A1D16621}" presName="sibTrans" presStyleCnt="0"/>
@@ -7642,13 +7257,6 @@
         </dgm:presLayoutVars>
       </dgm:prSet>
       <dgm:spPr/>
-      <dgm:t>
-        <a:bodyPr/>
-        <a:lstStyle/>
-        <a:p>
-          <a:endParaRPr lang="en-US"/>
-        </a:p>
-      </dgm:t>
     </dgm:pt>
     <dgm:pt modelId="{AF677295-EC39-4346-A896-ED7C2D0CA654}" type="pres">
       <dgm:prSet presAssocID="{9B5896EF-FB37-5744-9F73-21862AB626DA}" presName="sibTrans" presStyleCnt="0"/>
@@ -7661,27 +7269,20 @@
         </dgm:presLayoutVars>
       </dgm:prSet>
       <dgm:spPr/>
-      <dgm:t>
-        <a:bodyPr/>
-        <a:lstStyle/>
-        <a:p>
-          <a:endParaRPr lang="en-US"/>
-        </a:p>
-      </dgm:t>
     </dgm:pt>
   </dgm:ptLst>
   <dgm:cxnLst>
+    <dgm:cxn modelId="{7040F51D-BE4B-8846-8D67-5C13BD706E38}" srcId="{1F62763A-41BE-2A48-96EE-31CD126C0D49}" destId="{556BA807-3933-8C47-A795-7FEE97488AB3}" srcOrd="0" destOrd="0" parTransId="{16CE7D80-4313-9643-B02B-D99F7170BF7E}" sibTransId="{46455A6A-0075-9042-BD7E-E0B455CA4B37}"/>
+    <dgm:cxn modelId="{42564649-BB3B-D741-B629-3DC18B310205}" srcId="{1F62763A-41BE-2A48-96EE-31CD126C0D49}" destId="{3BDE7328-BC81-4F40-9712-4C90FD373142}" srcOrd="4" destOrd="0" parTransId="{CEA0DF13-5A06-624B-9781-D7DE3CDD8AF0}" sibTransId="{7E4436B2-AD1E-DF49-8B9A-63A443E1386B}"/>
+    <dgm:cxn modelId="{82FA954C-3C11-6648-ABAF-269E9C37DF0B}" type="presOf" srcId="{1784460D-BC0D-B343-8A52-CAAF78B8F98A}" destId="{8AB0D563-6133-2448-AE5B-85713E42DA4F}" srcOrd="0" destOrd="0" presId="urn:microsoft.com/office/officeart/2005/8/layout/hProcess9"/>
+    <dgm:cxn modelId="{17E75E5C-9FF6-354E-9E12-8CC2E7D762C2}" type="presOf" srcId="{E532E676-A6CA-3D45-BCEE-BA451B840696}" destId="{6BF79261-E395-4D4D-A8EF-6E98185B0A9C}" srcOrd="0" destOrd="0" presId="urn:microsoft.com/office/officeart/2005/8/layout/hProcess9"/>
     <dgm:cxn modelId="{3E56648A-92C6-B241-A351-5FA613628B10}" srcId="{1F62763A-41BE-2A48-96EE-31CD126C0D49}" destId="{B2FAA5B3-1FF5-9A48-8F88-716F92A03329}" srcOrd="3" destOrd="0" parTransId="{F2B574EF-0F3C-404B-A727-921F8381C9BA}" sibTransId="{9B5896EF-FB37-5744-9F73-21862AB626DA}"/>
-    <dgm:cxn modelId="{42564649-BB3B-D741-B629-3DC18B310205}" srcId="{1F62763A-41BE-2A48-96EE-31CD126C0D49}" destId="{3BDE7328-BC81-4F40-9712-4C90FD373142}" srcOrd="4" destOrd="0" parTransId="{CEA0DF13-5A06-624B-9781-D7DE3CDD8AF0}" sibTransId="{7E4436B2-AD1E-DF49-8B9A-63A443E1386B}"/>
+    <dgm:cxn modelId="{902B6B93-121E-D744-B59E-3F4736B4B5C2}" type="presOf" srcId="{556BA807-3933-8C47-A795-7FEE97488AB3}" destId="{2C793D3D-D9F4-674C-829C-CAC788B79060}" srcOrd="0" destOrd="0" presId="urn:microsoft.com/office/officeart/2005/8/layout/hProcess9"/>
+    <dgm:cxn modelId="{DC2EA19D-C775-8045-8AA2-9DC9DCADE322}" type="presOf" srcId="{B2FAA5B3-1FF5-9A48-8F88-716F92A03329}" destId="{F55F5639-8F1E-F949-B06D-B5A0CD9F8FA6}" srcOrd="0" destOrd="0" presId="urn:microsoft.com/office/officeart/2005/8/layout/hProcess9"/>
+    <dgm:cxn modelId="{D52D46BE-6B3C-624E-9C1D-FECC20501283}" type="presOf" srcId="{1F62763A-41BE-2A48-96EE-31CD126C0D49}" destId="{1B20C456-8C66-B645-8063-026C93B02493}" srcOrd="0" destOrd="0" presId="urn:microsoft.com/office/officeart/2005/8/layout/hProcess9"/>
+    <dgm:cxn modelId="{EFD847C7-16A1-0540-B60E-B9D5DD0BB840}" type="presOf" srcId="{3BDE7328-BC81-4F40-9712-4C90FD373142}" destId="{80596C85-103A-7F43-9586-21A9EF4315CB}" srcOrd="0" destOrd="0" presId="urn:microsoft.com/office/officeart/2005/8/layout/hProcess9"/>
     <dgm:cxn modelId="{1F5375D0-C9BA-254E-85D0-DD94A295870F}" srcId="{1F62763A-41BE-2A48-96EE-31CD126C0D49}" destId="{E532E676-A6CA-3D45-BCEE-BA451B840696}" srcOrd="2" destOrd="0" parTransId="{5F841174-B9E5-DB4F-94B0-FD49EDC9FEA3}" sibTransId="{61C5EFEB-3389-5C46-97B2-3064A1D16621}"/>
-    <dgm:cxn modelId="{7040F51D-BE4B-8846-8D67-5C13BD706E38}" srcId="{1F62763A-41BE-2A48-96EE-31CD126C0D49}" destId="{556BA807-3933-8C47-A795-7FEE97488AB3}" srcOrd="0" destOrd="0" parTransId="{16CE7D80-4313-9643-B02B-D99F7170BF7E}" sibTransId="{46455A6A-0075-9042-BD7E-E0B455CA4B37}"/>
-    <dgm:cxn modelId="{DC2EA19D-C775-8045-8AA2-9DC9DCADE322}" type="presOf" srcId="{B2FAA5B3-1FF5-9A48-8F88-716F92A03329}" destId="{F55F5639-8F1E-F949-B06D-B5A0CD9F8FA6}" srcOrd="0" destOrd="0" presId="urn:microsoft.com/office/officeart/2005/8/layout/hProcess9"/>
     <dgm:cxn modelId="{D12A6CEE-4A8F-FF4E-B7B7-464A84C0B9D8}" srcId="{1F62763A-41BE-2A48-96EE-31CD126C0D49}" destId="{1784460D-BC0D-B343-8A52-CAAF78B8F98A}" srcOrd="1" destOrd="0" parTransId="{41AA1C85-CDF1-3246-8AE2-DA16521C8AA4}" sibTransId="{A9EDFA31-D358-454A-A646-A9B2E039DD4B}"/>
-    <dgm:cxn modelId="{902B6B93-121E-D744-B59E-3F4736B4B5C2}" type="presOf" srcId="{556BA807-3933-8C47-A795-7FEE97488AB3}" destId="{2C793D3D-D9F4-674C-829C-CAC788B79060}" srcOrd="0" destOrd="0" presId="urn:microsoft.com/office/officeart/2005/8/layout/hProcess9"/>
-    <dgm:cxn modelId="{D52D46BE-6B3C-624E-9C1D-FECC20501283}" type="presOf" srcId="{1F62763A-41BE-2A48-96EE-31CD126C0D49}" destId="{1B20C456-8C66-B645-8063-026C93B02493}" srcOrd="0" destOrd="0" presId="urn:microsoft.com/office/officeart/2005/8/layout/hProcess9"/>
-    <dgm:cxn modelId="{82FA954C-3C11-6648-ABAF-269E9C37DF0B}" type="presOf" srcId="{1784460D-BC0D-B343-8A52-CAAF78B8F98A}" destId="{8AB0D563-6133-2448-AE5B-85713E42DA4F}" srcOrd="0" destOrd="0" presId="urn:microsoft.com/office/officeart/2005/8/layout/hProcess9"/>
-    <dgm:cxn modelId="{EFD847C7-16A1-0540-B60E-B9D5DD0BB840}" type="presOf" srcId="{3BDE7328-BC81-4F40-9712-4C90FD373142}" destId="{80596C85-103A-7F43-9586-21A9EF4315CB}" srcOrd="0" destOrd="0" presId="urn:microsoft.com/office/officeart/2005/8/layout/hProcess9"/>
-    <dgm:cxn modelId="{17E75E5C-9FF6-354E-9E12-8CC2E7D762C2}" type="presOf" srcId="{E532E676-A6CA-3D45-BCEE-BA451B840696}" destId="{6BF79261-E395-4D4D-A8EF-6E98185B0A9C}" srcOrd="0" destOrd="0" presId="urn:microsoft.com/office/officeart/2005/8/layout/hProcess9"/>
     <dgm:cxn modelId="{749CABD5-4FBE-2B45-9E7F-C870F8361D18}" type="presParOf" srcId="{1B20C456-8C66-B645-8063-026C93B02493}" destId="{A42F8076-1709-C94E-9C3F-1DD1990C4FED}" srcOrd="0" destOrd="0" presId="urn:microsoft.com/office/officeart/2005/8/layout/hProcess9"/>
     <dgm:cxn modelId="{0C50D372-1B62-5D43-A8C7-9ABE5D83D75F}" type="presParOf" srcId="{1B20C456-8C66-B645-8063-026C93B02493}" destId="{16C97C1A-92DC-0D4F-969F-C511BC5C0BA2}" srcOrd="1" destOrd="0" presId="urn:microsoft.com/office/officeart/2005/8/layout/hProcess9"/>
     <dgm:cxn modelId="{10683089-642E-9441-8A64-B18B7083B5CF}" type="presParOf" srcId="{16C97C1A-92DC-0D4F-969F-C511BC5C0BA2}" destId="{2C793D3D-D9F4-674C-829C-CAC788B79060}" srcOrd="0" destOrd="0" presId="urn:microsoft.com/office/officeart/2005/8/layout/hProcess9"/>
@@ -7719,10 +7320,9 @@
         <a:lstStyle/>
         <a:p>
           <a:r>
-            <a:rPr lang="en-US" dirty="0" smtClean="0"/>
+            <a:rPr lang="en-US" dirty="0"/>
             <a:t>2.32.24.177.in-addr.arpa.</a:t>
           </a:r>
-          <a:endParaRPr lang="en-US" dirty="0"/>
         </a:p>
       </dgm:t>
     </dgm:pt>
@@ -7760,13 +7360,6 @@
     <dgm:pt modelId="{A42F8076-1709-C94E-9C3F-1DD1990C4FED}" type="pres">
       <dgm:prSet presAssocID="{1F62763A-41BE-2A48-96EE-31CD126C0D49}" presName="arrow" presStyleLbl="bgShp" presStyleIdx="0" presStyleCnt="1"/>
       <dgm:spPr/>
-      <dgm:t>
-        <a:bodyPr/>
-        <a:lstStyle/>
-        <a:p>
-          <a:endParaRPr lang="en-US"/>
-        </a:p>
-      </dgm:t>
     </dgm:pt>
     <dgm:pt modelId="{16C97C1A-92DC-0D4F-969F-C511BC5C0BA2}" type="pres">
       <dgm:prSet presAssocID="{1F62763A-41BE-2A48-96EE-31CD126C0D49}" presName="linearProcess" presStyleCnt="0"/>
@@ -7779,19 +7372,12 @@
         </dgm:presLayoutVars>
       </dgm:prSet>
       <dgm:spPr/>
-      <dgm:t>
-        <a:bodyPr/>
-        <a:lstStyle/>
-        <a:p>
-          <a:endParaRPr lang="en-US"/>
-        </a:p>
-      </dgm:t>
     </dgm:pt>
   </dgm:ptLst>
   <dgm:cxnLst>
+    <dgm:cxn modelId="{2EA4AC15-0F03-0D47-A766-3997D893B801}" type="presOf" srcId="{1F62763A-41BE-2A48-96EE-31CD126C0D49}" destId="{1B20C456-8C66-B645-8063-026C93B02493}" srcOrd="0" destOrd="0" presId="urn:microsoft.com/office/officeart/2005/8/layout/hProcess9"/>
     <dgm:cxn modelId="{42564649-BB3B-D741-B629-3DC18B310205}" srcId="{1F62763A-41BE-2A48-96EE-31CD126C0D49}" destId="{3BDE7328-BC81-4F40-9712-4C90FD373142}" srcOrd="0" destOrd="0" parTransId="{CEA0DF13-5A06-624B-9781-D7DE3CDD8AF0}" sibTransId="{7E4436B2-AD1E-DF49-8B9A-63A443E1386B}"/>
     <dgm:cxn modelId="{23FCED8D-EF6C-AF4C-9C77-7331C84A9A77}" type="presOf" srcId="{3BDE7328-BC81-4F40-9712-4C90FD373142}" destId="{80596C85-103A-7F43-9586-21A9EF4315CB}" srcOrd="0" destOrd="0" presId="urn:microsoft.com/office/officeart/2005/8/layout/hProcess9"/>
-    <dgm:cxn modelId="{2EA4AC15-0F03-0D47-A766-3997D893B801}" type="presOf" srcId="{1F62763A-41BE-2A48-96EE-31CD126C0D49}" destId="{1B20C456-8C66-B645-8063-026C93B02493}" srcOrd="0" destOrd="0" presId="urn:microsoft.com/office/officeart/2005/8/layout/hProcess9"/>
     <dgm:cxn modelId="{49ADBD55-17C8-C948-AC4E-70FDAE4ADC83}" type="presParOf" srcId="{1B20C456-8C66-B645-8063-026C93B02493}" destId="{A42F8076-1709-C94E-9C3F-1DD1990C4FED}" srcOrd="0" destOrd="0" presId="urn:microsoft.com/office/officeart/2005/8/layout/hProcess9"/>
     <dgm:cxn modelId="{10708D6D-80E3-7A43-B4E8-F582228D2E04}" type="presParOf" srcId="{1B20C456-8C66-B645-8063-026C93B02493}" destId="{16C97C1A-92DC-0D4F-969F-C511BC5C0BA2}" srcOrd="1" destOrd="0" presId="urn:microsoft.com/office/officeart/2005/8/layout/hProcess9"/>
     <dgm:cxn modelId="{AC140B09-6B3C-A947-87DF-ECFB187C8FB9}" type="presParOf" srcId="{16C97C1A-92DC-0D4F-969F-C511BC5C0BA2}" destId="{80596C85-103A-7F43-9586-21A9EF4315CB}" srcOrd="0" destOrd="0" presId="urn:microsoft.com/office/officeart/2005/8/layout/hProcess9"/>
@@ -7828,10 +7414,9 @@
         <a:lstStyle/>
         <a:p>
           <a:r>
-            <a:rPr lang="en-US" dirty="0" smtClean="0"/>
+            <a:rPr lang="en-US" dirty="0"/>
             <a:t>ip6.arpa</a:t>
           </a:r>
-          <a:endParaRPr lang="en-US" dirty="0"/>
         </a:p>
       </dgm:t>
     </dgm:pt>
@@ -7865,10 +7450,9 @@
         <a:lstStyle/>
         <a:p>
           <a:r>
-            <a:rPr lang="en-US" dirty="0" smtClean="0"/>
+            <a:rPr lang="en-US" dirty="0"/>
             <a:t>0.8.2</a:t>
           </a:r>
-          <a:endParaRPr lang="en-US" dirty="0"/>
         </a:p>
       </dgm:t>
     </dgm:pt>
@@ -7902,10 +7486,9 @@
         <a:lstStyle/>
         <a:p>
           <a:r>
-            <a:rPr lang="en-US" dirty="0" smtClean="0"/>
+            <a:rPr lang="en-US" dirty="0"/>
             <a:t>1</a:t>
           </a:r>
-          <a:endParaRPr lang="en-US" dirty="0"/>
         </a:p>
       </dgm:t>
     </dgm:pt>
@@ -7939,10 +7522,9 @@
         <a:lstStyle/>
         <a:p>
           <a:r>
-            <a:rPr lang="en-US" dirty="0" smtClean="0"/>
+            <a:rPr lang="en-US" dirty="0"/>
             <a:t>2</a:t>
           </a:r>
-          <a:endParaRPr lang="en-US" dirty="0"/>
         </a:p>
       </dgm:t>
     </dgm:pt>
@@ -7976,10 +7558,9 @@
         <a:lstStyle/>
         <a:p>
           <a:r>
-            <a:rPr lang="en-US" dirty="0" smtClean="0"/>
+            <a:rPr lang="en-US" dirty="0"/>
             <a:t>1.0.0.2</a:t>
           </a:r>
-          <a:endParaRPr lang="en-US" dirty="0"/>
         </a:p>
       </dgm:t>
     </dgm:pt>
@@ -8013,10 +7594,9 @@
         <a:lstStyle/>
         <a:p>
           <a:r>
-            <a:rPr lang="en-US" dirty="0" smtClean="0"/>
+            <a:rPr lang="en-US" dirty="0"/>
             <a:t>1</a:t>
           </a:r>
-          <a:endParaRPr lang="en-US" dirty="0"/>
         </a:p>
       </dgm:t>
     </dgm:pt>
@@ -8050,10 +7630,9 @@
         <a:lstStyle/>
         <a:p>
           <a:r>
-            <a:rPr lang="en-US" dirty="0" smtClean="0"/>
+            <a:rPr lang="en-US" dirty="0"/>
             <a:t>2</a:t>
           </a:r>
-          <a:endParaRPr lang="en-US" dirty="0"/>
         </a:p>
       </dgm:t>
     </dgm:pt>
@@ -8087,10 +7666,9 @@
         <a:lstStyle/>
         <a:p>
           <a:r>
-            <a:rPr lang="en-US" dirty="0" smtClean="0"/>
+            <a:rPr lang="en-US" dirty="0"/>
             <a:t>24</a:t>
           </a:r>
-          <a:endParaRPr lang="en-US" dirty="0"/>
         </a:p>
       </dgm:t>
     </dgm:pt>
@@ -8124,10 +7702,9 @@
         <a:lstStyle/>
         <a:p>
           <a:r>
-            <a:rPr lang="en-US" dirty="0" smtClean="0"/>
+            <a:rPr lang="en-US" dirty="0"/>
             <a:t>36</a:t>
           </a:r>
-          <a:endParaRPr lang="en-US" dirty="0"/>
         </a:p>
       </dgm:t>
     </dgm:pt>
@@ -8164,13 +7741,6 @@
         </dgm:presLayoutVars>
       </dgm:prSet>
       <dgm:spPr/>
-      <dgm:t>
-        <a:bodyPr/>
-        <a:lstStyle/>
-        <a:p>
-          <a:endParaRPr lang="en-US"/>
-        </a:p>
-      </dgm:t>
     </dgm:pt>
     <dgm:pt modelId="{23FFA827-5EFD-AB4E-98DA-DE8C1C344CCE}" type="pres">
       <dgm:prSet presAssocID="{C2D3F37D-D9DD-D947-B7D4-E6C4BA2EADA0}" presName="hierRoot1" presStyleCnt="0"/>
@@ -8191,13 +7761,6 @@
         </dgm:presLayoutVars>
       </dgm:prSet>
       <dgm:spPr/>
-      <dgm:t>
-        <a:bodyPr/>
-        <a:lstStyle/>
-        <a:p>
-          <a:endParaRPr lang="en-US"/>
-        </a:p>
-      </dgm:t>
     </dgm:pt>
     <dgm:pt modelId="{10EB3560-F29C-4D40-A8BE-5D054854DDE5}" type="pres">
       <dgm:prSet presAssocID="{C2D3F37D-D9DD-D947-B7D4-E6C4BA2EADA0}" presName="hierChild2" presStyleCnt="0"/>
@@ -8206,13 +7769,6 @@
     <dgm:pt modelId="{09905DF9-C207-7C45-8E9C-534F5C65DFF6}" type="pres">
       <dgm:prSet presAssocID="{B1F26535-9B55-C547-A8BE-E3105B835D8D}" presName="Name10" presStyleLbl="parChTrans1D2" presStyleIdx="0" presStyleCnt="2"/>
       <dgm:spPr/>
-      <dgm:t>
-        <a:bodyPr/>
-        <a:lstStyle/>
-        <a:p>
-          <a:endParaRPr lang="en-US"/>
-        </a:p>
-      </dgm:t>
     </dgm:pt>
     <dgm:pt modelId="{34015561-B361-AD41-A661-E9752D035C81}" type="pres">
       <dgm:prSet presAssocID="{647D90F6-5AF1-204A-AB92-354A58078878}" presName="hierRoot2" presStyleCnt="0"/>
@@ -8233,13 +7789,6 @@
         </dgm:presLayoutVars>
       </dgm:prSet>
       <dgm:spPr/>
-      <dgm:t>
-        <a:bodyPr/>
-        <a:lstStyle/>
-        <a:p>
-          <a:endParaRPr lang="en-US"/>
-        </a:p>
-      </dgm:t>
     </dgm:pt>
     <dgm:pt modelId="{1C5699C2-74DB-794F-BD40-03B2CE43036C}" type="pres">
       <dgm:prSet presAssocID="{647D90F6-5AF1-204A-AB92-354A58078878}" presName="hierChild3" presStyleCnt="0"/>
@@ -8248,13 +7797,6 @@
     <dgm:pt modelId="{23A4A0CC-05ED-5645-9DC2-D5F20E3BE572}" type="pres">
       <dgm:prSet presAssocID="{35AB792A-0E89-284E-BFEF-FAC639ED1476}" presName="Name17" presStyleLbl="parChTrans1D3" presStyleIdx="0" presStyleCnt="4"/>
       <dgm:spPr/>
-      <dgm:t>
-        <a:bodyPr/>
-        <a:lstStyle/>
-        <a:p>
-          <a:endParaRPr lang="en-US"/>
-        </a:p>
-      </dgm:t>
     </dgm:pt>
     <dgm:pt modelId="{9D5E0416-4107-D046-8283-16A91D413D26}" type="pres">
       <dgm:prSet presAssocID="{321336F9-89D2-8A4D-987F-51457EA2FAD5}" presName="hierRoot3" presStyleCnt="0"/>
@@ -8275,13 +7817,6 @@
         </dgm:presLayoutVars>
       </dgm:prSet>
       <dgm:spPr/>
-      <dgm:t>
-        <a:bodyPr/>
-        <a:lstStyle/>
-        <a:p>
-          <a:endParaRPr lang="en-US"/>
-        </a:p>
-      </dgm:t>
     </dgm:pt>
     <dgm:pt modelId="{613DA49E-2A67-0248-BA79-D23990C62D35}" type="pres">
       <dgm:prSet presAssocID="{321336F9-89D2-8A4D-987F-51457EA2FAD5}" presName="hierChild4" presStyleCnt="0"/>
@@ -8290,13 +7825,6 @@
     <dgm:pt modelId="{29343AAC-28C0-2F4C-957B-CF3D5990994D}" type="pres">
       <dgm:prSet presAssocID="{702AF669-2811-C249-9396-5AD5C1B6425A}" presName="Name17" presStyleLbl="parChTrans1D3" presStyleIdx="1" presStyleCnt="4"/>
       <dgm:spPr/>
-      <dgm:t>
-        <a:bodyPr/>
-        <a:lstStyle/>
-        <a:p>
-          <a:endParaRPr lang="en-US"/>
-        </a:p>
-      </dgm:t>
     </dgm:pt>
     <dgm:pt modelId="{9B39CD45-1F9D-6246-B8F2-40F0D8913757}" type="pres">
       <dgm:prSet presAssocID="{912A98DA-949A-E246-A8B4-126347F3EEA5}" presName="hierRoot3" presStyleCnt="0"/>
@@ -8317,13 +7845,6 @@
         </dgm:presLayoutVars>
       </dgm:prSet>
       <dgm:spPr/>
-      <dgm:t>
-        <a:bodyPr/>
-        <a:lstStyle/>
-        <a:p>
-          <a:endParaRPr lang="en-US"/>
-        </a:p>
-      </dgm:t>
     </dgm:pt>
     <dgm:pt modelId="{AB56A8AD-DACE-0541-823E-714E1B1B8A7C}" type="pres">
       <dgm:prSet presAssocID="{912A98DA-949A-E246-A8B4-126347F3EEA5}" presName="hierChild4" presStyleCnt="0"/>
@@ -8332,13 +7853,6 @@
     <dgm:pt modelId="{A48127BC-1D32-A542-9B28-88A975663D96}" type="pres">
       <dgm:prSet presAssocID="{86E2D74A-ADCE-3946-89EF-093B6FCA5976}" presName="Name10" presStyleLbl="parChTrans1D2" presStyleIdx="1" presStyleCnt="2"/>
       <dgm:spPr/>
-      <dgm:t>
-        <a:bodyPr/>
-        <a:lstStyle/>
-        <a:p>
-          <a:endParaRPr lang="en-US"/>
-        </a:p>
-      </dgm:t>
     </dgm:pt>
     <dgm:pt modelId="{8F264EA6-E5BF-E546-8C63-CCD45FB17697}" type="pres">
       <dgm:prSet presAssocID="{6988337F-91DD-394F-9A74-FD33DDA5A567}" presName="hierRoot2" presStyleCnt="0"/>
@@ -8359,13 +7873,6 @@
         </dgm:presLayoutVars>
       </dgm:prSet>
       <dgm:spPr/>
-      <dgm:t>
-        <a:bodyPr/>
-        <a:lstStyle/>
-        <a:p>
-          <a:endParaRPr lang="en-US"/>
-        </a:p>
-      </dgm:t>
     </dgm:pt>
     <dgm:pt modelId="{37B3F5A5-46D5-7847-8B11-B1861F242A05}" type="pres">
       <dgm:prSet presAssocID="{6988337F-91DD-394F-9A74-FD33DDA5A567}" presName="hierChild3" presStyleCnt="0"/>
@@ -8374,13 +7881,6 @@
     <dgm:pt modelId="{D21AED92-83AC-DC41-BE5A-8677FEF76A1C}" type="pres">
       <dgm:prSet presAssocID="{73E6D2F5-89DD-C04A-BE00-62E043B4A88B}" presName="Name17" presStyleLbl="parChTrans1D3" presStyleIdx="2" presStyleCnt="4"/>
       <dgm:spPr/>
-      <dgm:t>
-        <a:bodyPr/>
-        <a:lstStyle/>
-        <a:p>
-          <a:endParaRPr lang="en-US"/>
-        </a:p>
-      </dgm:t>
     </dgm:pt>
     <dgm:pt modelId="{5432F137-CC9F-F644-953E-206A6E984B40}" type="pres">
       <dgm:prSet presAssocID="{B00810F7-60CA-7B40-B5CB-4816FBC561BC}" presName="hierRoot3" presStyleCnt="0"/>
@@ -8401,13 +7901,6 @@
         </dgm:presLayoutVars>
       </dgm:prSet>
       <dgm:spPr/>
-      <dgm:t>
-        <a:bodyPr/>
-        <a:lstStyle/>
-        <a:p>
-          <a:endParaRPr lang="en-US"/>
-        </a:p>
-      </dgm:t>
     </dgm:pt>
     <dgm:pt modelId="{A7DEEF7F-C9FF-FC44-81F5-269B8AEA408F}" type="pres">
       <dgm:prSet presAssocID="{B00810F7-60CA-7B40-B5CB-4816FBC561BC}" presName="hierChild4" presStyleCnt="0"/>
@@ -8416,13 +7909,6 @@
     <dgm:pt modelId="{20B6F93A-4286-B348-BD3D-752123CDAF4A}" type="pres">
       <dgm:prSet presAssocID="{EA73CF5D-2383-F945-B6A9-FAEEE4326717}" presName="Name23" presStyleLbl="parChTrans1D4" presStyleIdx="0" presStyleCnt="2"/>
       <dgm:spPr/>
-      <dgm:t>
-        <a:bodyPr/>
-        <a:lstStyle/>
-        <a:p>
-          <a:endParaRPr lang="en-US"/>
-        </a:p>
-      </dgm:t>
     </dgm:pt>
     <dgm:pt modelId="{BC5DF14B-3408-7544-A154-18E49E854A0E}" type="pres">
       <dgm:prSet presAssocID="{420253DA-B5C3-F44A-BA26-12E3349C9ACA}" presName="hierRoot4" presStyleCnt="0"/>
@@ -8443,13 +7929,6 @@
         </dgm:presLayoutVars>
       </dgm:prSet>
       <dgm:spPr/>
-      <dgm:t>
-        <a:bodyPr/>
-        <a:lstStyle/>
-        <a:p>
-          <a:endParaRPr lang="en-US"/>
-        </a:p>
-      </dgm:t>
     </dgm:pt>
     <dgm:pt modelId="{54656CF7-CC4D-FB4D-8BAF-5270C76A293C}" type="pres">
       <dgm:prSet presAssocID="{420253DA-B5C3-F44A-BA26-12E3349C9ACA}" presName="hierChild5" presStyleCnt="0"/>
@@ -8458,13 +7937,6 @@
     <dgm:pt modelId="{140F0A54-B3FA-7E4B-86EB-A843C6B25D4C}" type="pres">
       <dgm:prSet presAssocID="{655AFFF4-AC8E-1F4C-84FC-49A4ECC26159}" presName="Name17" presStyleLbl="parChTrans1D3" presStyleIdx="3" presStyleCnt="4"/>
       <dgm:spPr/>
-      <dgm:t>
-        <a:bodyPr/>
-        <a:lstStyle/>
-        <a:p>
-          <a:endParaRPr lang="en-US"/>
-        </a:p>
-      </dgm:t>
     </dgm:pt>
     <dgm:pt modelId="{E6637965-D2F3-3A43-9496-E5280F2CF512}" type="pres">
       <dgm:prSet presAssocID="{9A02B939-554B-464A-B5C0-ACAE7DAD1072}" presName="hierRoot3" presStyleCnt="0"/>
@@ -8485,13 +7957,6 @@
         </dgm:presLayoutVars>
       </dgm:prSet>
       <dgm:spPr/>
-      <dgm:t>
-        <a:bodyPr/>
-        <a:lstStyle/>
-        <a:p>
-          <a:endParaRPr lang="en-US"/>
-        </a:p>
-      </dgm:t>
     </dgm:pt>
     <dgm:pt modelId="{42B0AD2B-1F4E-C44D-8410-9C01463C53FF}" type="pres">
       <dgm:prSet presAssocID="{9A02B939-554B-464A-B5C0-ACAE7DAD1072}" presName="hierChild4" presStyleCnt="0"/>
@@ -8500,13 +7965,6 @@
     <dgm:pt modelId="{A5CB72EE-F72D-3746-ADEF-E2798CBFD5F7}" type="pres">
       <dgm:prSet presAssocID="{0826D219-B316-424A-B172-72637882D9E8}" presName="Name23" presStyleLbl="parChTrans1D4" presStyleIdx="1" presStyleCnt="2"/>
       <dgm:spPr/>
-      <dgm:t>
-        <a:bodyPr/>
-        <a:lstStyle/>
-        <a:p>
-          <a:endParaRPr lang="en-US"/>
-        </a:p>
-      </dgm:t>
     </dgm:pt>
     <dgm:pt modelId="{C466DE68-3392-F340-8CD0-65406AD8D033}" type="pres">
       <dgm:prSet presAssocID="{D6CC40DF-D085-884A-925C-AF82F02B555E}" presName="hierRoot4" presStyleCnt="0"/>
@@ -8527,13 +7985,6 @@
         </dgm:presLayoutVars>
       </dgm:prSet>
       <dgm:spPr/>
-      <dgm:t>
-        <a:bodyPr/>
-        <a:lstStyle/>
-        <a:p>
-          <a:endParaRPr lang="en-US"/>
-        </a:p>
-      </dgm:t>
     </dgm:pt>
     <dgm:pt modelId="{AF038B92-CD86-6F4A-A08F-46961E419A6B}" type="pres">
       <dgm:prSet presAssocID="{D6CC40DF-D085-884A-925C-AF82F02B555E}" presName="hierChild5" presStyleCnt="0"/>
@@ -8541,33 +7992,33 @@
     </dgm:pt>
   </dgm:ptLst>
   <dgm:cxnLst>
+    <dgm:cxn modelId="{ED223F0D-FE16-1246-9874-8C3A8AC3CC9C}" type="presOf" srcId="{420253DA-B5C3-F44A-BA26-12E3349C9ACA}" destId="{4823D33A-F3AC-1141-A957-E782912AFD3D}" srcOrd="0" destOrd="0" presId="urn:microsoft.com/office/officeart/2005/8/layout/hierarchy1"/>
+    <dgm:cxn modelId="{3DB4061A-EA5E-8346-B425-13254D0819E7}" type="presOf" srcId="{86E2D74A-ADCE-3946-89EF-093B6FCA5976}" destId="{A48127BC-1D32-A542-9B28-88A975663D96}" srcOrd="0" destOrd="0" presId="urn:microsoft.com/office/officeart/2005/8/layout/hierarchy1"/>
+    <dgm:cxn modelId="{DA0DDC1E-7AA6-664F-BDC1-15897D9E5B7C}" type="presOf" srcId="{9A02B939-554B-464A-B5C0-ACAE7DAD1072}" destId="{48D833B3-84F5-3E4A-AE1D-DC483D5C7E72}" srcOrd="0" destOrd="0" presId="urn:microsoft.com/office/officeart/2005/8/layout/hierarchy1"/>
+    <dgm:cxn modelId="{94A7B820-54E7-1A45-9AF2-3849BC4653D6}" type="presOf" srcId="{702AF669-2811-C249-9396-5AD5C1B6425A}" destId="{29343AAC-28C0-2F4C-957B-CF3D5990994D}" srcOrd="0" destOrd="0" presId="urn:microsoft.com/office/officeart/2005/8/layout/hierarchy1"/>
+    <dgm:cxn modelId="{35455233-0BCD-664D-AFE2-C1123701D340}" type="presOf" srcId="{B00810F7-60CA-7B40-B5CB-4816FBC561BC}" destId="{18A07BBE-3EB0-EA4D-9436-1FEE15853FED}" srcOrd="0" destOrd="0" presId="urn:microsoft.com/office/officeart/2005/8/layout/hierarchy1"/>
+    <dgm:cxn modelId="{08780D36-16AA-EC42-8902-8C8278F39AE7}" type="presOf" srcId="{321336F9-89D2-8A4D-987F-51457EA2FAD5}" destId="{767D958C-2DF8-1D49-A14E-633E23476F82}" srcOrd="0" destOrd="0" presId="urn:microsoft.com/office/officeart/2005/8/layout/hierarchy1"/>
+    <dgm:cxn modelId="{A2D55B3A-D340-944E-A6A9-3560390CF698}" srcId="{9A02B939-554B-464A-B5C0-ACAE7DAD1072}" destId="{D6CC40DF-D085-884A-925C-AF82F02B555E}" srcOrd="0" destOrd="0" parTransId="{0826D219-B316-424A-B172-72637882D9E8}" sibTransId="{10B8DA9B-1991-6A41-A68F-9965738B356F}"/>
     <dgm:cxn modelId="{E602354A-1DF2-7046-8FA5-E5049FE7C6D0}" srcId="{4F1EBDA6-0FF3-4E46-B44F-1191394D48CE}" destId="{C2D3F37D-D9DD-D947-B7D4-E6C4BA2EADA0}" srcOrd="0" destOrd="0" parTransId="{5490F66C-1198-AB46-8AB0-7C5953EA9E74}" sibTransId="{00699A99-2E56-7148-B40D-38015C6DEE62}"/>
-    <dgm:cxn modelId="{9F2EC5D5-C14A-8A4A-B1FA-5BE2C4192A0D}" type="presOf" srcId="{655AFFF4-AC8E-1F4C-84FC-49A4ECC26159}" destId="{140F0A54-B3FA-7E4B-86EB-A843C6B25D4C}" srcOrd="0" destOrd="0" presId="urn:microsoft.com/office/officeart/2005/8/layout/hierarchy1"/>
     <dgm:cxn modelId="{A6B3B556-9440-124E-9741-B65360F010B4}" srcId="{647D90F6-5AF1-204A-AB92-354A58078878}" destId="{912A98DA-949A-E246-A8B4-126347F3EEA5}" srcOrd="1" destOrd="0" parTransId="{702AF669-2811-C249-9396-5AD5C1B6425A}" sibTransId="{D236D6E0-8DC6-6C49-9327-9E39D1F3925A}"/>
-    <dgm:cxn modelId="{E1A5A9E1-12B3-4144-A912-3EAE3FFF1ABA}" type="presOf" srcId="{6988337F-91DD-394F-9A74-FD33DDA5A567}" destId="{25340BE3-F0D6-6A4A-AABB-247A8291EAF2}" srcOrd="0" destOrd="0" presId="urn:microsoft.com/office/officeart/2005/8/layout/hierarchy1"/>
-    <dgm:cxn modelId="{3DB4061A-EA5E-8346-B425-13254D0819E7}" type="presOf" srcId="{86E2D74A-ADCE-3946-89EF-093B6FCA5976}" destId="{A48127BC-1D32-A542-9B28-88A975663D96}" srcOrd="0" destOrd="0" presId="urn:microsoft.com/office/officeart/2005/8/layout/hierarchy1"/>
-    <dgm:cxn modelId="{08780D36-16AA-EC42-8902-8C8278F39AE7}" type="presOf" srcId="{321336F9-89D2-8A4D-987F-51457EA2FAD5}" destId="{767D958C-2DF8-1D49-A14E-633E23476F82}" srcOrd="0" destOrd="0" presId="urn:microsoft.com/office/officeart/2005/8/layout/hierarchy1"/>
+    <dgm:cxn modelId="{8771055F-1A18-AB4F-AB77-BA6BB69C469B}" type="presOf" srcId="{B1F26535-9B55-C547-A8BE-E3105B835D8D}" destId="{09905DF9-C207-7C45-8E9C-534F5C65DFF6}" srcOrd="0" destOrd="0" presId="urn:microsoft.com/office/officeart/2005/8/layout/hierarchy1"/>
     <dgm:cxn modelId="{8716AD76-F0C1-E045-A78C-F6871BC9418F}" type="presOf" srcId="{C2D3F37D-D9DD-D947-B7D4-E6C4BA2EADA0}" destId="{54CB0C0E-DBAB-4A41-A445-CCD7B3FC2049}" srcOrd="0" destOrd="0" presId="urn:microsoft.com/office/officeart/2005/8/layout/hierarchy1"/>
-    <dgm:cxn modelId="{8771055F-1A18-AB4F-AB77-BA6BB69C469B}" type="presOf" srcId="{B1F26535-9B55-C547-A8BE-E3105B835D8D}" destId="{09905DF9-C207-7C45-8E9C-534F5C65DFF6}" srcOrd="0" destOrd="0" presId="urn:microsoft.com/office/officeart/2005/8/layout/hierarchy1"/>
-    <dgm:cxn modelId="{7E7642F8-9708-104B-B82F-D7A22B6818EA}" srcId="{647D90F6-5AF1-204A-AB92-354A58078878}" destId="{321336F9-89D2-8A4D-987F-51457EA2FAD5}" srcOrd="0" destOrd="0" parTransId="{35AB792A-0E89-284E-BFEF-FAC639ED1476}" sibTransId="{BA2CC2AC-B721-C844-89D4-0DADFF00BBF3}"/>
-    <dgm:cxn modelId="{A2D55B3A-D340-944E-A6A9-3560390CF698}" srcId="{9A02B939-554B-464A-B5C0-ACAE7DAD1072}" destId="{D6CC40DF-D085-884A-925C-AF82F02B555E}" srcOrd="0" destOrd="0" parTransId="{0826D219-B316-424A-B172-72637882D9E8}" sibTransId="{10B8DA9B-1991-6A41-A68F-9965738B356F}"/>
-    <dgm:cxn modelId="{D9E503B6-6710-6144-9792-B8C56B065C4F}" srcId="{B00810F7-60CA-7B40-B5CB-4816FBC561BC}" destId="{420253DA-B5C3-F44A-BA26-12E3349C9ACA}" srcOrd="0" destOrd="0" parTransId="{EA73CF5D-2383-F945-B6A9-FAEEE4326717}" sibTransId="{DEED8285-670D-1442-97B3-EAE299959C4D}"/>
     <dgm:cxn modelId="{BB55FF7D-35F4-7E45-B468-D09748A0A373}" type="presOf" srcId="{4F1EBDA6-0FF3-4E46-B44F-1191394D48CE}" destId="{4EB85A4E-B0F5-734B-9144-4D7A08EF7CDB}" srcOrd="0" destOrd="0" presId="urn:microsoft.com/office/officeart/2005/8/layout/hierarchy1"/>
     <dgm:cxn modelId="{3BAF7082-10C6-B646-9FEE-039BB0CFC95C}" srcId="{6988337F-91DD-394F-9A74-FD33DDA5A567}" destId="{9A02B939-554B-464A-B5C0-ACAE7DAD1072}" srcOrd="1" destOrd="0" parTransId="{655AFFF4-AC8E-1F4C-84FC-49A4ECC26159}" sibTransId="{255F02E8-C0F1-6D4F-B552-BDE1A4687825}"/>
-    <dgm:cxn modelId="{94A7B820-54E7-1A45-9AF2-3849BC4653D6}" type="presOf" srcId="{702AF669-2811-C249-9396-5AD5C1B6425A}" destId="{29343AAC-28C0-2F4C-957B-CF3D5990994D}" srcOrd="0" destOrd="0" presId="urn:microsoft.com/office/officeart/2005/8/layout/hierarchy1"/>
+    <dgm:cxn modelId="{9AB68483-D037-324B-B7FC-6C52430B460C}" type="presOf" srcId="{647D90F6-5AF1-204A-AB92-354A58078878}" destId="{B3D39107-6BA5-DA40-9943-4B2C7EDF1596}" srcOrd="0" destOrd="0" presId="urn:microsoft.com/office/officeart/2005/8/layout/hierarchy1"/>
+    <dgm:cxn modelId="{4C186285-4548-CB42-AB83-D24C21122F68}" type="presOf" srcId="{73E6D2F5-89DD-C04A-BE00-62E043B4A88B}" destId="{D21AED92-83AC-DC41-BE5A-8677FEF76A1C}" srcOrd="0" destOrd="0" presId="urn:microsoft.com/office/officeart/2005/8/layout/hierarchy1"/>
+    <dgm:cxn modelId="{34D4A396-5D37-3740-A1E7-85AD06ACF6DA}" srcId="{C2D3F37D-D9DD-D947-B7D4-E6C4BA2EADA0}" destId="{6988337F-91DD-394F-9A74-FD33DDA5A567}" srcOrd="1" destOrd="0" parTransId="{86E2D74A-ADCE-3946-89EF-093B6FCA5976}" sibTransId="{FC6E756D-20F5-0246-BE12-FC62A67212A8}"/>
+    <dgm:cxn modelId="{FF257E97-1889-DA4A-B728-44498A4242EC}" srcId="{C2D3F37D-D9DD-D947-B7D4-E6C4BA2EADA0}" destId="{647D90F6-5AF1-204A-AB92-354A58078878}" srcOrd="0" destOrd="0" parTransId="{B1F26535-9B55-C547-A8BE-E3105B835D8D}" sibTransId="{FE348C27-B4CD-8648-8F67-7EAE644EE035}"/>
+    <dgm:cxn modelId="{5BB3FA9A-B1B1-8140-A6D7-AEB05650F492}" type="presOf" srcId="{0826D219-B316-424A-B172-72637882D9E8}" destId="{A5CB72EE-F72D-3746-ADEF-E2798CBFD5F7}" srcOrd="0" destOrd="0" presId="urn:microsoft.com/office/officeart/2005/8/layout/hierarchy1"/>
     <dgm:cxn modelId="{47C961AB-BDA7-F748-AA69-32F568079594}" srcId="{6988337F-91DD-394F-9A74-FD33DDA5A567}" destId="{B00810F7-60CA-7B40-B5CB-4816FBC561BC}" srcOrd="0" destOrd="0" parTransId="{73E6D2F5-89DD-C04A-BE00-62E043B4A88B}" sibTransId="{F9034B44-D05F-9748-8C6F-06F2112F7722}"/>
-    <dgm:cxn modelId="{DA0DDC1E-7AA6-664F-BDC1-15897D9E5B7C}" type="presOf" srcId="{9A02B939-554B-464A-B5C0-ACAE7DAD1072}" destId="{48D833B3-84F5-3E4A-AE1D-DC483D5C7E72}" srcOrd="0" destOrd="0" presId="urn:microsoft.com/office/officeart/2005/8/layout/hierarchy1"/>
-    <dgm:cxn modelId="{4C186285-4548-CB42-AB83-D24C21122F68}" type="presOf" srcId="{73E6D2F5-89DD-C04A-BE00-62E043B4A88B}" destId="{D21AED92-83AC-DC41-BE5A-8677FEF76A1C}" srcOrd="0" destOrd="0" presId="urn:microsoft.com/office/officeart/2005/8/layout/hierarchy1"/>
+    <dgm:cxn modelId="{D9E503B6-6710-6144-9792-B8C56B065C4F}" srcId="{B00810F7-60CA-7B40-B5CB-4816FBC561BC}" destId="{420253DA-B5C3-F44A-BA26-12E3349C9ACA}" srcOrd="0" destOrd="0" parTransId="{EA73CF5D-2383-F945-B6A9-FAEEE4326717}" sibTransId="{DEED8285-670D-1442-97B3-EAE299959C4D}"/>
     <dgm:cxn modelId="{F94E4EB7-5833-E64C-8FB1-488CDEB9CB8E}" type="presOf" srcId="{912A98DA-949A-E246-A8B4-126347F3EEA5}" destId="{5F0BF165-ABB9-A549-A485-9700D564558A}" srcOrd="0" destOrd="0" presId="urn:microsoft.com/office/officeart/2005/8/layout/hierarchy1"/>
+    <dgm:cxn modelId="{9F2EC5D5-C14A-8A4A-B1FA-5BE2C4192A0D}" type="presOf" srcId="{655AFFF4-AC8E-1F4C-84FC-49A4ECC26159}" destId="{140F0A54-B3FA-7E4B-86EB-A843C6B25D4C}" srcOrd="0" destOrd="0" presId="urn:microsoft.com/office/officeart/2005/8/layout/hierarchy1"/>
+    <dgm:cxn modelId="{E1A5A9E1-12B3-4144-A912-3EAE3FFF1ABA}" type="presOf" srcId="{6988337F-91DD-394F-9A74-FD33DDA5A567}" destId="{25340BE3-F0D6-6A4A-AABB-247A8291EAF2}" srcOrd="0" destOrd="0" presId="urn:microsoft.com/office/officeart/2005/8/layout/hierarchy1"/>
+    <dgm:cxn modelId="{322E4EE3-1ACD-7D40-A711-CC9708123CF1}" type="presOf" srcId="{35AB792A-0E89-284E-BFEF-FAC639ED1476}" destId="{23A4A0CC-05ED-5645-9DC2-D5F20E3BE572}" srcOrd="0" destOrd="0" presId="urn:microsoft.com/office/officeart/2005/8/layout/hierarchy1"/>
+    <dgm:cxn modelId="{99CFBDE5-D08B-BA43-8A13-68C12425A8B0}" type="presOf" srcId="{EA73CF5D-2383-F945-B6A9-FAEEE4326717}" destId="{20B6F93A-4286-B348-BD3D-752123CDAF4A}" srcOrd="0" destOrd="0" presId="urn:microsoft.com/office/officeart/2005/8/layout/hierarchy1"/>
+    <dgm:cxn modelId="{7E7642F8-9708-104B-B82F-D7A22B6818EA}" srcId="{647D90F6-5AF1-204A-AB92-354A58078878}" destId="{321336F9-89D2-8A4D-987F-51457EA2FAD5}" srcOrd="0" destOrd="0" parTransId="{35AB792A-0E89-284E-BFEF-FAC639ED1476}" sibTransId="{BA2CC2AC-B721-C844-89D4-0DADFF00BBF3}"/>
     <dgm:cxn modelId="{A44AFCF9-2960-B846-B512-3EB7F735D509}" type="presOf" srcId="{D6CC40DF-D085-884A-925C-AF82F02B555E}" destId="{33B9C726-5306-5449-8227-4362FEB4E636}" srcOrd="0" destOrd="0" presId="urn:microsoft.com/office/officeart/2005/8/layout/hierarchy1"/>
-    <dgm:cxn modelId="{322E4EE3-1ACD-7D40-A711-CC9708123CF1}" type="presOf" srcId="{35AB792A-0E89-284E-BFEF-FAC639ED1476}" destId="{23A4A0CC-05ED-5645-9DC2-D5F20E3BE572}" srcOrd="0" destOrd="0" presId="urn:microsoft.com/office/officeart/2005/8/layout/hierarchy1"/>
-    <dgm:cxn modelId="{FF257E97-1889-DA4A-B728-44498A4242EC}" srcId="{C2D3F37D-D9DD-D947-B7D4-E6C4BA2EADA0}" destId="{647D90F6-5AF1-204A-AB92-354A58078878}" srcOrd="0" destOrd="0" parTransId="{B1F26535-9B55-C547-A8BE-E3105B835D8D}" sibTransId="{FE348C27-B4CD-8648-8F67-7EAE644EE035}"/>
-    <dgm:cxn modelId="{34D4A396-5D37-3740-A1E7-85AD06ACF6DA}" srcId="{C2D3F37D-D9DD-D947-B7D4-E6C4BA2EADA0}" destId="{6988337F-91DD-394F-9A74-FD33DDA5A567}" srcOrd="1" destOrd="0" parTransId="{86E2D74A-ADCE-3946-89EF-093B6FCA5976}" sibTransId="{FC6E756D-20F5-0246-BE12-FC62A67212A8}"/>
-    <dgm:cxn modelId="{9AB68483-D037-324B-B7FC-6C52430B460C}" type="presOf" srcId="{647D90F6-5AF1-204A-AB92-354A58078878}" destId="{B3D39107-6BA5-DA40-9943-4B2C7EDF1596}" srcOrd="0" destOrd="0" presId="urn:microsoft.com/office/officeart/2005/8/layout/hierarchy1"/>
-    <dgm:cxn modelId="{ED223F0D-FE16-1246-9874-8C3A8AC3CC9C}" type="presOf" srcId="{420253DA-B5C3-F44A-BA26-12E3349C9ACA}" destId="{4823D33A-F3AC-1141-A957-E782912AFD3D}" srcOrd="0" destOrd="0" presId="urn:microsoft.com/office/officeart/2005/8/layout/hierarchy1"/>
-    <dgm:cxn modelId="{99CFBDE5-D08B-BA43-8A13-68C12425A8B0}" type="presOf" srcId="{EA73CF5D-2383-F945-B6A9-FAEEE4326717}" destId="{20B6F93A-4286-B348-BD3D-752123CDAF4A}" srcOrd="0" destOrd="0" presId="urn:microsoft.com/office/officeart/2005/8/layout/hierarchy1"/>
-    <dgm:cxn modelId="{5BB3FA9A-B1B1-8140-A6D7-AEB05650F492}" type="presOf" srcId="{0826D219-B316-424A-B172-72637882D9E8}" destId="{A5CB72EE-F72D-3746-ADEF-E2798CBFD5F7}" srcOrd="0" destOrd="0" presId="urn:microsoft.com/office/officeart/2005/8/layout/hierarchy1"/>
-    <dgm:cxn modelId="{35455233-0BCD-664D-AFE2-C1123701D340}" type="presOf" srcId="{B00810F7-60CA-7B40-B5CB-4816FBC561BC}" destId="{18A07BBE-3EB0-EA4D-9436-1FEE15853FED}" srcOrd="0" destOrd="0" presId="urn:microsoft.com/office/officeart/2005/8/layout/hierarchy1"/>
     <dgm:cxn modelId="{15B35545-4BB0-B74C-AD37-882BCABC8A11}" type="presParOf" srcId="{4EB85A4E-B0F5-734B-9144-4D7A08EF7CDB}" destId="{23FFA827-5EFD-AB4E-98DA-DE8C1C344CCE}" srcOrd="0" destOrd="0" presId="urn:microsoft.com/office/officeart/2005/8/layout/hierarchy1"/>
     <dgm:cxn modelId="{AFEEBDA2-10E1-8444-89CA-91C00EC31F99}" type="presParOf" srcId="{23FFA827-5EFD-AB4E-98DA-DE8C1C344CCE}" destId="{D2DD95EE-32D9-CD44-AA5F-80FAC745567C}" srcOrd="0" destOrd="0" presId="urn:microsoft.com/office/officeart/2005/8/layout/hierarchy1"/>
     <dgm:cxn modelId="{06C865D1-1E68-274E-81BD-A29710BB7B38}" type="presParOf" srcId="{D2DD95EE-32D9-CD44-AA5F-80FAC745567C}" destId="{34DC9CC0-61AD-3848-9E46-B9EAE400EC5D}" srcOrd="0" destOrd="0" presId="urn:microsoft.com/office/officeart/2005/8/layout/hierarchy1"/>
@@ -8713,7 +8164,7 @@
         </a:bodyPr>
         <a:lstStyle/>
         <a:p>
-          <a:pPr lvl="0" algn="ctr" defTabSz="755650">
+          <a:pPr marL="0" lvl="0" indent="0" algn="ctr" defTabSz="755650">
             <a:lnSpc>
               <a:spcPct val="90000"/>
             </a:lnSpc>
@@ -8723,20 +8174,20 @@
             <a:spcAft>
               <a:spcPct val="35000"/>
             </a:spcAft>
+            <a:buNone/>
           </a:pPr>
           <a:r>
-            <a:rPr lang="en-US" sz="1700" kern="1200" dirty="0" smtClean="0"/>
+            <a:rPr lang="en-US" sz="1700" kern="1200" dirty="0"/>
             <a:t>(IN, A, ‘</a:t>
           </a:r>
           <a:r>
-            <a:rPr lang="en-US" sz="1700" kern="1200" dirty="0" err="1" smtClean="0"/>
+            <a:rPr lang="en-US" sz="1700" kern="1200" dirty="0" err="1"/>
             <a:t>www.google.com</a:t>
           </a:r>
           <a:r>
-            <a:rPr lang="en-US" sz="1700" kern="1200" dirty="0" smtClean="0"/>
+            <a:rPr lang="en-US" sz="1700" kern="1200" dirty="0"/>
             <a:t>’)</a:t>
           </a:r>
-          <a:endParaRPr lang="en-US" sz="1700" kern="1200" dirty="0"/>
         </a:p>
       </dsp:txBody>
       <dsp:txXfrm>
@@ -8803,7 +8254,7 @@
         </a:bodyPr>
         <a:lstStyle/>
         <a:p>
-          <a:pPr lvl="0" algn="ctr" defTabSz="222250">
+          <a:pPr marL="0" lvl="0" indent="0" algn="ctr" defTabSz="222250">
             <a:lnSpc>
               <a:spcPct val="90000"/>
             </a:lnSpc>
@@ -8813,6 +8264,7 @@
             <a:spcAft>
               <a:spcPct val="35000"/>
             </a:spcAft>
+            <a:buNone/>
           </a:pPr>
           <a:endParaRPr lang="en-US" sz="500" kern="1200"/>
         </a:p>
@@ -8895,7 +8347,7 @@
         </a:bodyPr>
         <a:lstStyle/>
         <a:p>
-          <a:pPr lvl="0" algn="ctr" defTabSz="755650">
+          <a:pPr marL="0" lvl="0" indent="0" algn="ctr" defTabSz="755650">
             <a:lnSpc>
               <a:spcPct val="90000"/>
             </a:lnSpc>
@@ -8905,12 +8357,12 @@
             <a:spcAft>
               <a:spcPct val="35000"/>
             </a:spcAft>
+            <a:buNone/>
           </a:pPr>
           <a:r>
-            <a:rPr lang="en-US" sz="1700" kern="1200" dirty="0" smtClean="0"/>
+            <a:rPr lang="en-US" sz="1700" kern="1200" dirty="0"/>
             <a:t>(IN, A, 120, 172.23.14.1)</a:t>
           </a:r>
-          <a:endParaRPr lang="en-US" sz="1700" kern="1200" dirty="0"/>
         </a:p>
       </dsp:txBody>
       <dsp:txXfrm>
@@ -8977,7 +8429,7 @@
         </a:bodyPr>
         <a:lstStyle/>
         <a:p>
-          <a:pPr lvl="0" algn="ctr" defTabSz="222250">
+          <a:pPr marL="0" lvl="0" indent="0" algn="ctr" defTabSz="222250">
             <a:lnSpc>
               <a:spcPct val="90000"/>
             </a:lnSpc>
@@ -8987,6 +8439,7 @@
             <a:spcAft>
               <a:spcPct val="35000"/>
             </a:spcAft>
+            <a:buNone/>
           </a:pPr>
           <a:endParaRPr lang="en-US" sz="500" kern="1200"/>
         </a:p>
@@ -9069,7 +8522,7 @@
         </a:bodyPr>
         <a:lstStyle/>
         <a:p>
-          <a:pPr lvl="0" algn="ctr" defTabSz="755650">
+          <a:pPr marL="0" lvl="0" indent="0" algn="ctr" defTabSz="755650">
             <a:lnSpc>
               <a:spcPct val="90000"/>
             </a:lnSpc>
@@ -9079,12 +8532,12 @@
             <a:spcAft>
               <a:spcPct val="35000"/>
             </a:spcAft>
+            <a:buNone/>
           </a:pPr>
           <a:r>
-            <a:rPr lang="en-US" sz="1700" kern="1200" dirty="0" smtClean="0"/>
+            <a:rPr lang="en-US" sz="1700" kern="1200" dirty="0"/>
             <a:t>(IN, A, 120, 172.23.14.2)</a:t>
           </a:r>
-          <a:endParaRPr lang="en-US" sz="1700" kern="1200" dirty="0"/>
         </a:p>
       </dsp:txBody>
       <dsp:txXfrm>
@@ -9151,7 +8604,7 @@
         </a:bodyPr>
         <a:lstStyle/>
         <a:p>
-          <a:pPr lvl="0" algn="ctr" defTabSz="222250">
+          <a:pPr marL="0" lvl="0" indent="0" algn="ctr" defTabSz="222250">
             <a:lnSpc>
               <a:spcPct val="90000"/>
             </a:lnSpc>
@@ -9161,6 +8614,7 @@
             <a:spcAft>
               <a:spcPct val="35000"/>
             </a:spcAft>
+            <a:buNone/>
           </a:pPr>
           <a:endParaRPr lang="en-US" sz="500" kern="1200"/>
         </a:p>
@@ -9243,7 +8697,7 @@
         </a:bodyPr>
         <a:lstStyle/>
         <a:p>
-          <a:pPr lvl="0" algn="ctr" defTabSz="755650">
+          <a:pPr marL="0" lvl="0" indent="0" algn="ctr" defTabSz="755650">
             <a:lnSpc>
               <a:spcPct val="90000"/>
             </a:lnSpc>
@@ -9253,12 +8707,12 @@
             <a:spcAft>
               <a:spcPct val="35000"/>
             </a:spcAft>
+            <a:buNone/>
           </a:pPr>
           <a:r>
-            <a:rPr lang="en-US" sz="1700" kern="1200" dirty="0" smtClean="0"/>
+            <a:rPr lang="en-US" sz="1700" kern="1200" dirty="0"/>
             <a:t>(IN, A, 120, 172.23.14.3)</a:t>
           </a:r>
-          <a:endParaRPr lang="en-US" sz="1700" kern="1200" dirty="0"/>
         </a:p>
       </dsp:txBody>
       <dsp:txXfrm>
@@ -9869,7 +9323,7 @@
         </a:bodyPr>
         <a:lstStyle/>
         <a:p>
-          <a:pPr lvl="0" algn="ctr" defTabSz="577850">
+          <a:pPr marL="0" lvl="0" indent="0" algn="ctr" defTabSz="577850">
             <a:lnSpc>
               <a:spcPct val="90000"/>
             </a:lnSpc>
@@ -9879,16 +9333,16 @@
             <a:spcAft>
               <a:spcPct val="35000"/>
             </a:spcAft>
+            <a:buNone/>
           </a:pPr>
           <a:r>
-            <a:rPr lang="en-US" sz="1300" kern="1200" dirty="0" err="1" smtClean="0"/>
+            <a:rPr lang="en-US" sz="1300" kern="1200" dirty="0" err="1"/>
             <a:t>Raíz</a:t>
           </a:r>
           <a:r>
-            <a:rPr lang="en-US" sz="1300" kern="1200" dirty="0" smtClean="0"/>
+            <a:rPr lang="en-US" sz="1300" kern="1200" dirty="0"/>
             <a:t> (.)</a:t>
           </a:r>
-          <a:endParaRPr lang="en-US" sz="1300" kern="1200" dirty="0"/>
         </a:p>
       </dsp:txBody>
       <dsp:txXfrm>
@@ -10019,7 +9473,7 @@
         </a:bodyPr>
         <a:lstStyle/>
         <a:p>
-          <a:pPr lvl="0" algn="ctr" defTabSz="577850">
+          <a:pPr marL="0" lvl="0" indent="0" algn="ctr" defTabSz="577850">
             <a:lnSpc>
               <a:spcPct val="90000"/>
             </a:lnSpc>
@@ -10029,12 +9483,12 @@
             <a:spcAft>
               <a:spcPct val="35000"/>
             </a:spcAft>
+            <a:buNone/>
           </a:pPr>
           <a:r>
-            <a:rPr lang="en-US" sz="1300" kern="1200" dirty="0" smtClean="0"/>
+            <a:rPr lang="en-US" sz="1300" kern="1200" dirty="0"/>
             <a:t>com, net, org</a:t>
           </a:r>
-          <a:endParaRPr lang="en-US" sz="1300" kern="1200" dirty="0"/>
         </a:p>
       </dsp:txBody>
       <dsp:txXfrm>
@@ -10165,7 +9619,7 @@
         </a:bodyPr>
         <a:lstStyle/>
         <a:p>
-          <a:pPr lvl="0" algn="ctr" defTabSz="577850">
+          <a:pPr marL="0" lvl="0" indent="0" algn="ctr" defTabSz="577850">
             <a:lnSpc>
               <a:spcPct val="90000"/>
             </a:lnSpc>
@@ -10175,12 +9629,12 @@
             <a:spcAft>
               <a:spcPct val="35000"/>
             </a:spcAft>
+            <a:buNone/>
           </a:pPr>
           <a:r>
-            <a:rPr lang="en-US" sz="1300" kern="1200" dirty="0" smtClean="0"/>
+            <a:rPr lang="en-US" sz="1300" kern="1200" dirty="0"/>
             <a:t>dom1</a:t>
           </a:r>
-          <a:endParaRPr lang="en-US" sz="1300" kern="1200" dirty="0"/>
         </a:p>
       </dsp:txBody>
       <dsp:txXfrm>
@@ -10311,7 +9765,7 @@
         </a:bodyPr>
         <a:lstStyle/>
         <a:p>
-          <a:pPr lvl="0" algn="ctr" defTabSz="577850">
+          <a:pPr marL="0" lvl="0" indent="0" algn="ctr" defTabSz="577850">
             <a:lnSpc>
               <a:spcPct val="90000"/>
             </a:lnSpc>
@@ -10321,12 +9775,12 @@
             <a:spcAft>
               <a:spcPct val="35000"/>
             </a:spcAft>
+            <a:buNone/>
           </a:pPr>
           <a:r>
-            <a:rPr lang="en-US" sz="1300" kern="1200" dirty="0" smtClean="0"/>
+            <a:rPr lang="en-US" sz="1300" kern="1200" dirty="0"/>
             <a:t>dom2</a:t>
           </a:r>
-          <a:endParaRPr lang="en-US" sz="1300" kern="1200" dirty="0"/>
         </a:p>
       </dsp:txBody>
       <dsp:txXfrm>
@@ -10457,7 +9911,7 @@
         </a:bodyPr>
         <a:lstStyle/>
         <a:p>
-          <a:pPr lvl="0" algn="ctr" defTabSz="577850">
+          <a:pPr marL="0" lvl="0" indent="0" algn="ctr" defTabSz="577850">
             <a:lnSpc>
               <a:spcPct val="90000"/>
             </a:lnSpc>
@@ -10467,9 +9921,10 @@
             <a:spcAft>
               <a:spcPct val="35000"/>
             </a:spcAft>
+            <a:buNone/>
           </a:pPr>
           <a:r>
-            <a:rPr lang="en-US" sz="1300" kern="1200" dirty="0" err="1" smtClean="0"/>
+            <a:rPr lang="en-US" sz="1300" kern="1200" dirty="0" err="1"/>
             <a:t>arpa</a:t>
           </a:r>
           <a:endParaRPr lang="en-US" sz="1300" kern="1200" dirty="0"/>
@@ -10603,7 +10058,7 @@
         </a:bodyPr>
         <a:lstStyle/>
         <a:p>
-          <a:pPr lvl="0" algn="ctr" defTabSz="577850">
+          <a:pPr marL="0" lvl="0" indent="0" algn="ctr" defTabSz="577850">
             <a:lnSpc>
               <a:spcPct val="90000"/>
             </a:lnSpc>
@@ -10613,13 +10068,14 @@
             <a:spcAft>
               <a:spcPct val="35000"/>
             </a:spcAft>
+            <a:buNone/>
           </a:pPr>
           <a:r>
-            <a:rPr lang="en-US" sz="1300" kern="1200" dirty="0" smtClean="0"/>
+            <a:rPr lang="en-US" sz="1300" kern="1200" dirty="0"/>
             <a:t>in-</a:t>
           </a:r>
           <a:r>
-            <a:rPr lang="en-US" sz="1300" kern="1200" dirty="0" err="1" smtClean="0"/>
+            <a:rPr lang="en-US" sz="1300" kern="1200" dirty="0" err="1"/>
             <a:t>addr</a:t>
           </a:r>
           <a:endParaRPr lang="en-US" sz="1300" kern="1200" dirty="0"/>
@@ -10753,7 +10209,7 @@
         </a:bodyPr>
         <a:lstStyle/>
         <a:p>
-          <a:pPr lvl="0" algn="ctr" defTabSz="577850">
+          <a:pPr marL="0" lvl="0" indent="0" algn="ctr" defTabSz="577850">
             <a:lnSpc>
               <a:spcPct val="90000"/>
             </a:lnSpc>
@@ -10763,12 +10219,12 @@
             <a:spcAft>
               <a:spcPct val="35000"/>
             </a:spcAft>
+            <a:buNone/>
           </a:pPr>
           <a:r>
-            <a:rPr lang="en-US" sz="1300" kern="1200" dirty="0" smtClean="0"/>
+            <a:rPr lang="en-US" sz="1300" kern="1200" dirty="0"/>
             <a:t>177</a:t>
           </a:r>
-          <a:endParaRPr lang="en-US" sz="1300" kern="1200" dirty="0"/>
         </a:p>
       </dsp:txBody>
       <dsp:txXfrm>
@@ -10899,7 +10355,7 @@
         </a:bodyPr>
         <a:lstStyle/>
         <a:p>
-          <a:pPr lvl="0" algn="ctr" defTabSz="577850">
+          <a:pPr marL="0" lvl="0" indent="0" algn="ctr" defTabSz="577850">
             <a:lnSpc>
               <a:spcPct val="90000"/>
             </a:lnSpc>
@@ -10909,12 +10365,12 @@
             <a:spcAft>
               <a:spcPct val="35000"/>
             </a:spcAft>
+            <a:buNone/>
           </a:pPr>
           <a:r>
-            <a:rPr lang="en-US" sz="1300" kern="1200" dirty="0" smtClean="0"/>
+            <a:rPr lang="en-US" sz="1300" kern="1200" dirty="0"/>
             <a:t>Ip6</a:t>
           </a:r>
-          <a:endParaRPr lang="en-US" sz="1300" kern="1200" dirty="0"/>
         </a:p>
       </dsp:txBody>
       <dsp:txXfrm>
@@ -11045,7 +10501,7 @@
         </a:bodyPr>
         <a:lstStyle/>
         <a:p>
-          <a:pPr lvl="0" algn="ctr" defTabSz="577850">
+          <a:pPr marL="0" lvl="0" indent="0" algn="ctr" defTabSz="577850">
             <a:lnSpc>
               <a:spcPct val="90000"/>
             </a:lnSpc>
@@ -11055,12 +10511,12 @@
             <a:spcAft>
               <a:spcPct val="35000"/>
             </a:spcAft>
+            <a:buNone/>
           </a:pPr>
           <a:r>
-            <a:rPr lang="en-US" sz="1300" kern="1200" dirty="0" smtClean="0"/>
+            <a:rPr lang="en-US" sz="1300" kern="1200" dirty="0"/>
             <a:t>0.8.2</a:t>
           </a:r>
-          <a:endParaRPr lang="en-US" sz="1300" kern="1200" dirty="0"/>
         </a:p>
       </dsp:txBody>
       <dsp:txXfrm>
@@ -11671,7 +11127,7 @@
         </a:bodyPr>
         <a:lstStyle/>
         <a:p>
-          <a:pPr lvl="0" algn="ctr" defTabSz="577850">
+          <a:pPr marL="0" lvl="0" indent="0" algn="ctr" defTabSz="577850">
             <a:lnSpc>
               <a:spcPct val="90000"/>
             </a:lnSpc>
@@ -11681,13 +11137,14 @@
             <a:spcAft>
               <a:spcPct val="35000"/>
             </a:spcAft>
+            <a:buNone/>
           </a:pPr>
           <a:r>
-            <a:rPr lang="en-US" sz="1300" kern="1200" dirty="0" smtClean="0"/>
+            <a:rPr lang="en-US" sz="1300" kern="1200" dirty="0"/>
             <a:t>in-</a:t>
           </a:r>
           <a:r>
-            <a:rPr lang="en-US" sz="1300" kern="1200" dirty="0" err="1" smtClean="0"/>
+            <a:rPr lang="en-US" sz="1300" kern="1200" dirty="0" err="1"/>
             <a:t>addr.arpa</a:t>
           </a:r>
           <a:endParaRPr lang="en-US" sz="1300" kern="1200" dirty="0"/>
@@ -11821,7 +11278,7 @@
         </a:bodyPr>
         <a:lstStyle/>
         <a:p>
-          <a:pPr lvl="0" algn="ctr" defTabSz="577850">
+          <a:pPr marL="0" lvl="0" indent="0" algn="ctr" defTabSz="577850">
             <a:lnSpc>
               <a:spcPct val="90000"/>
             </a:lnSpc>
@@ -11831,12 +11288,12 @@
             <a:spcAft>
               <a:spcPct val="35000"/>
             </a:spcAft>
+            <a:buNone/>
           </a:pPr>
           <a:r>
-            <a:rPr lang="en-US" sz="1300" kern="1200" dirty="0" smtClean="0"/>
+            <a:rPr lang="en-US" sz="1300" kern="1200" dirty="0"/>
             <a:t>177</a:t>
           </a:r>
-          <a:endParaRPr lang="en-US" sz="1300" kern="1200" dirty="0"/>
         </a:p>
       </dsp:txBody>
       <dsp:txXfrm>
@@ -11967,7 +11424,7 @@
         </a:bodyPr>
         <a:lstStyle/>
         <a:p>
-          <a:pPr lvl="0" algn="ctr" defTabSz="577850">
+          <a:pPr marL="0" lvl="0" indent="0" algn="ctr" defTabSz="577850">
             <a:lnSpc>
               <a:spcPct val="90000"/>
             </a:lnSpc>
@@ -11977,12 +11434,12 @@
             <a:spcAft>
               <a:spcPct val="35000"/>
             </a:spcAft>
+            <a:buNone/>
           </a:pPr>
           <a:r>
-            <a:rPr lang="en-US" sz="1300" kern="1200" dirty="0" smtClean="0"/>
+            <a:rPr lang="en-US" sz="1300" kern="1200" dirty="0"/>
             <a:t>1</a:t>
           </a:r>
-          <a:endParaRPr lang="en-US" sz="1300" kern="1200" dirty="0"/>
         </a:p>
       </dsp:txBody>
       <dsp:txXfrm>
@@ -12113,7 +11570,7 @@
         </a:bodyPr>
         <a:lstStyle/>
         <a:p>
-          <a:pPr lvl="0" algn="ctr" defTabSz="577850">
+          <a:pPr marL="0" lvl="0" indent="0" algn="ctr" defTabSz="577850">
             <a:lnSpc>
               <a:spcPct val="90000"/>
             </a:lnSpc>
@@ -12123,12 +11580,12 @@
             <a:spcAft>
               <a:spcPct val="35000"/>
             </a:spcAft>
+            <a:buNone/>
           </a:pPr>
           <a:r>
-            <a:rPr lang="en-US" sz="1300" kern="1200" dirty="0" smtClean="0"/>
+            <a:rPr lang="en-US" sz="1300" kern="1200" dirty="0"/>
             <a:t>2</a:t>
           </a:r>
-          <a:endParaRPr lang="en-US" sz="1300" kern="1200" dirty="0"/>
         </a:p>
       </dsp:txBody>
       <dsp:txXfrm>
@@ -12259,7 +11716,7 @@
         </a:bodyPr>
         <a:lstStyle/>
         <a:p>
-          <a:pPr lvl="0" algn="ctr" defTabSz="577850">
+          <a:pPr marL="0" lvl="0" indent="0" algn="ctr" defTabSz="577850">
             <a:lnSpc>
               <a:spcPct val="90000"/>
             </a:lnSpc>
@@ -12269,12 +11726,12 @@
             <a:spcAft>
               <a:spcPct val="35000"/>
             </a:spcAft>
+            <a:buNone/>
           </a:pPr>
           <a:r>
-            <a:rPr lang="en-US" sz="1300" kern="1200" dirty="0" smtClean="0"/>
+            <a:rPr lang="en-US" sz="1300" kern="1200" dirty="0"/>
             <a:t>181</a:t>
           </a:r>
-          <a:endParaRPr lang="en-US" sz="1300" kern="1200" dirty="0"/>
         </a:p>
       </dsp:txBody>
       <dsp:txXfrm>
@@ -12405,7 +11862,7 @@
         </a:bodyPr>
         <a:lstStyle/>
         <a:p>
-          <a:pPr lvl="0" algn="ctr" defTabSz="577850">
+          <a:pPr marL="0" lvl="0" indent="0" algn="ctr" defTabSz="577850">
             <a:lnSpc>
               <a:spcPct val="90000"/>
             </a:lnSpc>
@@ -12415,12 +11872,12 @@
             <a:spcAft>
               <a:spcPct val="35000"/>
             </a:spcAft>
+            <a:buNone/>
           </a:pPr>
           <a:r>
-            <a:rPr lang="en-US" sz="1300" kern="1200" dirty="0" smtClean="0"/>
+            <a:rPr lang="en-US" sz="1300" kern="1200" dirty="0"/>
             <a:t>1</a:t>
           </a:r>
-          <a:endParaRPr lang="en-US" sz="1300" kern="1200" dirty="0"/>
         </a:p>
       </dsp:txBody>
       <dsp:txXfrm>
@@ -12551,7 +12008,7 @@
         </a:bodyPr>
         <a:lstStyle/>
         <a:p>
-          <a:pPr lvl="0" algn="ctr" defTabSz="577850">
+          <a:pPr marL="0" lvl="0" indent="0" algn="ctr" defTabSz="577850">
             <a:lnSpc>
               <a:spcPct val="90000"/>
             </a:lnSpc>
@@ -12561,12 +12018,12 @@
             <a:spcAft>
               <a:spcPct val="35000"/>
             </a:spcAft>
+            <a:buNone/>
           </a:pPr>
           <a:r>
-            <a:rPr lang="en-US" sz="1300" kern="1200" dirty="0" smtClean="0"/>
+            <a:rPr lang="en-US" sz="1300" kern="1200" dirty="0"/>
             <a:t>24</a:t>
           </a:r>
-          <a:endParaRPr lang="en-US" sz="1300" kern="1200" dirty="0"/>
         </a:p>
       </dsp:txBody>
       <dsp:txXfrm>
@@ -12697,7 +12154,7 @@
         </a:bodyPr>
         <a:lstStyle/>
         <a:p>
-          <a:pPr lvl="0" algn="ctr" defTabSz="577850">
+          <a:pPr marL="0" lvl="0" indent="0" algn="ctr" defTabSz="577850">
             <a:lnSpc>
               <a:spcPct val="90000"/>
             </a:lnSpc>
@@ -12707,12 +12164,12 @@
             <a:spcAft>
               <a:spcPct val="35000"/>
             </a:spcAft>
+            <a:buNone/>
           </a:pPr>
           <a:r>
-            <a:rPr lang="en-US" sz="1300" kern="1200" dirty="0" smtClean="0"/>
+            <a:rPr lang="en-US" sz="1300" kern="1200" dirty="0"/>
             <a:t>2</a:t>
           </a:r>
-          <a:endParaRPr lang="en-US" sz="1300" kern="1200" dirty="0"/>
         </a:p>
       </dsp:txBody>
       <dsp:txXfrm>
@@ -12843,7 +12300,7 @@
         </a:bodyPr>
         <a:lstStyle/>
         <a:p>
-          <a:pPr lvl="0" algn="ctr" defTabSz="577850">
+          <a:pPr marL="0" lvl="0" indent="0" algn="ctr" defTabSz="577850">
             <a:lnSpc>
               <a:spcPct val="90000"/>
             </a:lnSpc>
@@ -12853,12 +12310,12 @@
             <a:spcAft>
               <a:spcPct val="35000"/>
             </a:spcAft>
+            <a:buNone/>
           </a:pPr>
           <a:r>
-            <a:rPr lang="en-US" sz="1300" kern="1200" dirty="0" smtClean="0"/>
+            <a:rPr lang="en-US" sz="1300" kern="1200" dirty="0"/>
             <a:t>36</a:t>
           </a:r>
-          <a:endParaRPr lang="en-US" sz="1300" kern="1200" dirty="0"/>
         </a:p>
       </dsp:txBody>
       <dsp:txXfrm>
@@ -12995,7 +12452,7 @@
         </a:bodyPr>
         <a:lstStyle/>
         <a:p>
-          <a:pPr lvl="0" algn="ctr" defTabSz="1155700">
+          <a:pPr marL="0" lvl="0" indent="0" algn="ctr" defTabSz="1155700">
             <a:lnSpc>
               <a:spcPct val="90000"/>
             </a:lnSpc>
@@ -13005,12 +12462,12 @@
             <a:spcAft>
               <a:spcPct val="35000"/>
             </a:spcAft>
+            <a:buNone/>
           </a:pPr>
           <a:r>
-            <a:rPr lang="en-US" sz="2600" kern="1200" dirty="0" smtClean="0"/>
+            <a:rPr lang="en-US" sz="2600" kern="1200" dirty="0"/>
             <a:t>2</a:t>
           </a:r>
-          <a:endParaRPr lang="en-US" sz="2600" kern="1200" dirty="0"/>
         </a:p>
       </dsp:txBody>
       <dsp:txXfrm>
@@ -13089,7 +12546,7 @@
         </a:bodyPr>
         <a:lstStyle/>
         <a:p>
-          <a:pPr lvl="0" algn="ctr" defTabSz="1155700">
+          <a:pPr marL="0" lvl="0" indent="0" algn="ctr" defTabSz="1155700">
             <a:lnSpc>
               <a:spcPct val="90000"/>
             </a:lnSpc>
@@ -13099,12 +12556,12 @@
             <a:spcAft>
               <a:spcPct val="35000"/>
             </a:spcAft>
+            <a:buNone/>
           </a:pPr>
           <a:r>
-            <a:rPr lang="en-US" sz="2600" kern="1200" dirty="0" smtClean="0"/>
+            <a:rPr lang="en-US" sz="2600" kern="1200" dirty="0"/>
             <a:t>32</a:t>
           </a:r>
-          <a:endParaRPr lang="en-US" sz="2600" kern="1200" dirty="0"/>
         </a:p>
       </dsp:txBody>
       <dsp:txXfrm>
@@ -13183,7 +12640,7 @@
         </a:bodyPr>
         <a:lstStyle/>
         <a:p>
-          <a:pPr lvl="0" algn="ctr" defTabSz="1155700">
+          <a:pPr marL="0" lvl="0" indent="0" algn="ctr" defTabSz="1155700">
             <a:lnSpc>
               <a:spcPct val="90000"/>
             </a:lnSpc>
@@ -13193,12 +12650,12 @@
             <a:spcAft>
               <a:spcPct val="35000"/>
             </a:spcAft>
+            <a:buNone/>
           </a:pPr>
           <a:r>
-            <a:rPr lang="en-US" sz="2600" kern="1200" dirty="0" smtClean="0"/>
+            <a:rPr lang="en-US" sz="2600" kern="1200" dirty="0"/>
             <a:t>24</a:t>
           </a:r>
-          <a:endParaRPr lang="en-US" sz="2600" kern="1200" dirty="0"/>
         </a:p>
       </dsp:txBody>
       <dsp:txXfrm>
@@ -13277,7 +12734,7 @@
         </a:bodyPr>
         <a:lstStyle/>
         <a:p>
-          <a:pPr lvl="0" algn="ctr" defTabSz="1155700">
+          <a:pPr marL="0" lvl="0" indent="0" algn="ctr" defTabSz="1155700">
             <a:lnSpc>
               <a:spcPct val="90000"/>
             </a:lnSpc>
@@ -13287,12 +12744,12 @@
             <a:spcAft>
               <a:spcPct val="35000"/>
             </a:spcAft>
+            <a:buNone/>
           </a:pPr>
           <a:r>
-            <a:rPr lang="en-US" sz="2600" kern="1200" dirty="0" smtClean="0"/>
+            <a:rPr lang="en-US" sz="2600" kern="1200" dirty="0"/>
             <a:t>177</a:t>
           </a:r>
-          <a:endParaRPr lang="en-US" sz="2600" kern="1200" dirty="0"/>
         </a:p>
       </dsp:txBody>
       <dsp:txXfrm>
@@ -13371,7 +12828,7 @@
         </a:bodyPr>
         <a:lstStyle/>
         <a:p>
-          <a:pPr lvl="0" algn="ctr" defTabSz="1155700">
+          <a:pPr marL="0" lvl="0" indent="0" algn="ctr" defTabSz="1155700">
             <a:lnSpc>
               <a:spcPct val="90000"/>
             </a:lnSpc>
@@ -13381,20 +12838,20 @@
             <a:spcAft>
               <a:spcPct val="35000"/>
             </a:spcAft>
+            <a:buNone/>
           </a:pPr>
           <a:r>
-            <a:rPr lang="en-US" sz="2600" kern="1200" dirty="0" smtClean="0"/>
+            <a:rPr lang="en-US" sz="2600" kern="1200" dirty="0"/>
             <a:t>in-</a:t>
           </a:r>
           <a:r>
-            <a:rPr lang="en-US" sz="2600" kern="1200" dirty="0" err="1" smtClean="0"/>
+            <a:rPr lang="en-US" sz="2600" kern="1200" dirty="0" err="1"/>
             <a:t>addr.arpa</a:t>
           </a:r>
           <a:r>
-            <a:rPr lang="en-US" sz="2600" kern="1200" dirty="0" smtClean="0"/>
+            <a:rPr lang="en-US" sz="2600" kern="1200" dirty="0"/>
             <a:t>.</a:t>
           </a:r>
-          <a:endParaRPr lang="en-US" sz="2600" kern="1200" dirty="0"/>
         </a:p>
       </dsp:txBody>
       <dsp:txXfrm>
@@ -13531,7 +12988,7 @@
         </a:bodyPr>
         <a:lstStyle/>
         <a:p>
-          <a:pPr lvl="0" algn="ctr" defTabSz="1733550">
+          <a:pPr marL="0" lvl="0" indent="0" algn="ctr" defTabSz="1733550">
             <a:lnSpc>
               <a:spcPct val="90000"/>
             </a:lnSpc>
@@ -13541,12 +12998,12 @@
             <a:spcAft>
               <a:spcPct val="35000"/>
             </a:spcAft>
+            <a:buNone/>
           </a:pPr>
           <a:r>
-            <a:rPr lang="en-US" sz="3900" kern="1200" dirty="0" smtClean="0"/>
+            <a:rPr lang="en-US" sz="3900" kern="1200" dirty="0"/>
             <a:t>2.32.24.177.in-addr.arpa.</a:t>
           </a:r>
-          <a:endParaRPr lang="en-US" sz="3900" kern="1200" dirty="0"/>
         </a:p>
       </dsp:txBody>
       <dsp:txXfrm>
@@ -14157,7 +13614,7 @@
         </a:bodyPr>
         <a:lstStyle/>
         <a:p>
-          <a:pPr lvl="0" algn="ctr" defTabSz="711200">
+          <a:pPr marL="0" lvl="0" indent="0" algn="ctr" defTabSz="711200">
             <a:lnSpc>
               <a:spcPct val="90000"/>
             </a:lnSpc>
@@ -14167,12 +13624,12 @@
             <a:spcAft>
               <a:spcPct val="35000"/>
             </a:spcAft>
+            <a:buNone/>
           </a:pPr>
           <a:r>
-            <a:rPr lang="en-US" sz="1600" kern="1200" dirty="0" smtClean="0"/>
+            <a:rPr lang="en-US" sz="1600" kern="1200" dirty="0"/>
             <a:t>ip6.arpa</a:t>
           </a:r>
-          <a:endParaRPr lang="en-US" sz="1600" kern="1200" dirty="0"/>
         </a:p>
       </dsp:txBody>
       <dsp:txXfrm>
@@ -14303,7 +13760,7 @@
         </a:bodyPr>
         <a:lstStyle/>
         <a:p>
-          <a:pPr lvl="0" algn="ctr" defTabSz="711200">
+          <a:pPr marL="0" lvl="0" indent="0" algn="ctr" defTabSz="711200">
             <a:lnSpc>
               <a:spcPct val="90000"/>
             </a:lnSpc>
@@ -14313,12 +13770,12 @@
             <a:spcAft>
               <a:spcPct val="35000"/>
             </a:spcAft>
+            <a:buNone/>
           </a:pPr>
           <a:r>
-            <a:rPr lang="en-US" sz="1600" kern="1200" dirty="0" smtClean="0"/>
+            <a:rPr lang="en-US" sz="1600" kern="1200" dirty="0"/>
             <a:t>0.8.2</a:t>
           </a:r>
-          <a:endParaRPr lang="en-US" sz="1600" kern="1200" dirty="0"/>
         </a:p>
       </dsp:txBody>
       <dsp:txXfrm>
@@ -14449,7 +13906,7 @@
         </a:bodyPr>
         <a:lstStyle/>
         <a:p>
-          <a:pPr lvl="0" algn="ctr" defTabSz="711200">
+          <a:pPr marL="0" lvl="0" indent="0" algn="ctr" defTabSz="711200">
             <a:lnSpc>
               <a:spcPct val="90000"/>
             </a:lnSpc>
@@ -14459,12 +13916,12 @@
             <a:spcAft>
               <a:spcPct val="35000"/>
             </a:spcAft>
+            <a:buNone/>
           </a:pPr>
           <a:r>
-            <a:rPr lang="en-US" sz="1600" kern="1200" dirty="0" smtClean="0"/>
+            <a:rPr lang="en-US" sz="1600" kern="1200" dirty="0"/>
             <a:t>1</a:t>
           </a:r>
-          <a:endParaRPr lang="en-US" sz="1600" kern="1200" dirty="0"/>
         </a:p>
       </dsp:txBody>
       <dsp:txXfrm>
@@ -14595,7 +14052,7 @@
         </a:bodyPr>
         <a:lstStyle/>
         <a:p>
-          <a:pPr lvl="0" algn="ctr" defTabSz="711200">
+          <a:pPr marL="0" lvl="0" indent="0" algn="ctr" defTabSz="711200">
             <a:lnSpc>
               <a:spcPct val="90000"/>
             </a:lnSpc>
@@ -14605,12 +14062,12 @@
             <a:spcAft>
               <a:spcPct val="35000"/>
             </a:spcAft>
+            <a:buNone/>
           </a:pPr>
           <a:r>
-            <a:rPr lang="en-US" sz="1600" kern="1200" dirty="0" smtClean="0"/>
+            <a:rPr lang="en-US" sz="1600" kern="1200" dirty="0"/>
             <a:t>2</a:t>
           </a:r>
-          <a:endParaRPr lang="en-US" sz="1600" kern="1200" dirty="0"/>
         </a:p>
       </dsp:txBody>
       <dsp:txXfrm>
@@ -14741,7 +14198,7 @@
         </a:bodyPr>
         <a:lstStyle/>
         <a:p>
-          <a:pPr lvl="0" algn="ctr" defTabSz="711200">
+          <a:pPr marL="0" lvl="0" indent="0" algn="ctr" defTabSz="711200">
             <a:lnSpc>
               <a:spcPct val="90000"/>
             </a:lnSpc>
@@ -14751,12 +14208,12 @@
             <a:spcAft>
               <a:spcPct val="35000"/>
             </a:spcAft>
+            <a:buNone/>
           </a:pPr>
           <a:r>
-            <a:rPr lang="en-US" sz="1600" kern="1200" dirty="0" smtClean="0"/>
+            <a:rPr lang="en-US" sz="1600" kern="1200" dirty="0"/>
             <a:t>1.0.0.2</a:t>
           </a:r>
-          <a:endParaRPr lang="en-US" sz="1600" kern="1200" dirty="0"/>
         </a:p>
       </dsp:txBody>
       <dsp:txXfrm>
@@ -14887,7 +14344,7 @@
         </a:bodyPr>
         <a:lstStyle/>
         <a:p>
-          <a:pPr lvl="0" algn="ctr" defTabSz="711200">
+          <a:pPr marL="0" lvl="0" indent="0" algn="ctr" defTabSz="711200">
             <a:lnSpc>
               <a:spcPct val="90000"/>
             </a:lnSpc>
@@ -14897,12 +14354,12 @@
             <a:spcAft>
               <a:spcPct val="35000"/>
             </a:spcAft>
+            <a:buNone/>
           </a:pPr>
           <a:r>
-            <a:rPr lang="en-US" sz="1600" kern="1200" dirty="0" smtClean="0"/>
+            <a:rPr lang="en-US" sz="1600" kern="1200" dirty="0"/>
             <a:t>1</a:t>
           </a:r>
-          <a:endParaRPr lang="en-US" sz="1600" kern="1200" dirty="0"/>
         </a:p>
       </dsp:txBody>
       <dsp:txXfrm>
@@ -15033,7 +14490,7 @@
         </a:bodyPr>
         <a:lstStyle/>
         <a:p>
-          <a:pPr lvl="0" algn="ctr" defTabSz="711200">
+          <a:pPr marL="0" lvl="0" indent="0" algn="ctr" defTabSz="711200">
             <a:lnSpc>
               <a:spcPct val="90000"/>
             </a:lnSpc>
@@ -15043,12 +14500,12 @@
             <a:spcAft>
               <a:spcPct val="35000"/>
             </a:spcAft>
+            <a:buNone/>
           </a:pPr>
           <a:r>
-            <a:rPr lang="en-US" sz="1600" kern="1200" dirty="0" smtClean="0"/>
+            <a:rPr lang="en-US" sz="1600" kern="1200" dirty="0"/>
             <a:t>24</a:t>
           </a:r>
-          <a:endParaRPr lang="en-US" sz="1600" kern="1200" dirty="0"/>
         </a:p>
       </dsp:txBody>
       <dsp:txXfrm>
@@ -15179,7 +14636,7 @@
         </a:bodyPr>
         <a:lstStyle/>
         <a:p>
-          <a:pPr lvl="0" algn="ctr" defTabSz="711200">
+          <a:pPr marL="0" lvl="0" indent="0" algn="ctr" defTabSz="711200">
             <a:lnSpc>
               <a:spcPct val="90000"/>
             </a:lnSpc>
@@ -15189,12 +14646,12 @@
             <a:spcAft>
               <a:spcPct val="35000"/>
             </a:spcAft>
+            <a:buNone/>
           </a:pPr>
           <a:r>
-            <a:rPr lang="en-US" sz="1600" kern="1200" dirty="0" smtClean="0"/>
+            <a:rPr lang="en-US" sz="1600" kern="1200" dirty="0"/>
             <a:t>2</a:t>
           </a:r>
-          <a:endParaRPr lang="en-US" sz="1600" kern="1200" dirty="0"/>
         </a:p>
       </dsp:txBody>
       <dsp:txXfrm>
@@ -15325,7 +14782,7 @@
         </a:bodyPr>
         <a:lstStyle/>
         <a:p>
-          <a:pPr lvl="0" algn="ctr" defTabSz="711200">
+          <a:pPr marL="0" lvl="0" indent="0" algn="ctr" defTabSz="711200">
             <a:lnSpc>
               <a:spcPct val="90000"/>
             </a:lnSpc>
@@ -15335,12 +14792,12 @@
             <a:spcAft>
               <a:spcPct val="35000"/>
             </a:spcAft>
+            <a:buNone/>
           </a:pPr>
           <a:r>
-            <a:rPr lang="en-US" sz="1600" kern="1200" dirty="0" smtClean="0"/>
+            <a:rPr lang="en-US" sz="1600" kern="1200" dirty="0"/>
             <a:t>36</a:t>
           </a:r>
-          <a:endParaRPr lang="en-US" sz="1600" kern="1200" dirty="0"/>
         </a:p>
       </dsp:txBody>
       <dsp:txXfrm>
@@ -23930,7 +23387,7 @@
               </a:lnSpc>
             </a:pPr>
             <a:r>
-              <a:rPr lang="en-US" i="1" dirty="0" smtClean="0">
+              <a:rPr lang="en-US" i="1" dirty="0">
                 <a:solidFill>
                   <a:schemeClr val="accent6">
                     <a:lumMod val="50000"/>
@@ -23940,7 +23397,7 @@
               <a:t>Carlos</a:t>
             </a:r>
             <a:r>
-              <a:rPr lang="en-US" i="1" baseline="0" dirty="0" smtClean="0">
+              <a:rPr lang="en-US" i="1" baseline="0" dirty="0">
                 <a:solidFill>
                   <a:schemeClr val="accent6">
                     <a:lumMod val="50000"/>
@@ -23957,7 +23414,7 @@
               </a:lnSpc>
             </a:pPr>
             <a:r>
-              <a:rPr lang="en-US" i="1" baseline="0" dirty="0" err="1" smtClean="0">
+              <a:rPr lang="en-US" i="1" baseline="0" dirty="0" err="1">
                 <a:solidFill>
                   <a:schemeClr val="accent6">
                     <a:lumMod val="50000"/>
@@ -23967,7 +23424,7 @@
               <a:t>carlos</a:t>
             </a:r>
             <a:r>
-              <a:rPr lang="en-US" i="1" baseline="0" dirty="0" smtClean="0">
+              <a:rPr lang="en-US" i="1" baseline="0" dirty="0">
                 <a:solidFill>
                   <a:schemeClr val="accent6">
                     <a:lumMod val="50000"/>
@@ -23977,7 +23434,7 @@
               <a:t> @ </a:t>
             </a:r>
             <a:r>
-              <a:rPr lang="en-US" i="1" baseline="0" dirty="0" err="1" smtClean="0">
+              <a:rPr lang="en-US" i="1" baseline="0" dirty="0" err="1">
                 <a:solidFill>
                   <a:schemeClr val="accent6">
                     <a:lumMod val="50000"/>
@@ -23986,7 +23443,7 @@
               </a:rPr>
               <a:t>lacnic.net</a:t>
             </a:r>
-            <a:endParaRPr lang="en-US" i="1" baseline="0" dirty="0" smtClean="0">
+            <a:endParaRPr lang="en-US" i="1" baseline="0" dirty="0">
               <a:solidFill>
                 <a:schemeClr val="accent6">
                   <a:lumMod val="50000"/>
@@ -24001,7 +23458,7 @@
               </a:lnSpc>
             </a:pPr>
             <a:r>
-              <a:rPr lang="en-US" i="1" baseline="0" dirty="0" smtClean="0">
+              <a:rPr lang="en-US" i="1" baseline="0" dirty="0">
                 <a:solidFill>
                   <a:schemeClr val="accent6">
                     <a:lumMod val="50000"/>
@@ -24056,10 +23513,9 @@
           </a:lstStyle>
           <a:p>
             <a:r>
-              <a:rPr lang="en-US" dirty="0" smtClean="0"/>
+              <a:rPr lang="en-US" dirty="0"/>
               <a:t>Click to edit Master title style</a:t>
             </a:r>
-            <a:endParaRPr lang="en-US" dirty="0"/>
           </a:p>
         </p:txBody>
       </p:sp>
@@ -24130,7 +23586,7 @@
           <a:p>
             <a:pPr lvl="0"/>
             <a:r>
-              <a:rPr lang="en-US" dirty="0" smtClean="0"/>
+              <a:rPr lang="en-US" dirty="0"/>
               <a:t>Subtitle</a:t>
             </a:r>
           </a:p>
@@ -24200,10 +23656,9 @@
           </a:lstStyle>
           <a:p>
             <a:r>
-              <a:rPr lang="en-US" dirty="0" smtClean="0"/>
+              <a:rPr lang="en-US" dirty="0"/>
               <a:t>Click to edit Master title style</a:t>
             </a:r>
-            <a:endParaRPr lang="en-US" dirty="0"/>
           </a:p>
         </p:txBody>
       </p:sp>
@@ -24289,38 +23744,37 @@
           <a:p>
             <a:pPr lvl="0"/>
             <a:r>
-              <a:rPr lang="en-US" dirty="0" smtClean="0"/>
+              <a:rPr lang="en-US" dirty="0"/>
               <a:t>Click to edit Master text styles</a:t>
             </a:r>
           </a:p>
           <a:p>
             <a:pPr lvl="1"/>
             <a:r>
-              <a:rPr lang="en-US" dirty="0" smtClean="0"/>
+              <a:rPr lang="en-US" dirty="0"/>
               <a:t>Second level</a:t>
             </a:r>
           </a:p>
           <a:p>
             <a:pPr lvl="2"/>
             <a:r>
-              <a:rPr lang="en-US" dirty="0" smtClean="0"/>
+              <a:rPr lang="en-US" dirty="0"/>
               <a:t>Third level</a:t>
             </a:r>
           </a:p>
           <a:p>
             <a:pPr lvl="3"/>
             <a:r>
-              <a:rPr lang="en-US" dirty="0" smtClean="0"/>
+              <a:rPr lang="en-US" dirty="0"/>
               <a:t>Fourth level</a:t>
             </a:r>
           </a:p>
           <a:p>
             <a:pPr lvl="4"/>
             <a:r>
-              <a:rPr lang="en-US" dirty="0" smtClean="0"/>
+              <a:rPr lang="en-US" dirty="0"/>
               <a:t>Fifth level</a:t>
             </a:r>
-            <a:endParaRPr lang="en-US" dirty="0"/>
           </a:p>
         </p:txBody>
       </p:sp>
@@ -24392,10 +23846,9 @@
           <a:lstStyle/>
           <a:p>
             <a:r>
-              <a:rPr lang="en-US" smtClean="0"/>
+              <a:rPr lang="en-US"/>
               <a:t>Click to edit Master title style</a:t>
             </a:r>
-            <a:endParaRPr lang="en-US"/>
           </a:p>
         </p:txBody>
       </p:sp>
@@ -24426,38 +23879,37 @@
           <a:p>
             <a:pPr lvl="0"/>
             <a:r>
-              <a:rPr lang="en-US" smtClean="0"/>
+              <a:rPr lang="en-US"/>
               <a:t>Click to edit Master text styles</a:t>
             </a:r>
           </a:p>
           <a:p>
             <a:pPr lvl="1"/>
             <a:r>
-              <a:rPr lang="en-US" smtClean="0"/>
+              <a:rPr lang="en-US"/>
               <a:t>Second level</a:t>
             </a:r>
           </a:p>
           <a:p>
             <a:pPr lvl="2"/>
             <a:r>
-              <a:rPr lang="en-US" smtClean="0"/>
+              <a:rPr lang="en-US"/>
               <a:t>Third level</a:t>
             </a:r>
           </a:p>
           <a:p>
             <a:pPr lvl="3"/>
             <a:r>
-              <a:rPr lang="en-US" smtClean="0"/>
+              <a:rPr lang="en-US"/>
               <a:t>Fourth level</a:t>
             </a:r>
           </a:p>
           <a:p>
             <a:pPr lvl="4"/>
             <a:r>
-              <a:rPr lang="en-US" smtClean="0"/>
+              <a:rPr lang="en-US"/>
               <a:t>Fifth level</a:t>
             </a:r>
-            <a:endParaRPr lang="en-US"/>
           </a:p>
         </p:txBody>
       </p:sp>
@@ -24759,11 +24211,11 @@
           <a:lstStyle/>
           <a:p>
             <a:r>
-              <a:rPr lang="en-US" dirty="0" smtClean="0"/>
+              <a:rPr lang="en-US" dirty="0"/>
               <a:t>DNS </a:t>
             </a:r>
             <a:r>
-              <a:rPr lang="en-US" dirty="0" err="1" smtClean="0"/>
+              <a:rPr lang="en-US" dirty="0" err="1"/>
               <a:t>Reverso</a:t>
             </a:r>
             <a:endParaRPr lang="en-US" dirty="0"/>
@@ -24786,26 +24238,25 @@
           <a:lstStyle/>
           <a:p>
             <a:r>
-              <a:rPr lang="en-US" dirty="0" smtClean="0"/>
+              <a:rPr lang="en-US" dirty="0"/>
               <a:t>Zonas </a:t>
             </a:r>
             <a:r>
-              <a:rPr lang="en-US" dirty="0" err="1" smtClean="0"/>
+              <a:rPr lang="en-US" dirty="0" err="1"/>
               <a:t>reversas</a:t>
             </a:r>
             <a:r>
-              <a:rPr lang="en-US" dirty="0" smtClean="0"/>
+              <a:rPr lang="en-US" dirty="0"/>
               <a:t>, </a:t>
             </a:r>
             <a:r>
-              <a:rPr lang="en-US" dirty="0" err="1" smtClean="0"/>
+              <a:rPr lang="en-US" dirty="0" err="1"/>
               <a:t>consultas</a:t>
             </a:r>
             <a:r>
-              <a:rPr lang="en-US" dirty="0" smtClean="0"/>
+              <a:rPr lang="en-US" dirty="0"/>
               <a:t>, etc.</a:t>
             </a:r>
-            <a:endParaRPr lang="en-US" dirty="0"/>
           </a:p>
         </p:txBody>
       </p:sp>
@@ -24855,7 +24306,7 @@
           <a:lstStyle/>
           <a:p>
             <a:r>
-              <a:rPr lang="en-US" smtClean="0"/>
+              <a:rPr lang="en-US"/>
               <a:t>Ejemplo de consulta reversa</a:t>
             </a:r>
             <a:endParaRPr lang="en-US" dirty="0"/>
@@ -24940,14 +24391,6 @@
   <p:clrMapOvr>
     <a:masterClrMapping/>
   </p:clrMapOvr>
-  <mc:AlternateContent xmlns:mc="http://schemas.openxmlformats.org/markup-compatibility/2006">
-    <mc:Choice xmlns:p14="http://schemas.microsoft.com/office/powerpoint/2010/main" Requires="p14">
-      <p:transition spd="slow" p14:dur="2000"/>
-    </mc:Choice>
-    <mc:Fallback>
-      <p:transition spd="slow"/>
-    </mc:Fallback>
-  </mc:AlternateContent>
   <p:timing>
     <p:tnLst>
       <p:par>
@@ -25062,7 +24505,7 @@
           <a:lstStyle/>
           <a:p>
             <a:r>
-              <a:rPr lang="en-US" smtClean="0"/>
+              <a:rPr lang="en-US"/>
               <a:t>Resolución reversa en IPv6</a:t>
             </a:r>
             <a:endParaRPr lang="en-US" dirty="0"/>
@@ -25085,7 +24528,7 @@
           <a:lstStyle/>
           <a:p>
             <a:r>
-              <a:rPr lang="en-US" smtClean="0"/>
+              <a:rPr lang="en-US"/>
               <a:t>La idea es similar, pero las fronteras son a nivel de nibble</a:t>
             </a:r>
             <a:endParaRPr lang="en-US" dirty="0"/>
@@ -25120,14 +24563,6 @@
   <p:clrMapOvr>
     <a:masterClrMapping/>
   </p:clrMapOvr>
-  <mc:AlternateContent xmlns:mc="http://schemas.openxmlformats.org/markup-compatibility/2006">
-    <mc:Choice xmlns:p14="http://schemas.microsoft.com/office/powerpoint/2010/main" Requires="p14">
-      <p:transition spd="slow" p14:dur="2000"/>
-    </mc:Choice>
-    <mc:Fallback>
-      <p:transition spd="slow"/>
-    </mc:Fallback>
-  </mc:AlternateContent>
 </p:sld>
 </file>
 
@@ -25164,7 +24599,7 @@
           <a:lstStyle/>
           <a:p>
             <a:r>
-              <a:rPr lang="en-US" smtClean="0"/>
+              <a:rPr lang="en-US"/>
               <a:t>Reversos en IPv6</a:t>
             </a:r>
             <a:endParaRPr lang="en-US" dirty="0"/>
@@ -25291,14 +24726,6 @@
   <p:clrMapOvr>
     <a:masterClrMapping/>
   </p:clrMapOvr>
-  <mc:AlternateContent xmlns:mc="http://schemas.openxmlformats.org/markup-compatibility/2006">
-    <mc:Choice xmlns:p14="http://schemas.microsoft.com/office/powerpoint/2010/main" Requires="p14">
-      <p:transition spd="slow" p14:dur="2000"/>
-    </mc:Choice>
-    <mc:Fallback>
-      <p:transition spd="slow"/>
-    </mc:Fallback>
-  </mc:AlternateContent>
   <p:timing>
     <p:tnLst>
       <p:par>
@@ -25426,298 +24853,6 @@
 </p:sld>
 </file>
 
-<file path=ppt/slides/slide13.xml><?xml version="1.0" encoding="utf-8"?>
-<p:sld xmlns:a="http://schemas.openxmlformats.org/drawingml/2006/main" xmlns:r="http://schemas.openxmlformats.org/officeDocument/2006/relationships" xmlns:p="http://schemas.openxmlformats.org/presentationml/2006/main">
-  <p:cSld>
-    <p:spTree>
-      <p:nvGrpSpPr>
-        <p:cNvPr id="1" name=""/>
-        <p:cNvGrpSpPr/>
-        <p:nvPr/>
-      </p:nvGrpSpPr>
-      <p:grpSpPr>
-        <a:xfrm>
-          <a:off x="0" y="0"/>
-          <a:ext cx="0" cy="0"/>
-          <a:chOff x="0" y="0"/>
-          <a:chExt cx="0" cy="0"/>
-        </a:xfrm>
-      </p:grpSpPr>
-      <p:sp>
-        <p:nvSpPr>
-          <p:cNvPr id="2" name="Title 1"/>
-          <p:cNvSpPr>
-            <a:spLocks noGrp="1"/>
-          </p:cNvSpPr>
-          <p:nvPr>
-            <p:ph type="title"/>
-          </p:nvPr>
-        </p:nvSpPr>
-        <p:spPr/>
-        <p:txBody>
-          <a:bodyPr/>
-          <a:lstStyle/>
-          <a:p>
-            <a:r>
-              <a:rPr lang="en-US" dirty="0" smtClean="0"/>
-              <a:t>El </a:t>
-            </a:r>
-            <a:r>
-              <a:rPr lang="en-US" dirty="0" err="1" smtClean="0"/>
-              <a:t>árbol</a:t>
-            </a:r>
-            <a:r>
-              <a:rPr lang="en-US" dirty="0" smtClean="0"/>
-              <a:t> </a:t>
-            </a:r>
-            <a:r>
-              <a:rPr lang="en-US" dirty="0" err="1" smtClean="0"/>
-              <a:t>reverso</a:t>
-            </a:r>
-            <a:r>
-              <a:rPr lang="en-US" dirty="0" smtClean="0"/>
-              <a:t> </a:t>
-            </a:r>
-            <a:endParaRPr lang="en-US" dirty="0"/>
-          </a:p>
-        </p:txBody>
-      </p:sp>
-      <p:sp>
-        <p:nvSpPr>
-          <p:cNvPr id="3" name="Content Placeholder 2"/>
-          <p:cNvSpPr>
-            <a:spLocks noGrp="1"/>
-          </p:cNvSpPr>
-          <p:nvPr>
-            <p:ph idx="1"/>
-          </p:nvPr>
-        </p:nvSpPr>
-        <p:spPr/>
-        <p:txBody>
-          <a:bodyPr/>
-          <a:lstStyle/>
-          <a:p>
-            <a:endParaRPr lang="en-US"/>
-          </a:p>
-        </p:txBody>
-      </p:sp>
-    </p:spTree>
-    <p:extLst>
-      <p:ext uri="{BB962C8B-B14F-4D97-AF65-F5344CB8AC3E}">
-        <p14:creationId xmlns:p14="http://schemas.microsoft.com/office/powerpoint/2010/main" val="402724286"/>
-      </p:ext>
-    </p:extLst>
-  </p:cSld>
-  <p:clrMapOvr>
-    <a:masterClrMapping/>
-  </p:clrMapOvr>
-</p:sld>
-</file>
-
-<file path=ppt/slides/slide14.xml><?xml version="1.0" encoding="utf-8"?>
-<p:sld xmlns:a="http://schemas.openxmlformats.org/drawingml/2006/main" xmlns:r="http://schemas.openxmlformats.org/officeDocument/2006/relationships" xmlns:p="http://schemas.openxmlformats.org/presentationml/2006/main">
-  <p:cSld>
-    <p:spTree>
-      <p:nvGrpSpPr>
-        <p:cNvPr id="1" name=""/>
-        <p:cNvGrpSpPr/>
-        <p:nvPr/>
-      </p:nvGrpSpPr>
-      <p:grpSpPr>
-        <a:xfrm>
-          <a:off x="0" y="0"/>
-          <a:ext cx="0" cy="0"/>
-          <a:chOff x="0" y="0"/>
-          <a:chExt cx="0" cy="0"/>
-        </a:xfrm>
-      </p:grpSpPr>
-      <p:sp>
-        <p:nvSpPr>
-          <p:cNvPr id="2" name="Title 1"/>
-          <p:cNvSpPr>
-            <a:spLocks noGrp="1"/>
-          </p:cNvSpPr>
-          <p:nvPr>
-            <p:ph type="title"/>
-          </p:nvPr>
-        </p:nvSpPr>
-        <p:spPr/>
-        <p:txBody>
-          <a:bodyPr/>
-          <a:lstStyle/>
-          <a:p>
-            <a:endParaRPr lang="en-US"/>
-          </a:p>
-        </p:txBody>
-      </p:sp>
-      <p:sp>
-        <p:nvSpPr>
-          <p:cNvPr id="3" name="Content Placeholder 2"/>
-          <p:cNvSpPr>
-            <a:spLocks noGrp="1"/>
-          </p:cNvSpPr>
-          <p:nvPr>
-            <p:ph idx="1"/>
-          </p:nvPr>
-        </p:nvSpPr>
-        <p:spPr/>
-        <p:txBody>
-          <a:bodyPr/>
-          <a:lstStyle/>
-          <a:p>
-            <a:endParaRPr lang="en-US"/>
-          </a:p>
-        </p:txBody>
-      </p:sp>
-    </p:spTree>
-    <p:extLst>
-      <p:ext uri="{BB962C8B-B14F-4D97-AF65-F5344CB8AC3E}">
-        <p14:creationId xmlns:p14="http://schemas.microsoft.com/office/powerpoint/2010/main" val="693156784"/>
-      </p:ext>
-    </p:extLst>
-  </p:cSld>
-  <p:clrMapOvr>
-    <a:masterClrMapping/>
-  </p:clrMapOvr>
-</p:sld>
-</file>
-
-<file path=ppt/slides/slide15.xml><?xml version="1.0" encoding="utf-8"?>
-<p:sld xmlns:a="http://schemas.openxmlformats.org/drawingml/2006/main" xmlns:r="http://schemas.openxmlformats.org/officeDocument/2006/relationships" xmlns:p="http://schemas.openxmlformats.org/presentationml/2006/main">
-  <p:cSld>
-    <p:spTree>
-      <p:nvGrpSpPr>
-        <p:cNvPr id="1" name=""/>
-        <p:cNvGrpSpPr/>
-        <p:nvPr/>
-      </p:nvGrpSpPr>
-      <p:grpSpPr>
-        <a:xfrm>
-          <a:off x="0" y="0"/>
-          <a:ext cx="0" cy="0"/>
-          <a:chOff x="0" y="0"/>
-          <a:chExt cx="0" cy="0"/>
-        </a:xfrm>
-      </p:grpSpPr>
-      <p:sp>
-        <p:nvSpPr>
-          <p:cNvPr id="2" name="Title 1"/>
-          <p:cNvSpPr>
-            <a:spLocks noGrp="1"/>
-          </p:cNvSpPr>
-          <p:nvPr>
-            <p:ph type="title"/>
-          </p:nvPr>
-        </p:nvSpPr>
-        <p:spPr/>
-        <p:txBody>
-          <a:bodyPr/>
-          <a:lstStyle/>
-          <a:p>
-            <a:endParaRPr lang="en-US"/>
-          </a:p>
-        </p:txBody>
-      </p:sp>
-      <p:sp>
-        <p:nvSpPr>
-          <p:cNvPr id="3" name="Content Placeholder 2"/>
-          <p:cNvSpPr>
-            <a:spLocks noGrp="1"/>
-          </p:cNvSpPr>
-          <p:nvPr>
-            <p:ph idx="1"/>
-          </p:nvPr>
-        </p:nvSpPr>
-        <p:spPr/>
-        <p:txBody>
-          <a:bodyPr/>
-          <a:lstStyle/>
-          <a:p>
-            <a:endParaRPr lang="en-US"/>
-          </a:p>
-        </p:txBody>
-      </p:sp>
-    </p:spTree>
-    <p:extLst>
-      <p:ext uri="{BB962C8B-B14F-4D97-AF65-F5344CB8AC3E}">
-        <p14:creationId xmlns:p14="http://schemas.microsoft.com/office/powerpoint/2010/main" val="1934767360"/>
-      </p:ext>
-    </p:extLst>
-  </p:cSld>
-  <p:clrMapOvr>
-    <a:masterClrMapping/>
-  </p:clrMapOvr>
-</p:sld>
-</file>
-
-<file path=ppt/slides/slide16.xml><?xml version="1.0" encoding="utf-8"?>
-<p:sld xmlns:a="http://schemas.openxmlformats.org/drawingml/2006/main" xmlns:r="http://schemas.openxmlformats.org/officeDocument/2006/relationships" xmlns:p="http://schemas.openxmlformats.org/presentationml/2006/main">
-  <p:cSld>
-    <p:spTree>
-      <p:nvGrpSpPr>
-        <p:cNvPr id="1" name=""/>
-        <p:cNvGrpSpPr/>
-        <p:nvPr/>
-      </p:nvGrpSpPr>
-      <p:grpSpPr>
-        <a:xfrm>
-          <a:off x="0" y="0"/>
-          <a:ext cx="0" cy="0"/>
-          <a:chOff x="0" y="0"/>
-          <a:chExt cx="0" cy="0"/>
-        </a:xfrm>
-      </p:grpSpPr>
-      <p:sp>
-        <p:nvSpPr>
-          <p:cNvPr id="2" name="Title 1"/>
-          <p:cNvSpPr>
-            <a:spLocks noGrp="1"/>
-          </p:cNvSpPr>
-          <p:nvPr>
-            <p:ph type="title"/>
-          </p:nvPr>
-        </p:nvSpPr>
-        <p:spPr/>
-        <p:txBody>
-          <a:bodyPr/>
-          <a:lstStyle/>
-          <a:p>
-            <a:endParaRPr lang="en-US"/>
-          </a:p>
-        </p:txBody>
-      </p:sp>
-      <p:sp>
-        <p:nvSpPr>
-          <p:cNvPr id="3" name="Content Placeholder 2"/>
-          <p:cNvSpPr>
-            <a:spLocks noGrp="1"/>
-          </p:cNvSpPr>
-          <p:nvPr>
-            <p:ph idx="1"/>
-          </p:nvPr>
-        </p:nvSpPr>
-        <p:spPr/>
-        <p:txBody>
-          <a:bodyPr/>
-          <a:lstStyle/>
-          <a:p>
-            <a:endParaRPr lang="en-US"/>
-          </a:p>
-        </p:txBody>
-      </p:sp>
-    </p:spTree>
-    <p:extLst>
-      <p:ext uri="{BB962C8B-B14F-4D97-AF65-F5344CB8AC3E}">
-        <p14:creationId xmlns:p14="http://schemas.microsoft.com/office/powerpoint/2010/main" val="437636646"/>
-      </p:ext>
-    </p:extLst>
-  </p:cSld>
-  <p:clrMapOvr>
-    <a:masterClrMapping/>
-  </p:clrMapOvr>
-</p:sld>
-</file>
-
 <file path=ppt/slides/slide2.xml><?xml version="1.0" encoding="utf-8"?>
 <p:sld xmlns:a="http://schemas.openxmlformats.org/drawingml/2006/main" xmlns:r="http://schemas.openxmlformats.org/officeDocument/2006/relationships" xmlns:p="http://schemas.openxmlformats.org/presentationml/2006/main">
   <p:cSld>
@@ -25751,38 +24886,37 @@
           <a:lstStyle/>
           <a:p>
             <a:r>
-              <a:rPr lang="en-US" dirty="0" err="1" smtClean="0"/>
+              <a:rPr lang="en-US" dirty="0" err="1"/>
               <a:t>Resolución</a:t>
             </a:r>
             <a:r>
-              <a:rPr lang="en-US" dirty="0" smtClean="0"/>
+              <a:rPr lang="en-US" dirty="0"/>
               <a:t> “</a:t>
             </a:r>
             <a:r>
-              <a:rPr lang="en-US" dirty="0" err="1" smtClean="0"/>
+              <a:rPr lang="en-US" dirty="0" err="1"/>
               <a:t>inversa</a:t>
             </a:r>
             <a:r>
-              <a:rPr lang="en-US" dirty="0" smtClean="0"/>
+              <a:rPr lang="en-US" dirty="0"/>
               <a:t>” vs </a:t>
             </a:r>
             <a:r>
-              <a:rPr lang="en-US" dirty="0" err="1" smtClean="0"/>
+              <a:rPr lang="en-US" dirty="0" err="1"/>
               <a:t>resolución</a:t>
             </a:r>
             <a:r>
-              <a:rPr lang="en-US" dirty="0" smtClean="0"/>
+              <a:rPr lang="en-US" dirty="0"/>
               <a:t> “</a:t>
             </a:r>
             <a:r>
-              <a:rPr lang="en-US" dirty="0" err="1" smtClean="0"/>
+              <a:rPr lang="en-US" dirty="0" err="1"/>
               <a:t>reversa</a:t>
             </a:r>
             <a:r>
-              <a:rPr lang="en-US" dirty="0" smtClean="0"/>
+              <a:rPr lang="en-US" dirty="0"/>
               <a:t>”</a:t>
             </a:r>
-            <a:endParaRPr lang="en-US" dirty="0"/>
           </a:p>
         </p:txBody>
       </p:sp>
@@ -25802,376 +24936,376 @@
           <a:lstStyle/>
           <a:p>
             <a:r>
-              <a:rPr lang="en-US" dirty="0" smtClean="0"/>
+              <a:rPr lang="en-US" dirty="0"/>
               <a:t>El </a:t>
             </a:r>
             <a:r>
-              <a:rPr lang="en-US" dirty="0" err="1" smtClean="0"/>
+              <a:rPr lang="en-US" dirty="0" err="1"/>
               <a:t>sistema</a:t>
             </a:r>
             <a:r>
-              <a:rPr lang="en-US" dirty="0" smtClean="0"/>
+              <a:rPr lang="en-US" dirty="0"/>
               <a:t> de </a:t>
             </a:r>
             <a:r>
-              <a:rPr lang="en-US" dirty="0" err="1" smtClean="0"/>
+              <a:rPr lang="en-US" dirty="0" err="1"/>
               <a:t>nombres</a:t>
             </a:r>
             <a:r>
-              <a:rPr lang="en-US" dirty="0" smtClean="0"/>
+              <a:rPr lang="en-US" dirty="0"/>
               <a:t> de </a:t>
             </a:r>
             <a:r>
-              <a:rPr lang="en-US" dirty="0" err="1" smtClean="0"/>
+              <a:rPr lang="en-US" dirty="0" err="1"/>
               <a:t>dominio</a:t>
             </a:r>
             <a:r>
-              <a:rPr lang="en-US" dirty="0" smtClean="0"/>
+              <a:rPr lang="en-US" dirty="0"/>
               <a:t> </a:t>
             </a:r>
             <a:r>
-              <a:rPr lang="en-US" dirty="0" err="1" smtClean="0"/>
+              <a:rPr lang="en-US" dirty="0" err="1"/>
               <a:t>es</a:t>
             </a:r>
             <a:r>
-              <a:rPr lang="en-US" dirty="0" smtClean="0"/>
+              <a:rPr lang="en-US" dirty="0"/>
               <a:t> </a:t>
             </a:r>
             <a:r>
-              <a:rPr lang="en-US" dirty="0" err="1" smtClean="0"/>
+              <a:rPr lang="en-US" dirty="0" err="1"/>
               <a:t>una</a:t>
             </a:r>
             <a:r>
-              <a:rPr lang="en-US" dirty="0" smtClean="0"/>
+              <a:rPr lang="en-US" dirty="0"/>
               <a:t> base de </a:t>
             </a:r>
             <a:r>
-              <a:rPr lang="en-US" dirty="0" err="1" smtClean="0"/>
+              <a:rPr lang="en-US" dirty="0" err="1"/>
               <a:t>datos</a:t>
             </a:r>
             <a:r>
-              <a:rPr lang="en-US" dirty="0" smtClean="0"/>
+              <a:rPr lang="en-US" dirty="0"/>
               <a:t>, y </a:t>
             </a:r>
             <a:r>
-              <a:rPr lang="en-US" dirty="0" err="1" smtClean="0"/>
+              <a:rPr lang="en-US" dirty="0" err="1"/>
               <a:t>donde</a:t>
             </a:r>
             <a:r>
-              <a:rPr lang="en-US" dirty="0" smtClean="0"/>
+              <a:rPr lang="en-US" dirty="0"/>
               <a:t> las </a:t>
             </a:r>
             <a:r>
-              <a:rPr lang="en-US" dirty="0" err="1" smtClean="0"/>
+              <a:rPr lang="en-US" dirty="0" err="1"/>
               <a:t>búsquedas</a:t>
             </a:r>
             <a:r>
-              <a:rPr lang="en-US" dirty="0" smtClean="0"/>
+              <a:rPr lang="en-US" dirty="0"/>
               <a:t> se </a:t>
             </a:r>
             <a:r>
-              <a:rPr lang="en-US" dirty="0" err="1" smtClean="0"/>
+              <a:rPr lang="en-US" dirty="0" err="1"/>
               <a:t>realizan</a:t>
             </a:r>
             <a:r>
-              <a:rPr lang="en-US" dirty="0" smtClean="0"/>
+              <a:rPr lang="en-US" dirty="0"/>
               <a:t> </a:t>
             </a:r>
             <a:r>
-              <a:rPr lang="en-US" dirty="0" err="1" smtClean="0"/>
+              <a:rPr lang="en-US" dirty="0" err="1"/>
               <a:t>preguntando</a:t>
             </a:r>
             <a:r>
-              <a:rPr lang="en-US" dirty="0" smtClean="0"/>
+              <a:rPr lang="en-US" dirty="0"/>
               <a:t> </a:t>
             </a:r>
             <a:r>
-              <a:rPr lang="en-US" dirty="0" err="1" smtClean="0"/>
+              <a:rPr lang="en-US" dirty="0" err="1"/>
               <a:t>por</a:t>
             </a:r>
             <a:r>
-              <a:rPr lang="en-US" dirty="0" smtClean="0"/>
+              <a:rPr lang="en-US" dirty="0"/>
               <a:t> </a:t>
             </a:r>
             <a:r>
-              <a:rPr lang="en-US" dirty="0" err="1" smtClean="0"/>
+              <a:rPr lang="en-US" dirty="0" err="1"/>
               <a:t>registros</a:t>
             </a:r>
             <a:r>
-              <a:rPr lang="en-US" dirty="0" smtClean="0"/>
+              <a:rPr lang="en-US" dirty="0"/>
               <a:t> que </a:t>
             </a:r>
             <a:r>
-              <a:rPr lang="en-US" dirty="0" err="1" smtClean="0"/>
+              <a:rPr lang="en-US" dirty="0" err="1"/>
               <a:t>cumplen</a:t>
             </a:r>
             <a:r>
-              <a:rPr lang="en-US" dirty="0" smtClean="0"/>
+              <a:rPr lang="en-US" dirty="0"/>
               <a:t> con </a:t>
             </a:r>
             <a:r>
-              <a:rPr lang="en-US" dirty="0" err="1" smtClean="0"/>
+              <a:rPr lang="en-US" dirty="0" err="1"/>
               <a:t>una</a:t>
             </a:r>
             <a:r>
-              <a:rPr lang="en-US" dirty="0" smtClean="0"/>
+              <a:rPr lang="en-US" dirty="0"/>
               <a:t> </a:t>
             </a:r>
             <a:r>
-              <a:rPr lang="en-US" dirty="0" err="1" smtClean="0"/>
+              <a:rPr lang="en-US" dirty="0" err="1"/>
               <a:t>cierta</a:t>
             </a:r>
             <a:r>
-              <a:rPr lang="en-US" dirty="0" smtClean="0"/>
+              <a:rPr lang="en-US" dirty="0"/>
               <a:t> </a:t>
             </a:r>
             <a:r>
-              <a:rPr lang="en-US" dirty="0" err="1" smtClean="0"/>
+              <a:rPr lang="en-US" dirty="0" err="1"/>
               <a:t>condición</a:t>
             </a:r>
-            <a:endParaRPr lang="en-US" dirty="0" smtClean="0"/>
+            <a:endParaRPr lang="en-US" dirty="0"/>
           </a:p>
           <a:p>
             <a:pPr lvl="1"/>
             <a:r>
-              <a:rPr lang="en-US" dirty="0" err="1" smtClean="0"/>
+              <a:rPr lang="en-US" dirty="0" err="1"/>
               <a:t>Recordar</a:t>
             </a:r>
             <a:r>
-              <a:rPr lang="en-US" dirty="0" smtClean="0"/>
+              <a:rPr lang="en-US" dirty="0"/>
               <a:t> que </a:t>
             </a:r>
             <a:r>
-              <a:rPr lang="en-US" dirty="0" err="1" smtClean="0"/>
+              <a:rPr lang="en-US" dirty="0" err="1"/>
               <a:t>los</a:t>
             </a:r>
             <a:r>
-              <a:rPr lang="en-US" dirty="0" smtClean="0"/>
+              <a:rPr lang="en-US" dirty="0"/>
               <a:t> </a:t>
             </a:r>
             <a:r>
-              <a:rPr lang="en-US" dirty="0" err="1" smtClean="0"/>
+              <a:rPr lang="en-US" dirty="0" err="1"/>
               <a:t>registros</a:t>
             </a:r>
             <a:r>
-              <a:rPr lang="en-US" dirty="0" smtClean="0"/>
+              <a:rPr lang="en-US" dirty="0"/>
               <a:t> </a:t>
             </a:r>
             <a:r>
-              <a:rPr lang="en-US" dirty="0" err="1" smtClean="0"/>
+              <a:rPr lang="en-US" dirty="0" err="1"/>
               <a:t>en</a:t>
             </a:r>
             <a:r>
-              <a:rPr lang="en-US" dirty="0" smtClean="0"/>
+              <a:rPr lang="en-US" dirty="0"/>
               <a:t> DNS se </a:t>
             </a:r>
             <a:r>
-              <a:rPr lang="en-US" dirty="0" err="1" smtClean="0"/>
+              <a:rPr lang="en-US" dirty="0" err="1"/>
               <a:t>componen</a:t>
             </a:r>
             <a:r>
-              <a:rPr lang="en-US" dirty="0" smtClean="0"/>
+              <a:rPr lang="en-US" dirty="0"/>
               <a:t> de </a:t>
             </a:r>
             <a:r>
-              <a:rPr lang="en-US" dirty="0" err="1" smtClean="0"/>
+              <a:rPr lang="en-US" dirty="0" err="1"/>
               <a:t>cinco</a:t>
             </a:r>
             <a:r>
-              <a:rPr lang="en-US" dirty="0" smtClean="0"/>
+              <a:rPr lang="en-US" dirty="0"/>
               <a:t> </a:t>
             </a:r>
             <a:r>
-              <a:rPr lang="en-US" dirty="0" err="1" smtClean="0"/>
+              <a:rPr lang="en-US" dirty="0" err="1"/>
               <a:t>valores</a:t>
             </a:r>
             <a:r>
-              <a:rPr lang="en-US" dirty="0" smtClean="0"/>
+              <a:rPr lang="en-US" dirty="0"/>
               <a:t> (</a:t>
             </a:r>
             <a:r>
-              <a:rPr lang="en-US" dirty="0" err="1" smtClean="0"/>
+              <a:rPr lang="en-US" dirty="0" err="1"/>
               <a:t>Clase</a:t>
             </a:r>
             <a:r>
-              <a:rPr lang="en-US" dirty="0" smtClean="0"/>
+              <a:rPr lang="en-US" dirty="0"/>
               <a:t>, </a:t>
             </a:r>
             <a:r>
-              <a:rPr lang="en-US" dirty="0" err="1" smtClean="0"/>
+              <a:rPr lang="en-US" dirty="0" err="1"/>
               <a:t>Tipo</a:t>
             </a:r>
             <a:r>
-              <a:rPr lang="en-US" dirty="0" smtClean="0"/>
+              <a:rPr lang="en-US" dirty="0"/>
               <a:t>, </a:t>
             </a:r>
             <a:r>
-              <a:rPr lang="en-US" dirty="0" err="1" smtClean="0"/>
+              <a:rPr lang="en-US" dirty="0" err="1"/>
               <a:t>Nombre</a:t>
             </a:r>
             <a:r>
-              <a:rPr lang="en-US" dirty="0" smtClean="0"/>
+              <a:rPr lang="en-US" dirty="0"/>
               <a:t>, TTL, Valor)</a:t>
             </a:r>
           </a:p>
           <a:p>
             <a:r>
-              <a:rPr lang="en-US" dirty="0" err="1" smtClean="0"/>
+              <a:rPr lang="en-US" dirty="0" err="1"/>
               <a:t>Esa</a:t>
             </a:r>
             <a:r>
-              <a:rPr lang="en-US" dirty="0" smtClean="0"/>
+              <a:rPr lang="en-US" dirty="0"/>
               <a:t> </a:t>
             </a:r>
             <a:r>
-              <a:rPr lang="en-US" dirty="0" err="1" smtClean="0"/>
+              <a:rPr lang="en-US" dirty="0" err="1"/>
               <a:t>condición</a:t>
             </a:r>
             <a:r>
-              <a:rPr lang="en-US" dirty="0" smtClean="0"/>
+              <a:rPr lang="en-US" dirty="0"/>
               <a:t> se </a:t>
             </a:r>
             <a:r>
-              <a:rPr lang="en-US" dirty="0" err="1" smtClean="0"/>
+              <a:rPr lang="en-US" dirty="0" err="1"/>
               <a:t>indica</a:t>
             </a:r>
             <a:r>
-              <a:rPr lang="en-US" dirty="0" smtClean="0"/>
+              <a:rPr lang="en-US" dirty="0"/>
               <a:t> </a:t>
             </a:r>
             <a:r>
-              <a:rPr lang="en-US" dirty="0" err="1" smtClean="0"/>
+              <a:rPr lang="en-US" dirty="0" err="1"/>
               <a:t>mediante</a:t>
             </a:r>
             <a:r>
-              <a:rPr lang="en-US" dirty="0" smtClean="0"/>
+              <a:rPr lang="en-US" dirty="0"/>
               <a:t> </a:t>
             </a:r>
             <a:r>
-              <a:rPr lang="en-US" dirty="0" err="1" smtClean="0"/>
+              <a:rPr lang="en-US" dirty="0" err="1"/>
               <a:t>una</a:t>
             </a:r>
             <a:r>
-              <a:rPr lang="en-US" dirty="0" smtClean="0"/>
+              <a:rPr lang="en-US" dirty="0"/>
               <a:t> </a:t>
             </a:r>
             <a:r>
-              <a:rPr lang="en-US" dirty="0" err="1" smtClean="0"/>
+              <a:rPr lang="en-US" dirty="0" err="1"/>
               <a:t>tupla</a:t>
             </a:r>
             <a:r>
-              <a:rPr lang="en-US" dirty="0" smtClean="0"/>
+              <a:rPr lang="en-US" dirty="0"/>
               <a:t> (</a:t>
             </a:r>
             <a:r>
-              <a:rPr lang="en-US" dirty="0" err="1" smtClean="0"/>
+              <a:rPr lang="en-US" dirty="0" err="1"/>
               <a:t>Clase</a:t>
             </a:r>
             <a:r>
-              <a:rPr lang="en-US" dirty="0" smtClean="0"/>
+              <a:rPr lang="en-US" dirty="0"/>
               <a:t>, </a:t>
             </a:r>
             <a:r>
-              <a:rPr lang="en-US" dirty="0" err="1" smtClean="0"/>
+              <a:rPr lang="en-US" dirty="0" err="1"/>
               <a:t>Tipo</a:t>
             </a:r>
             <a:r>
-              <a:rPr lang="en-US" dirty="0" smtClean="0"/>
+              <a:rPr lang="en-US" dirty="0"/>
               <a:t>, </a:t>
             </a:r>
             <a:r>
-              <a:rPr lang="en-US" dirty="0" err="1" smtClean="0"/>
+              <a:rPr lang="en-US" dirty="0" err="1"/>
               <a:t>Nombre</a:t>
             </a:r>
             <a:r>
-              <a:rPr lang="en-US" dirty="0" smtClean="0"/>
+              <a:rPr lang="en-US" dirty="0"/>
               <a:t>)</a:t>
             </a:r>
           </a:p>
           <a:p>
             <a:pPr lvl="1"/>
             <a:r>
-              <a:rPr lang="en-US" dirty="0" smtClean="0"/>
+              <a:rPr lang="en-US" dirty="0"/>
               <a:t>La </a:t>
             </a:r>
             <a:r>
-              <a:rPr lang="en-US" dirty="0" err="1" smtClean="0"/>
+              <a:rPr lang="en-US" dirty="0" err="1"/>
               <a:t>clase</a:t>
             </a:r>
             <a:r>
-              <a:rPr lang="en-US" dirty="0" smtClean="0"/>
+              <a:rPr lang="en-US" dirty="0"/>
               <a:t> </a:t>
             </a:r>
             <a:r>
-              <a:rPr lang="en-US" dirty="0" err="1" smtClean="0"/>
+              <a:rPr lang="en-US" dirty="0" err="1"/>
               <a:t>siempre</a:t>
             </a:r>
             <a:r>
-              <a:rPr lang="en-US" dirty="0" smtClean="0"/>
+              <a:rPr lang="en-US" dirty="0"/>
               <a:t> </a:t>
             </a:r>
             <a:r>
-              <a:rPr lang="en-US" dirty="0" err="1" smtClean="0"/>
+              <a:rPr lang="en-US" dirty="0" err="1"/>
               <a:t>es</a:t>
             </a:r>
             <a:r>
-              <a:rPr lang="en-US" dirty="0" smtClean="0"/>
+              <a:rPr lang="en-US" dirty="0"/>
               <a:t> IN para </a:t>
             </a:r>
             <a:r>
-              <a:rPr lang="en-US" dirty="0" err="1" smtClean="0"/>
+              <a:rPr lang="en-US" dirty="0" err="1"/>
               <a:t>nosotros</a:t>
             </a:r>
-            <a:endParaRPr lang="en-US" dirty="0" smtClean="0"/>
+            <a:endParaRPr lang="en-US" dirty="0"/>
           </a:p>
           <a:p>
             <a:pPr lvl="1"/>
             <a:r>
-              <a:rPr lang="en-US" dirty="0" smtClean="0"/>
+              <a:rPr lang="en-US" dirty="0"/>
               <a:t>El </a:t>
             </a:r>
             <a:r>
-              <a:rPr lang="en-US" dirty="0" err="1" smtClean="0"/>
+              <a:rPr lang="en-US" dirty="0" err="1"/>
               <a:t>resultado</a:t>
             </a:r>
             <a:r>
-              <a:rPr lang="en-US" dirty="0" smtClean="0"/>
+              <a:rPr lang="en-US" dirty="0"/>
               <a:t> </a:t>
             </a:r>
             <a:r>
-              <a:rPr lang="en-US" dirty="0" err="1" smtClean="0"/>
+              <a:rPr lang="en-US" dirty="0" err="1"/>
               <a:t>es</a:t>
             </a:r>
             <a:r>
-              <a:rPr lang="en-US" dirty="0" smtClean="0"/>
+              <a:rPr lang="en-US" dirty="0"/>
               <a:t> la </a:t>
             </a:r>
             <a:r>
-              <a:rPr lang="en-US" dirty="0" err="1" smtClean="0"/>
+              <a:rPr lang="en-US" dirty="0" err="1"/>
               <a:t>tupla</a:t>
             </a:r>
             <a:r>
-              <a:rPr lang="en-US" dirty="0" smtClean="0"/>
+              <a:rPr lang="en-US" dirty="0"/>
               <a:t> de </a:t>
             </a:r>
             <a:r>
-              <a:rPr lang="en-US" dirty="0" err="1" smtClean="0"/>
+              <a:rPr lang="en-US" dirty="0" err="1"/>
               <a:t>cinco</a:t>
             </a:r>
             <a:r>
-              <a:rPr lang="en-US" dirty="0" smtClean="0"/>
+              <a:rPr lang="en-US" dirty="0"/>
               <a:t> </a:t>
             </a:r>
             <a:r>
-              <a:rPr lang="en-US" dirty="0" err="1" smtClean="0"/>
+              <a:rPr lang="en-US" dirty="0" err="1"/>
               <a:t>valores</a:t>
             </a:r>
             <a:r>
-              <a:rPr lang="en-US" dirty="0" smtClean="0"/>
+              <a:rPr lang="en-US" dirty="0"/>
               <a:t> </a:t>
             </a:r>
             <a:r>
-              <a:rPr lang="en-US" dirty="0" err="1" smtClean="0"/>
+              <a:rPr lang="en-US" dirty="0" err="1"/>
               <a:t>completa</a:t>
             </a:r>
             <a:endParaRPr lang="en-US" dirty="0"/>
@@ -26188,21 +25322,6 @@
   <p:clrMapOvr>
     <a:masterClrMapping/>
   </p:clrMapOvr>
-  <mc:AlternateContent xmlns:mc="http://schemas.openxmlformats.org/markup-compatibility/2006">
-    <mc:Choice xmlns:p14="http://schemas.microsoft.com/office/powerpoint/2010/main" Requires="p14">
-      <p:transition spd="slow" p14:dur="2000"/>
-    </mc:Choice>
-    <mc:Fallback>
-      <p:transition spd="slow"/>
-    </mc:Fallback>
-  </mc:AlternateContent>
-  <p:timing>
-    <p:tnLst>
-      <p:par>
-        <p:cTn id="1" dur="indefinite" restart="never" nodeType="tmRoot"/>
-      </p:par>
-    </p:tnLst>
-  </p:timing>
 </p:sld>
 </file>
 
@@ -26239,38 +25358,37 @@
           <a:lstStyle/>
           <a:p>
             <a:r>
-              <a:rPr lang="en-US" dirty="0" err="1" smtClean="0"/>
+              <a:rPr lang="en-US" dirty="0" err="1"/>
               <a:t>Resolución</a:t>
             </a:r>
             <a:r>
-              <a:rPr lang="en-US" dirty="0" smtClean="0"/>
+              <a:rPr lang="en-US" dirty="0"/>
               <a:t> “</a:t>
             </a:r>
             <a:r>
-              <a:rPr lang="en-US" dirty="0" err="1" smtClean="0"/>
+              <a:rPr lang="en-US" dirty="0" err="1"/>
               <a:t>inversa</a:t>
             </a:r>
             <a:r>
-              <a:rPr lang="en-US" dirty="0" smtClean="0"/>
+              <a:rPr lang="en-US" dirty="0"/>
               <a:t>” vs </a:t>
             </a:r>
             <a:r>
-              <a:rPr lang="en-US" dirty="0" err="1" smtClean="0"/>
+              <a:rPr lang="en-US" dirty="0" err="1"/>
               <a:t>resolución</a:t>
             </a:r>
             <a:r>
-              <a:rPr lang="en-US" dirty="0" smtClean="0"/>
+              <a:rPr lang="en-US" dirty="0"/>
               <a:t> “</a:t>
             </a:r>
             <a:r>
-              <a:rPr lang="en-US" dirty="0" err="1" smtClean="0"/>
+              <a:rPr lang="en-US" dirty="0" err="1"/>
               <a:t>reversa</a:t>
             </a:r>
             <a:r>
-              <a:rPr lang="en-US" dirty="0" smtClean="0"/>
+              <a:rPr lang="en-US" dirty="0"/>
               <a:t>”</a:t>
             </a:r>
-            <a:endParaRPr lang="en-US" dirty="0"/>
           </a:p>
         </p:txBody>
       </p:sp>
@@ -26290,19 +25408,19 @@
           <a:lstStyle/>
           <a:p>
             <a:r>
-              <a:rPr lang="en-US" smtClean="0"/>
+              <a:rPr lang="en-US"/>
               <a:t>Tener resolución inversa implicaría poder invertir las consultas, partiendo de un valor para obtener un nombre</a:t>
             </a:r>
           </a:p>
           <a:p>
             <a:r>
-              <a:rPr lang="en-US" smtClean="0"/>
+              <a:rPr lang="en-US"/>
               <a:t>Pero la relación NO es 1 a 1, una consulta puede resolver multiples resultados</a:t>
             </a:r>
           </a:p>
           <a:p>
             <a:r>
-              <a:rPr lang="en-US" smtClean="0"/>
+              <a:rPr lang="en-US"/>
               <a:t>Por ello la resolución inversa en este sentido no existe en DNS</a:t>
             </a:r>
             <a:endParaRPr lang="en-US" dirty="0"/>
@@ -26337,21 +25455,6 @@
   <p:clrMapOvr>
     <a:masterClrMapping/>
   </p:clrMapOvr>
-  <mc:AlternateContent xmlns:mc="http://schemas.openxmlformats.org/markup-compatibility/2006">
-    <mc:Choice xmlns:p14="http://schemas.microsoft.com/office/powerpoint/2010/main" Requires="p14">
-      <p:transition spd="slow" p14:dur="2000"/>
-    </mc:Choice>
-    <mc:Fallback>
-      <p:transition spd="slow"/>
-    </mc:Fallback>
-  </mc:AlternateContent>
-  <p:timing>
-    <p:tnLst>
-      <p:par>
-        <p:cTn id="1" dur="indefinite" restart="never" nodeType="tmRoot"/>
-      </p:par>
-    </p:tnLst>
-  </p:timing>
 </p:sld>
 </file>
 
@@ -26388,7 +25491,7 @@
           <a:lstStyle/>
           <a:p>
             <a:r>
-              <a:rPr lang="en-US" smtClean="0"/>
+              <a:rPr lang="en-US"/>
               <a:t>Ejemplo de consulta DNS</a:t>
             </a:r>
             <a:endParaRPr lang="en-US" dirty="0"/>
@@ -26579,7 +25682,6 @@
               <a:rPr lang="en-US" sz="1350" dirty="0"/>
               <a:t>)</a:t>
             </a:r>
-            <a:endParaRPr lang="en-US" sz="1350" dirty="0"/>
           </a:p>
         </p:txBody>
       </p:sp>
@@ -26593,14 +25695,6 @@
   <p:clrMapOvr>
     <a:masterClrMapping/>
   </p:clrMapOvr>
-  <mc:AlternateContent xmlns:mc="http://schemas.openxmlformats.org/markup-compatibility/2006">
-    <mc:Choice xmlns:p14="http://schemas.microsoft.com/office/powerpoint/2010/main" Requires="p14">
-      <p:transition spd="slow" p14:dur="2000"/>
-    </mc:Choice>
-    <mc:Fallback>
-      <p:transition spd="slow"/>
-    </mc:Fallback>
-  </mc:AlternateContent>
   <p:timing>
     <p:tnLst>
       <p:par>
@@ -26807,7 +25901,7 @@
           <a:lstStyle/>
           <a:p>
             <a:r>
-              <a:rPr lang="en-US" smtClean="0"/>
+              <a:rPr lang="en-US"/>
               <a:t>Otro ejemplo de consulta DNS</a:t>
             </a:r>
             <a:endParaRPr lang="en-US" dirty="0"/>
@@ -26982,7 +26076,6 @@
               <a:rPr lang="en-US" sz="1350" dirty="0"/>
               <a:t> invertible</a:t>
             </a:r>
-            <a:endParaRPr lang="en-US" sz="1350" dirty="0"/>
           </a:p>
         </p:txBody>
       </p:sp>
@@ -26996,14 +26089,6 @@
   <p:clrMapOvr>
     <a:masterClrMapping/>
   </p:clrMapOvr>
-  <mc:AlternateContent xmlns:mc="http://schemas.openxmlformats.org/markup-compatibility/2006">
-    <mc:Choice xmlns:p14="http://schemas.microsoft.com/office/powerpoint/2010/main" Requires="p14">
-      <p:transition spd="slow" p14:dur="2000"/>
-    </mc:Choice>
-    <mc:Fallback>
-      <p:transition spd="slow"/>
-    </mc:Fallback>
-  </mc:AlternateContent>
   <p:timing>
     <p:tnLst>
       <p:par>
@@ -27210,7 +26295,7 @@
           <a:lstStyle/>
           <a:p>
             <a:r>
-              <a:rPr lang="en-US" smtClean="0"/>
+              <a:rPr lang="en-US"/>
               <a:t>Árbol reverso de DNS</a:t>
             </a:r>
             <a:endParaRPr lang="en-US" dirty="0"/>
@@ -27233,16 +26318,16 @@
           <a:lstStyle/>
           <a:p>
             <a:r>
-              <a:rPr lang="en-US" smtClean="0"/>
+              <a:rPr lang="en-US"/>
               <a:t>Sin embargo, contar con un mapeo entre direcciones IP y nombres puede ser muy útil para diferentes propósitos</a:t>
             </a:r>
           </a:p>
           <a:p>
             <a:r>
-              <a:rPr lang="en-US" smtClean="0"/>
+              <a:rPr lang="en-US"/>
               <a:t>Surge el árbol reverso en DNS, bajo la zona especial .arpa y un tipo específico, PTR</a:t>
             </a:r>
-            <a:endParaRPr lang="en-US" dirty="0" smtClean="0"/>
+            <a:endParaRPr lang="en-US" dirty="0"/>
           </a:p>
         </p:txBody>
       </p:sp>
@@ -27274,21 +26359,6 @@
   <p:clrMapOvr>
     <a:masterClrMapping/>
   </p:clrMapOvr>
-  <mc:AlternateContent xmlns:mc="http://schemas.openxmlformats.org/markup-compatibility/2006">
-    <mc:Choice xmlns:p14="http://schemas.microsoft.com/office/powerpoint/2010/main" Requires="p14">
-      <p:transition spd="slow" p14:dur="2000"/>
-    </mc:Choice>
-    <mc:Fallback>
-      <p:transition spd="slow"/>
-    </mc:Fallback>
-  </mc:AlternateContent>
-  <p:timing>
-    <p:tnLst>
-      <p:par>
-        <p:cTn id="1" dur="indefinite" restart="never" nodeType="tmRoot"/>
-      </p:par>
-    </p:tnLst>
-  </p:timing>
 </p:sld>
 </file>
 
@@ -27325,7 +26395,7 @@
           <a:lstStyle/>
           <a:p>
             <a:r>
-              <a:rPr lang="en-US" smtClean="0"/>
+              <a:rPr lang="en-US"/>
               <a:t>Arbol reverso DNS en IPv4</a:t>
             </a:r>
             <a:endParaRPr lang="en-US" dirty="0"/>
@@ -27348,10 +26418,10 @@
           <a:lstStyle/>
           <a:p>
             <a:r>
-              <a:rPr lang="en-US" smtClean="0"/>
+              <a:rPr lang="en-US"/>
               <a:t>Usamos la zona in-addr.arpa, definimos fronteras a nivel de byte</a:t>
             </a:r>
-            <a:endParaRPr lang="en-US" dirty="0" smtClean="0"/>
+            <a:endParaRPr lang="en-US" dirty="0"/>
           </a:p>
         </p:txBody>
       </p:sp>
@@ -27383,14 +26453,6 @@
   <p:clrMapOvr>
     <a:masterClrMapping/>
   </p:clrMapOvr>
-  <mc:AlternateContent xmlns:mc="http://schemas.openxmlformats.org/markup-compatibility/2006">
-    <mc:Choice xmlns:p14="http://schemas.microsoft.com/office/powerpoint/2010/main" Requires="p14">
-      <p:transition spd="slow" p14:dur="2000"/>
-    </mc:Choice>
-    <mc:Fallback>
-      <p:transition spd="slow"/>
-    </mc:Fallback>
-  </mc:AlternateContent>
 </p:sld>
 </file>
 
@@ -27427,7 +26489,7 @@
           <a:lstStyle/>
           <a:p>
             <a:r>
-              <a:rPr lang="en-US" smtClean="0"/>
+              <a:rPr lang="en-US"/>
               <a:t>Arbol reverso DNS en IPv4</a:t>
             </a:r>
             <a:endParaRPr lang="en-US" dirty="0"/>
@@ -27450,12 +26512,12 @@
           <a:lstStyle/>
           <a:p>
             <a:r>
-              <a:rPr lang="en-US" smtClean="0"/>
+              <a:rPr lang="en-US"/>
               <a:t>Ejemplo, mapeo para la direccion IP 177.24.32.2:</a:t>
             </a:r>
           </a:p>
           <a:p>
-            <a:endParaRPr lang="en-US" dirty="0" smtClean="0"/>
+            <a:endParaRPr lang="en-US" dirty="0"/>
           </a:p>
         </p:txBody>
       </p:sp>
@@ -27487,14 +26549,6 @@
   <p:clrMapOvr>
     <a:masterClrMapping/>
   </p:clrMapOvr>
-  <mc:AlternateContent xmlns:mc="http://schemas.openxmlformats.org/markup-compatibility/2006">
-    <mc:Choice xmlns:p14="http://schemas.microsoft.com/office/powerpoint/2010/main" Requires="p14">
-      <p:transition spd="slow" p14:dur="2000"/>
-    </mc:Choice>
-    <mc:Fallback>
-      <p:transition spd="slow"/>
-    </mc:Fallback>
-  </mc:AlternateContent>
 </p:sld>
 </file>
 
@@ -27531,7 +26585,7 @@
           <a:lstStyle/>
           <a:p>
             <a:r>
-              <a:rPr lang="en-US" smtClean="0"/>
+              <a:rPr lang="en-US"/>
               <a:t>Arbol reverso DNS en IPv4</a:t>
             </a:r>
             <a:endParaRPr lang="en-US" dirty="0"/>
@@ -27554,12 +26608,12 @@
           <a:lstStyle/>
           <a:p>
             <a:r>
-              <a:rPr lang="en-US" smtClean="0"/>
+              <a:rPr lang="en-US"/>
               <a:t>Ejemplo, mapeo para la direccion IP 177.24.32.2</a:t>
             </a:r>
           </a:p>
           <a:p>
-            <a:endParaRPr lang="en-US" dirty="0" smtClean="0"/>
+            <a:endParaRPr lang="en-US" dirty="0"/>
           </a:p>
         </p:txBody>
       </p:sp>
@@ -27591,14 +26645,6 @@
   <p:clrMapOvr>
     <a:masterClrMapping/>
   </p:clrMapOvr>
-  <mc:AlternateContent xmlns:mc="http://schemas.openxmlformats.org/markup-compatibility/2006">
-    <mc:Choice xmlns:p14="http://schemas.microsoft.com/office/powerpoint/2010/main" Requires="p14">
-      <p:transition spd="slow" p14:dur="2000"/>
-    </mc:Choice>
-    <mc:Fallback>
-      <p:transition spd="slow"/>
-    </mc:Fallback>
-  </mc:AlternateContent>
 </p:sld>
 </file>
 

</xml_diff>